<commit_message>
Massive update di Mardown
Capek tau buatnya :v
</commit_message>
<xml_diff>
--- a/Assets/Providers/Template/Template.pptx
+++ b/Assets/Providers/Template/Template.pptx
@@ -21,36 +21,36 @@
     <p:sldId id="289" r:id="rId15"/>
     <p:sldId id="268" r:id="rId16"/>
     <p:sldId id="269" r:id="rId17"/>
-    <p:sldId id="300" r:id="rId18"/>
-    <p:sldId id="301" r:id="rId19"/>
-    <p:sldId id="302" r:id="rId20"/>
-    <p:sldId id="264" r:id="rId21"/>
-    <p:sldId id="265" r:id="rId22"/>
-    <p:sldId id="272" r:id="rId23"/>
-    <p:sldId id="273" r:id="rId24"/>
-    <p:sldId id="275" r:id="rId25"/>
-    <p:sldId id="279" r:id="rId26"/>
-    <p:sldId id="276" r:id="rId27"/>
-    <p:sldId id="303" r:id="rId28"/>
-    <p:sldId id="277" r:id="rId29"/>
-    <p:sldId id="278" r:id="rId30"/>
-    <p:sldId id="267" r:id="rId31"/>
-    <p:sldId id="266" r:id="rId32"/>
-    <p:sldId id="293" r:id="rId33"/>
-    <p:sldId id="294" r:id="rId34"/>
-    <p:sldId id="295" r:id="rId35"/>
-    <p:sldId id="296" r:id="rId36"/>
-    <p:sldId id="297" r:id="rId37"/>
-    <p:sldId id="298" r:id="rId38"/>
-    <p:sldId id="299" r:id="rId39"/>
-    <p:sldId id="274" r:id="rId40"/>
-    <p:sldId id="280" r:id="rId41"/>
-    <p:sldId id="283" r:id="rId42"/>
-    <p:sldId id="286" r:id="rId43"/>
-    <p:sldId id="287" r:id="rId44"/>
+    <p:sldId id="302" r:id="rId18"/>
+    <p:sldId id="300" r:id="rId19"/>
+    <p:sldId id="301" r:id="rId20"/>
+    <p:sldId id="278" r:id="rId21"/>
+    <p:sldId id="272" r:id="rId22"/>
+    <p:sldId id="276" r:id="rId23"/>
+    <p:sldId id="275" r:id="rId24"/>
+    <p:sldId id="267" r:id="rId25"/>
+    <p:sldId id="273" r:id="rId26"/>
+    <p:sldId id="264" r:id="rId27"/>
+    <p:sldId id="279" r:id="rId28"/>
+    <p:sldId id="265" r:id="rId29"/>
+    <p:sldId id="277" r:id="rId30"/>
+    <p:sldId id="303" r:id="rId31"/>
+    <p:sldId id="296" r:id="rId32"/>
+    <p:sldId id="297" r:id="rId33"/>
+    <p:sldId id="266" r:id="rId34"/>
+    <p:sldId id="298" r:id="rId35"/>
+    <p:sldId id="299" r:id="rId36"/>
+    <p:sldId id="295" r:id="rId37"/>
+    <p:sldId id="293" r:id="rId38"/>
+    <p:sldId id="294" r:id="rId39"/>
+    <p:sldId id="280" r:id="rId40"/>
+    <p:sldId id="274" r:id="rId41"/>
+    <p:sldId id="286" r:id="rId42"/>
+    <p:sldId id="292" r:id="rId43"/>
+    <p:sldId id="283" r:id="rId44"/>
     <p:sldId id="291" r:id="rId45"/>
-    <p:sldId id="288" r:id="rId46"/>
-    <p:sldId id="292" r:id="rId47"/>
+    <p:sldId id="287" r:id="rId46"/>
+    <p:sldId id="288" r:id="rId47"/>
     <p:sldId id="281" r:id="rId48"/>
     <p:sldId id="282" r:id="rId49"/>
   </p:sldIdLst>
@@ -180,48 +180,48 @@
           <p14:sldIdLst>
             <p14:sldId id="268"/>
             <p14:sldId id="269"/>
+            <p14:sldId id="302"/>
             <p14:sldId id="300"/>
             <p14:sldId id="301"/>
-            <p14:sldId id="302"/>
           </p14:sldIdLst>
         </p14:section>
         <p14:section name="Fansub" id="{DB54CE04-9B6C-4979-AD71-6C01C06332BE}">
           <p14:sldIdLst>
+            <p14:sldId id="278"/>
+            <p14:sldId id="272"/>
+            <p14:sldId id="276"/>
+            <p14:sldId id="275"/>
+            <p14:sldId id="267"/>
+            <p14:sldId id="273"/>
             <p14:sldId id="264"/>
+            <p14:sldId id="279"/>
             <p14:sldId id="265"/>
-            <p14:sldId id="272"/>
-            <p14:sldId id="273"/>
-            <p14:sldId id="275"/>
-            <p14:sldId id="279"/>
-            <p14:sldId id="276"/>
+            <p14:sldId id="277"/>
             <p14:sldId id="303"/>
-            <p14:sldId id="277"/>
-            <p14:sldId id="278"/>
-            <p14:sldId id="267"/>
           </p14:sldIdLst>
         </p14:section>
         <p14:section name="Streaming" id="{9A8665E7-8E1D-44CC-8139-4EEB0A16529A}">
           <p14:sldIdLst>
+            <p14:sldId id="296"/>
+            <p14:sldId id="297"/>
             <p14:sldId id="266"/>
+            <p14:sldId id="298"/>
+            <p14:sldId id="299"/>
+            <p14:sldId id="295"/>
             <p14:sldId id="293"/>
             <p14:sldId id="294"/>
-            <p14:sldId id="295"/>
-            <p14:sldId id="296"/>
-            <p14:sldId id="297"/>
-            <p14:sldId id="298"/>
-            <p14:sldId id="299"/>
           </p14:sldIdLst>
         </p14:section>
         <p14:section name="Batch" id="{A02085A7-54E4-4E32-992E-8CF5FE569196}">
           <p14:sldIdLst>
+            <p14:sldId id="280"/>
             <p14:sldId id="274"/>
-            <p14:sldId id="280"/>
+            <p14:sldId id="286"/>
+            <p14:sldId id="292"/>
             <p14:sldId id="283"/>
-            <p14:sldId id="286"/>
+            <p14:sldId id="291"/>
             <p14:sldId id="287"/>
-            <p14:sldId id="291"/>
             <p14:sldId id="288"/>
-            <p14:sldId id="292"/>
           </p14:sldIdLst>
         </p14:section>
         <p14:section name="Library" id="{68A9DAB0-ADBF-44CC-9AC9-B3F85903A98D}">
@@ -242,8 +242,7 @@
 <file path=ppt/revisionInfo.xml><?xml version="1.0" encoding="utf-8"?>
 <p1510:revInfo xmlns:a="http://schemas.openxmlformats.org/drawingml/2006/main" xmlns:r="http://schemas.openxmlformats.org/officeDocument/2006/relationships" xmlns:p1510="http://schemas.microsoft.com/office/powerpoint/2015/10/main">
   <p1510:revLst>
-    <p1510:client id="{6979037F-B8AF-EB29-C79B-6CB435DD5E2F}" v="9" dt="2019-06-28T12:23:26.159"/>
-    <p1510:client id="{9147E138-B16C-4E8E-9F1C-20CD1B8B15DC}" v="966" dt="2019-06-29T04:39:55.807"/>
+    <p1510:client id="{5755450D-933B-4C15-9181-667F35FE7AD9}" v="21" dt="2019-08-02T04:08:00.311"/>
   </p1510:revLst>
 </p1510:revInfo>
 </file>
@@ -345,6 +344,155 @@
     </pc:docChg>
   </pc:docChgLst>
   <pc:docChgLst>
+    <pc:chgData name="Harness, David" userId="00b5c01e-e802-4d63-9d3f-e30c84cf2197" providerId="ADAL" clId="{5755450D-933B-4C15-9181-667F35FE7AD9}"/>
+    <pc:docChg chg="modSld sldOrd">
+      <pc:chgData name="Harness, David" userId="00b5c01e-e802-4d63-9d3f-e30c84cf2197" providerId="ADAL" clId="{5755450D-933B-4C15-9181-667F35FE7AD9}" dt="2019-08-02T04:08:00.310" v="20"/>
+      <pc:docMkLst>
+        <pc:docMk/>
+      </pc:docMkLst>
+      <pc:sldChg chg="ord">
+        <pc:chgData name="Harness, David" userId="00b5c01e-e802-4d63-9d3f-e30c84cf2197" providerId="ADAL" clId="{5755450D-933B-4C15-9181-667F35FE7AD9}" dt="2019-08-02T04:06:43.573" v="7"/>
+        <pc:sldMkLst>
+          <pc:docMk/>
+          <pc:sldMk cId="3545101030" sldId="267"/>
+        </pc:sldMkLst>
+      </pc:sldChg>
+      <pc:sldChg chg="ord">
+        <pc:chgData name="Harness, David" userId="00b5c01e-e802-4d63-9d3f-e30c84cf2197" providerId="ADAL" clId="{5755450D-933B-4C15-9181-667F35FE7AD9}" dt="2019-08-02T04:07:22.393" v="15"/>
+        <pc:sldMkLst>
+          <pc:docMk/>
+          <pc:sldMk cId="588066880" sldId="268"/>
+        </pc:sldMkLst>
+      </pc:sldChg>
+      <pc:sldChg chg="ord">
+        <pc:chgData name="Harness, David" userId="00b5c01e-e802-4d63-9d3f-e30c84cf2197" providerId="ADAL" clId="{5755450D-933B-4C15-9181-667F35FE7AD9}" dt="2019-08-02T04:07:18.829" v="14"/>
+        <pc:sldMkLst>
+          <pc:docMk/>
+          <pc:sldMk cId="3680451413" sldId="269"/>
+        </pc:sldMkLst>
+      </pc:sldChg>
+      <pc:sldChg chg="ord">
+        <pc:chgData name="Harness, David" userId="00b5c01e-e802-4d63-9d3f-e30c84cf2197" providerId="ADAL" clId="{5755450D-933B-4C15-9181-667F35FE7AD9}" dt="2019-08-02T04:06:10.570" v="0"/>
+        <pc:sldMkLst>
+          <pc:docMk/>
+          <pc:sldMk cId="3484075241" sldId="272"/>
+        </pc:sldMkLst>
+      </pc:sldChg>
+      <pc:sldChg chg="ord">
+        <pc:chgData name="Harness, David" userId="00b5c01e-e802-4d63-9d3f-e30c84cf2197" providerId="ADAL" clId="{5755450D-933B-4C15-9181-667F35FE7AD9}" dt="2019-08-02T04:06:12.276" v="1"/>
+        <pc:sldMkLst>
+          <pc:docMk/>
+          <pc:sldMk cId="2285725612" sldId="273"/>
+        </pc:sldMkLst>
+      </pc:sldChg>
+      <pc:sldChg chg="ord">
+        <pc:chgData name="Harness, David" userId="00b5c01e-e802-4d63-9d3f-e30c84cf2197" providerId="ADAL" clId="{5755450D-933B-4C15-9181-667F35FE7AD9}" dt="2019-08-02T04:06:14.169" v="2"/>
+        <pc:sldMkLst>
+          <pc:docMk/>
+          <pc:sldMk cId="4156622531" sldId="275"/>
+        </pc:sldMkLst>
+      </pc:sldChg>
+      <pc:sldChg chg="ord">
+        <pc:chgData name="Harness, David" userId="00b5c01e-e802-4d63-9d3f-e30c84cf2197" providerId="ADAL" clId="{5755450D-933B-4C15-9181-667F35FE7AD9}" dt="2019-08-02T04:06:21.938" v="4"/>
+        <pc:sldMkLst>
+          <pc:docMk/>
+          <pc:sldMk cId="913660653" sldId="276"/>
+        </pc:sldMkLst>
+      </pc:sldChg>
+      <pc:sldChg chg="ord">
+        <pc:chgData name="Harness, David" userId="00b5c01e-e802-4d63-9d3f-e30c84cf2197" providerId="ADAL" clId="{5755450D-933B-4C15-9181-667F35FE7AD9}" dt="2019-08-02T04:06:36.172" v="5"/>
+        <pc:sldMkLst>
+          <pc:docMk/>
+          <pc:sldMk cId="701272778" sldId="277"/>
+        </pc:sldMkLst>
+      </pc:sldChg>
+      <pc:sldChg chg="ord">
+        <pc:chgData name="Harness, David" userId="00b5c01e-e802-4d63-9d3f-e30c84cf2197" providerId="ADAL" clId="{5755450D-933B-4C15-9181-667F35FE7AD9}" dt="2019-08-02T04:06:39.307" v="6"/>
+        <pc:sldMkLst>
+          <pc:docMk/>
+          <pc:sldMk cId="1736296804" sldId="278"/>
+        </pc:sldMkLst>
+      </pc:sldChg>
+      <pc:sldChg chg="ord">
+        <pc:chgData name="Harness, David" userId="00b5c01e-e802-4d63-9d3f-e30c84cf2197" providerId="ADAL" clId="{5755450D-933B-4C15-9181-667F35FE7AD9}" dt="2019-08-02T04:06:18.873" v="3"/>
+        <pc:sldMkLst>
+          <pc:docMk/>
+          <pc:sldMk cId="4171184485" sldId="279"/>
+        </pc:sldMkLst>
+      </pc:sldChg>
+      <pc:sldChg chg="ord">
+        <pc:chgData name="Harness, David" userId="00b5c01e-e802-4d63-9d3f-e30c84cf2197" providerId="ADAL" clId="{5755450D-933B-4C15-9181-667F35FE7AD9}" dt="2019-08-02T04:07:53.285" v="17"/>
+        <pc:sldMkLst>
+          <pc:docMk/>
+          <pc:sldMk cId="3048235945" sldId="280"/>
+        </pc:sldMkLst>
+      </pc:sldChg>
+      <pc:sldChg chg="ord">
+        <pc:chgData name="Harness, David" userId="00b5c01e-e802-4d63-9d3f-e30c84cf2197" providerId="ADAL" clId="{5755450D-933B-4C15-9181-667F35FE7AD9}" dt="2019-08-02T04:07:57.345" v="19"/>
+        <pc:sldMkLst>
+          <pc:docMk/>
+          <pc:sldMk cId="2644471930" sldId="286"/>
+        </pc:sldMkLst>
+      </pc:sldChg>
+      <pc:sldChg chg="ord">
+        <pc:chgData name="Harness, David" userId="00b5c01e-e802-4d63-9d3f-e30c84cf2197" providerId="ADAL" clId="{5755450D-933B-4C15-9181-667F35FE7AD9}" dt="2019-08-02T04:07:55.592" v="18"/>
+        <pc:sldMkLst>
+          <pc:docMk/>
+          <pc:sldMk cId="3541015006" sldId="291"/>
+        </pc:sldMkLst>
+      </pc:sldChg>
+      <pc:sldChg chg="ord">
+        <pc:chgData name="Harness, David" userId="00b5c01e-e802-4d63-9d3f-e30c84cf2197" providerId="ADAL" clId="{5755450D-933B-4C15-9181-667F35FE7AD9}" dt="2019-08-02T04:08:00.310" v="20"/>
+        <pc:sldMkLst>
+          <pc:docMk/>
+          <pc:sldMk cId="1605652628" sldId="292"/>
+        </pc:sldMkLst>
+      </pc:sldChg>
+      <pc:sldChg chg="ord">
+        <pc:chgData name="Harness, David" userId="00b5c01e-e802-4d63-9d3f-e30c84cf2197" providerId="ADAL" clId="{5755450D-933B-4C15-9181-667F35FE7AD9}" dt="2019-08-02T04:07:04.738" v="13"/>
+        <pc:sldMkLst>
+          <pc:docMk/>
+          <pc:sldMk cId="2343881463" sldId="295"/>
+        </pc:sldMkLst>
+      </pc:sldChg>
+      <pc:sldChg chg="ord">
+        <pc:chgData name="Harness, David" userId="00b5c01e-e802-4d63-9d3f-e30c84cf2197" providerId="ADAL" clId="{5755450D-933B-4C15-9181-667F35FE7AD9}" dt="2019-08-02T04:06:50.100" v="8"/>
+        <pc:sldMkLst>
+          <pc:docMk/>
+          <pc:sldMk cId="2044909443" sldId="296"/>
+        </pc:sldMkLst>
+      </pc:sldChg>
+      <pc:sldChg chg="ord">
+        <pc:chgData name="Harness, David" userId="00b5c01e-e802-4d63-9d3f-e30c84cf2197" providerId="ADAL" clId="{5755450D-933B-4C15-9181-667F35FE7AD9}" dt="2019-08-02T04:06:55.979" v="10"/>
+        <pc:sldMkLst>
+          <pc:docMk/>
+          <pc:sldMk cId="2001192933" sldId="297"/>
+        </pc:sldMkLst>
+      </pc:sldChg>
+      <pc:sldChg chg="ord">
+        <pc:chgData name="Harness, David" userId="00b5c01e-e802-4d63-9d3f-e30c84cf2197" providerId="ADAL" clId="{5755450D-933B-4C15-9181-667F35FE7AD9}" dt="2019-08-02T04:06:59.575" v="11"/>
+        <pc:sldMkLst>
+          <pc:docMk/>
+          <pc:sldMk cId="743538766" sldId="298"/>
+        </pc:sldMkLst>
+      </pc:sldChg>
+      <pc:sldChg chg="ord">
+        <pc:chgData name="Harness, David" userId="00b5c01e-e802-4d63-9d3f-e30c84cf2197" providerId="ADAL" clId="{5755450D-933B-4C15-9181-667F35FE7AD9}" dt="2019-08-02T04:07:03.053" v="12"/>
+        <pc:sldMkLst>
+          <pc:docMk/>
+          <pc:sldMk cId="3562251831" sldId="299"/>
+        </pc:sldMkLst>
+      </pc:sldChg>
+      <pc:sldChg chg="ord">
+        <pc:chgData name="Harness, David" userId="00b5c01e-e802-4d63-9d3f-e30c84cf2197" providerId="ADAL" clId="{5755450D-933B-4C15-9181-667F35FE7AD9}" dt="2019-08-02T04:07:44.237" v="16"/>
+        <pc:sldMkLst>
+          <pc:docMk/>
+          <pc:sldMk cId="1591048078" sldId="302"/>
+        </pc:sldMkLst>
+      </pc:sldChg>
+    </pc:docChg>
+  </pc:docChgLst>
+  <pc:docChgLst>
     <pc:chgData name="Harness, David" userId="00b5c01e-e802-4d63-9d3f-e30c84cf2197" providerId="ADAL" clId="{4BC919E0-8C53-407C-A706-0054D2B92D7F}"/>
     <pc:docChg chg="undo custSel addSld delSld modSld sldOrd modSection">
       <pc:chgData name="Harness, David" userId="00b5c01e-e802-4d63-9d3f-e30c84cf2197" providerId="ADAL" clId="{4BC919E0-8C53-407C-A706-0054D2B92D7F}" dt="2019-06-28T16:46:39.212" v="1138" actId="478"/>
@@ -917,13 +1065,6 @@
             <ac:spMk id="4" creationId="{8D6D9DF0-36ED-4863-B918-F6735D13A7C1}"/>
           </ac:spMkLst>
         </pc:spChg>
-      </pc:sldChg>
-      <pc:sldChg chg="add del">
-        <pc:chgData name="Harness, David" userId="00b5c01e-e802-4d63-9d3f-e30c84cf2197" providerId="ADAL" clId="{4BC919E0-8C53-407C-A706-0054D2B92D7F}" dt="2019-06-28T15:43:32.038" v="596"/>
-        <pc:sldMkLst>
-          <pc:docMk/>
-          <pc:sldMk cId="2910965863" sldId="277"/>
-        </pc:sldMkLst>
       </pc:sldChg>
       <pc:sldChg chg="modSp add">
         <pc:chgData name="Harness, David" userId="00b5c01e-e802-4d63-9d3f-e30c84cf2197" providerId="ADAL" clId="{4BC919E0-8C53-407C-A706-0054D2B92D7F}" dt="2019-06-28T15:47:04.433" v="616" actId="20577"/>
@@ -2270,7 +2411,7 @@
           <a:p>
             <a:fld id="{2138AE3F-AD4C-42B5-8262-81A441F57E31}" type="datetimeFigureOut">
               <a:rPr lang="en-US" smtClean="0"/>
-              <a:t>29-Jun-19</a:t>
+              <a:t>08-02-2019</a:t>
             </a:fld>
             <a:endParaRPr lang="en-US"/>
           </a:p>
@@ -2440,7 +2581,7 @@
           <a:p>
             <a:fld id="{2138AE3F-AD4C-42B5-8262-81A441F57E31}" type="datetimeFigureOut">
               <a:rPr lang="en-US" smtClean="0"/>
-              <a:t>29-Jun-19</a:t>
+              <a:t>08-02-2019</a:t>
             </a:fld>
             <a:endParaRPr lang="en-US"/>
           </a:p>
@@ -2620,7 +2761,7 @@
           <a:p>
             <a:fld id="{2138AE3F-AD4C-42B5-8262-81A441F57E31}" type="datetimeFigureOut">
               <a:rPr lang="en-US" smtClean="0"/>
-              <a:t>29-Jun-19</a:t>
+              <a:t>08-02-2019</a:t>
             </a:fld>
             <a:endParaRPr lang="en-US"/>
           </a:p>
@@ -2790,7 +2931,7 @@
           <a:p>
             <a:fld id="{2138AE3F-AD4C-42B5-8262-81A441F57E31}" type="datetimeFigureOut">
               <a:rPr lang="en-US" smtClean="0"/>
-              <a:t>29-Jun-19</a:t>
+              <a:t>08-02-2019</a:t>
             </a:fld>
             <a:endParaRPr lang="en-US"/>
           </a:p>
@@ -3036,7 +3177,7 @@
           <a:p>
             <a:fld id="{2138AE3F-AD4C-42B5-8262-81A441F57E31}" type="datetimeFigureOut">
               <a:rPr lang="en-US" smtClean="0"/>
-              <a:t>29-Jun-19</a:t>
+              <a:t>08-02-2019</a:t>
             </a:fld>
             <a:endParaRPr lang="en-US"/>
           </a:p>
@@ -3268,7 +3409,7 @@
           <a:p>
             <a:fld id="{2138AE3F-AD4C-42B5-8262-81A441F57E31}" type="datetimeFigureOut">
               <a:rPr lang="en-US" smtClean="0"/>
-              <a:t>29-Jun-19</a:t>
+              <a:t>08-02-2019</a:t>
             </a:fld>
             <a:endParaRPr lang="en-US"/>
           </a:p>
@@ -3635,7 +3776,7 @@
           <a:p>
             <a:fld id="{2138AE3F-AD4C-42B5-8262-81A441F57E31}" type="datetimeFigureOut">
               <a:rPr lang="en-US" smtClean="0"/>
-              <a:t>29-Jun-19</a:t>
+              <a:t>08-02-2019</a:t>
             </a:fld>
             <a:endParaRPr lang="en-US"/>
           </a:p>
@@ -3753,7 +3894,7 @@
           <a:p>
             <a:fld id="{2138AE3F-AD4C-42B5-8262-81A441F57E31}" type="datetimeFigureOut">
               <a:rPr lang="en-US" smtClean="0"/>
-              <a:t>29-Jun-19</a:t>
+              <a:t>08-02-2019</a:t>
             </a:fld>
             <a:endParaRPr lang="en-US"/>
           </a:p>
@@ -3848,7 +3989,7 @@
           <a:p>
             <a:fld id="{2138AE3F-AD4C-42B5-8262-81A441F57E31}" type="datetimeFigureOut">
               <a:rPr lang="en-US" smtClean="0"/>
-              <a:t>29-Jun-19</a:t>
+              <a:t>08-02-2019</a:t>
             </a:fld>
             <a:endParaRPr lang="en-US"/>
           </a:p>
@@ -4125,7 +4266,7 @@
           <a:p>
             <a:fld id="{2138AE3F-AD4C-42B5-8262-81A441F57E31}" type="datetimeFigureOut">
               <a:rPr lang="en-US" smtClean="0"/>
-              <a:t>29-Jun-19</a:t>
+              <a:t>08-02-2019</a:t>
             </a:fld>
             <a:endParaRPr lang="en-US"/>
           </a:p>
@@ -4382,7 +4523,7 @@
           <a:p>
             <a:fld id="{2138AE3F-AD4C-42B5-8262-81A441F57E31}" type="datetimeFigureOut">
               <a:rPr lang="en-US" smtClean="0"/>
-              <a:t>29-Jun-19</a:t>
+              <a:t>08-02-2019</a:t>
             </a:fld>
             <a:endParaRPr lang="en-US"/>
           </a:p>
@@ -4595,7 +4736,7 @@
           <a:p>
             <a:fld id="{2138AE3F-AD4C-42B5-8262-81A441F57E31}" type="datetimeFigureOut">
               <a:rPr lang="en-US" smtClean="0"/>
-              <a:t>29-Jun-19</a:t>
+              <a:t>08-02-2019</a:t>
             </a:fld>
             <a:endParaRPr lang="en-US"/>
           </a:p>
@@ -6398,6 +6539,146 @@
           </a:prstGeom>
           <a:gradFill flip="none" rotWithShape="1">
             <a:gsLst>
+              <a:gs pos="12000">
+                <a:schemeClr val="tx1"/>
+              </a:gs>
+              <a:gs pos="100000">
+                <a:srgbClr val="FCAF40"/>
+              </a:gs>
+            </a:gsLst>
+            <a:lin ang="2700000" scaled="0"/>
+            <a:tileRect/>
+          </a:gradFill>
+          <a:ln>
+            <a:noFill/>
+          </a:ln>
+        </p:spPr>
+        <p:style>
+          <a:lnRef idx="2">
+            <a:schemeClr val="accent1">
+              <a:shade val="50000"/>
+            </a:schemeClr>
+          </a:lnRef>
+          <a:fillRef idx="1">
+            <a:schemeClr val="accent1"/>
+          </a:fillRef>
+          <a:effectRef idx="0">
+            <a:schemeClr val="accent1"/>
+          </a:effectRef>
+          <a:fontRef idx="minor">
+            <a:schemeClr val="lt1"/>
+          </a:fontRef>
+        </p:style>
+        <p:txBody>
+          <a:bodyPr rtlCol="0" anchor="ctr"/>
+          <a:lstStyle/>
+          <a:p>
+            <a:pPr algn="ctr"/>
+            <a:endParaRPr lang="en-US"/>
+          </a:p>
+        </p:txBody>
+      </p:sp>
+      <p:pic>
+        <p:nvPicPr>
+          <p:cNvPr id="9218" name="Picture 2" descr="https://animego.to/img/icon/logo.png">
+            <a:extLst>
+              <a:ext uri="{FF2B5EF4-FFF2-40B4-BE49-F238E27FC236}">
+                <a16:creationId xmlns:a16="http://schemas.microsoft.com/office/drawing/2014/main" id="{793D3A69-62E5-4F0C-B0C9-0A404384348A}"/>
+              </a:ext>
+            </a:extLst>
+          </p:cNvPr>
+          <p:cNvPicPr>
+            <a:picLocks noChangeAspect="1" noChangeArrowheads="1"/>
+          </p:cNvPicPr>
+          <p:nvPr/>
+        </p:nvPicPr>
+        <p:blipFill>
+          <a:blip r:embed="rId2">
+            <a:extLst>
+              <a:ext uri="{28A0092B-C50C-407E-A947-70E740481C1C}">
+                <a14:useLocalDpi xmlns:a14="http://schemas.microsoft.com/office/drawing/2010/main" val="0"/>
+              </a:ext>
+            </a:extLst>
+          </a:blip>
+          <a:srcRect/>
+          <a:stretch>
+            <a:fillRect/>
+          </a:stretch>
+        </p:blipFill>
+        <p:spPr bwMode="auto">
+          <a:xfrm>
+            <a:off x="876506" y="244475"/>
+            <a:ext cx="1810926" cy="698500"/>
+          </a:xfrm>
+          <a:prstGeom prst="rect">
+            <a:avLst/>
+          </a:prstGeom>
+          <a:noFill/>
+          <a:extLst>
+            <a:ext uri="{909E8E84-426E-40DD-AFC4-6F175D3DCCD1}">
+              <a14:hiddenFill xmlns:a14="http://schemas.microsoft.com/office/drawing/2010/main">
+                <a:solidFill>
+                  <a:srgbClr val="FFFFFF"/>
+                </a:solidFill>
+              </a14:hiddenFill>
+            </a:ext>
+          </a:extLst>
+        </p:spPr>
+      </p:pic>
+    </p:spTree>
+    <p:extLst>
+      <p:ext uri="{BB962C8B-B14F-4D97-AF65-F5344CB8AC3E}">
+        <p14:creationId xmlns:p14="http://schemas.microsoft.com/office/powerpoint/2010/main" val="1591048078"/>
+      </p:ext>
+    </p:extLst>
+  </p:cSld>
+  <p:clrMapOvr>
+    <a:masterClrMapping/>
+  </p:clrMapOvr>
+</p:sld>
+</file>
+
+<file path=ppt/slides/slide18.xml><?xml version="1.0" encoding="utf-8"?>
+<p:sld xmlns:a="http://schemas.openxmlformats.org/drawingml/2006/main" xmlns:r="http://schemas.openxmlformats.org/officeDocument/2006/relationships" xmlns:p="http://schemas.openxmlformats.org/presentationml/2006/main">
+  <p:cSld>
+    <p:spTree>
+      <p:nvGrpSpPr>
+        <p:cNvPr id="1" name=""/>
+        <p:cNvGrpSpPr/>
+        <p:nvPr/>
+      </p:nvGrpSpPr>
+      <p:grpSpPr>
+        <a:xfrm>
+          <a:off x="0" y="0"/>
+          <a:ext cx="0" cy="0"/>
+          <a:chOff x="0" y="0"/>
+          <a:chExt cx="0" cy="0"/>
+        </a:xfrm>
+      </p:grpSpPr>
+      <p:sp>
+        <p:nvSpPr>
+          <p:cNvPr id="4" name="Rectangle: Rounded Corners 3">
+            <a:extLst>
+              <a:ext uri="{FF2B5EF4-FFF2-40B4-BE49-F238E27FC236}">
+                <a16:creationId xmlns:a16="http://schemas.microsoft.com/office/drawing/2014/main" id="{8D6D9DF0-36ED-4863-B918-F6735D13A7C1}"/>
+              </a:ext>
+            </a:extLst>
+          </p:cNvPr>
+          <p:cNvSpPr/>
+          <p:nvPr/>
+        </p:nvSpPr>
+        <p:spPr>
+          <a:xfrm>
+            <a:off x="0" y="0"/>
+            <a:ext cx="3563938" cy="1187450"/>
+          </a:xfrm>
+          <a:prstGeom prst="roundRect">
+            <a:avLst>
+              <a:gd name="adj" fmla="val 50000"/>
+            </a:avLst>
+          </a:prstGeom>
+          <a:gradFill flip="none" rotWithShape="1">
+            <a:gsLst>
               <a:gs pos="26000">
                 <a:srgbClr val="446A06"/>
               </a:gs>
@@ -6479,7 +6760,7 @@
 </p:sld>
 </file>
 
-<file path=ppt/slides/slide18.xml><?xml version="1.0" encoding="utf-8"?>
+<file path=ppt/slides/slide19.xml><?xml version="1.0" encoding="utf-8"?>
 <p:sld xmlns:a="http://schemas.openxmlformats.org/drawingml/2006/main" xmlns:r="http://schemas.openxmlformats.org/officeDocument/2006/relationships" xmlns:p="http://schemas.openxmlformats.org/presentationml/2006/main">
   <p:cSld>
     <p:spTree>
@@ -6728,146 +7009,6 @@
     <p:extLst>
       <p:ext uri="{BB962C8B-B14F-4D97-AF65-F5344CB8AC3E}">
         <p14:creationId xmlns:p14="http://schemas.microsoft.com/office/powerpoint/2010/main" val="2388989435"/>
-      </p:ext>
-    </p:extLst>
-  </p:cSld>
-  <p:clrMapOvr>
-    <a:masterClrMapping/>
-  </p:clrMapOvr>
-</p:sld>
-</file>
-
-<file path=ppt/slides/slide19.xml><?xml version="1.0" encoding="utf-8"?>
-<p:sld xmlns:a="http://schemas.openxmlformats.org/drawingml/2006/main" xmlns:r="http://schemas.openxmlformats.org/officeDocument/2006/relationships" xmlns:p="http://schemas.openxmlformats.org/presentationml/2006/main">
-  <p:cSld>
-    <p:spTree>
-      <p:nvGrpSpPr>
-        <p:cNvPr id="1" name=""/>
-        <p:cNvGrpSpPr/>
-        <p:nvPr/>
-      </p:nvGrpSpPr>
-      <p:grpSpPr>
-        <a:xfrm>
-          <a:off x="0" y="0"/>
-          <a:ext cx="0" cy="0"/>
-          <a:chOff x="0" y="0"/>
-          <a:chExt cx="0" cy="0"/>
-        </a:xfrm>
-      </p:grpSpPr>
-      <p:sp>
-        <p:nvSpPr>
-          <p:cNvPr id="4" name="Rectangle: Rounded Corners 3">
-            <a:extLst>
-              <a:ext uri="{FF2B5EF4-FFF2-40B4-BE49-F238E27FC236}">
-                <a16:creationId xmlns:a16="http://schemas.microsoft.com/office/drawing/2014/main" id="{8D6D9DF0-36ED-4863-B918-F6735D13A7C1}"/>
-              </a:ext>
-            </a:extLst>
-          </p:cNvPr>
-          <p:cNvSpPr/>
-          <p:nvPr/>
-        </p:nvSpPr>
-        <p:spPr>
-          <a:xfrm>
-            <a:off x="0" y="0"/>
-            <a:ext cx="3563938" cy="1187450"/>
-          </a:xfrm>
-          <a:prstGeom prst="roundRect">
-            <a:avLst>
-              <a:gd name="adj" fmla="val 50000"/>
-            </a:avLst>
-          </a:prstGeom>
-          <a:gradFill flip="none" rotWithShape="1">
-            <a:gsLst>
-              <a:gs pos="12000">
-                <a:schemeClr val="tx1"/>
-              </a:gs>
-              <a:gs pos="100000">
-                <a:srgbClr val="FCAF40"/>
-              </a:gs>
-            </a:gsLst>
-            <a:lin ang="2700000" scaled="0"/>
-            <a:tileRect/>
-          </a:gradFill>
-          <a:ln>
-            <a:noFill/>
-          </a:ln>
-        </p:spPr>
-        <p:style>
-          <a:lnRef idx="2">
-            <a:schemeClr val="accent1">
-              <a:shade val="50000"/>
-            </a:schemeClr>
-          </a:lnRef>
-          <a:fillRef idx="1">
-            <a:schemeClr val="accent1"/>
-          </a:fillRef>
-          <a:effectRef idx="0">
-            <a:schemeClr val="accent1"/>
-          </a:effectRef>
-          <a:fontRef idx="minor">
-            <a:schemeClr val="lt1"/>
-          </a:fontRef>
-        </p:style>
-        <p:txBody>
-          <a:bodyPr rtlCol="0" anchor="ctr"/>
-          <a:lstStyle/>
-          <a:p>
-            <a:pPr algn="ctr"/>
-            <a:endParaRPr lang="en-US"/>
-          </a:p>
-        </p:txBody>
-      </p:sp>
-      <p:pic>
-        <p:nvPicPr>
-          <p:cNvPr id="9218" name="Picture 2" descr="https://animego.to/img/icon/logo.png">
-            <a:extLst>
-              <a:ext uri="{FF2B5EF4-FFF2-40B4-BE49-F238E27FC236}">
-                <a16:creationId xmlns:a16="http://schemas.microsoft.com/office/drawing/2014/main" id="{793D3A69-62E5-4F0C-B0C9-0A404384348A}"/>
-              </a:ext>
-            </a:extLst>
-          </p:cNvPr>
-          <p:cNvPicPr>
-            <a:picLocks noChangeAspect="1" noChangeArrowheads="1"/>
-          </p:cNvPicPr>
-          <p:nvPr/>
-        </p:nvPicPr>
-        <p:blipFill>
-          <a:blip r:embed="rId2">
-            <a:extLst>
-              <a:ext uri="{28A0092B-C50C-407E-A947-70E740481C1C}">
-                <a14:useLocalDpi xmlns:a14="http://schemas.microsoft.com/office/drawing/2010/main" val="0"/>
-              </a:ext>
-            </a:extLst>
-          </a:blip>
-          <a:srcRect/>
-          <a:stretch>
-            <a:fillRect/>
-          </a:stretch>
-        </p:blipFill>
-        <p:spPr bwMode="auto">
-          <a:xfrm>
-            <a:off x="876506" y="244475"/>
-            <a:ext cx="1810926" cy="698500"/>
-          </a:xfrm>
-          <a:prstGeom prst="rect">
-            <a:avLst/>
-          </a:prstGeom>
-          <a:noFill/>
-          <a:extLst>
-            <a:ext uri="{909E8E84-426E-40DD-AFC4-6F175D3DCCD1}">
-              <a14:hiddenFill xmlns:a14="http://schemas.microsoft.com/office/drawing/2010/main">
-                <a:solidFill>
-                  <a:srgbClr val="FFFFFF"/>
-                </a:solidFill>
-              </a14:hiddenFill>
-            </a:ext>
-          </a:extLst>
-        </p:spPr>
-      </p:pic>
-    </p:spTree>
-    <p:extLst>
-      <p:ext uri="{BB962C8B-B14F-4D97-AF65-F5344CB8AC3E}">
-        <p14:creationId xmlns:p14="http://schemas.microsoft.com/office/powerpoint/2010/main" val="1591048078"/>
       </p:ext>
     </p:extLst>
   </p:cSld>
@@ -7059,13 +7200,10 @@
           <a:gradFill flip="none" rotWithShape="1">
             <a:gsLst>
               <a:gs pos="26000">
-                <a:schemeClr val="accent1"/>
+                <a:srgbClr val="663300"/>
               </a:gs>
               <a:gs pos="100000">
-                <a:schemeClr val="accent1">
-                  <a:lumMod val="20000"/>
-                  <a:lumOff val="80000"/>
-                </a:schemeClr>
+                <a:srgbClr val="CC9900"/>
               </a:gs>
             </a:gsLst>
             <a:lin ang="2700000" scaled="0"/>
@@ -7100,66 +7238,55 @@
           </a:p>
         </p:txBody>
       </p:sp>
-      <p:pic>
-        <p:nvPicPr>
-          <p:cNvPr id="19458" name="Picture 2" descr="https://pendekarsubs.us/wp-content/uploads/2019/02/pendekar-logo-1.png">
+      <p:sp>
+        <p:nvSpPr>
+          <p:cNvPr id="2" name="TextBox 1">
             <a:extLst>
               <a:ext uri="{FF2B5EF4-FFF2-40B4-BE49-F238E27FC236}">
-                <a16:creationId xmlns:a16="http://schemas.microsoft.com/office/drawing/2014/main" id="{B6F41F4E-E4AA-4293-A3CF-A571FF1AEFD6}"/>
+                <a16:creationId xmlns:a16="http://schemas.microsoft.com/office/drawing/2014/main" id="{549FBF46-2A4E-45D5-9682-423BACB68B64}"/>
               </a:ext>
             </a:extLst>
           </p:cNvPr>
-          <p:cNvPicPr>
-            <a:picLocks noChangeAspect="1" noChangeArrowheads="1"/>
-          </p:cNvPicPr>
+          <p:cNvSpPr txBox="1"/>
           <p:nvPr/>
-        </p:nvPicPr>
-        <p:blipFill>
-          <a:blip r:embed="rId2">
-            <a:extLst>
-              <a:ext uri="{BEBA8EAE-BF5A-486C-A8C5-ECC9F3942E4B}">
-                <a14:imgProps xmlns:a14="http://schemas.microsoft.com/office/drawing/2010/main">
-                  <a14:imgLayer r:embed="rId3">
-                    <a14:imgEffect>
-                      <a14:brightnessContrast bright="100000" contrast="100000"/>
-                    </a14:imgEffect>
-                  </a14:imgLayer>
-                </a14:imgProps>
-              </a:ext>
-              <a:ext uri="{28A0092B-C50C-407E-A947-70E740481C1C}">
-                <a14:useLocalDpi xmlns:a14="http://schemas.microsoft.com/office/drawing/2010/main" val="0"/>
-              </a:ext>
-            </a:extLst>
-          </a:blip>
-          <a:srcRect/>
-          <a:stretch>
-            <a:fillRect/>
-          </a:stretch>
-        </p:blipFill>
-        <p:spPr bwMode="auto">
+        </p:nvSpPr>
+        <p:spPr>
           <a:xfrm>
-            <a:off x="605631" y="201612"/>
-            <a:ext cx="2352675" cy="784225"/>
+            <a:off x="278110" y="270559"/>
+            <a:ext cx="3007717" cy="646331"/>
           </a:xfrm>
           <a:prstGeom prst="rect">
             <a:avLst/>
           </a:prstGeom>
           <a:noFill/>
-          <a:extLst>
-            <a:ext uri="{909E8E84-426E-40DD-AFC4-6F175D3DCCD1}">
-              <a14:hiddenFill xmlns:a14="http://schemas.microsoft.com/office/drawing/2010/main">
+        </p:spPr>
+        <p:txBody>
+          <a:bodyPr wrap="square" rtlCol="0">
+            <a:spAutoFit/>
+          </a:bodyPr>
+          <a:lstStyle/>
+          <a:p>
+            <a:pPr algn="ctr"/>
+            <a:r>
+              <a:rPr lang="id-ID" sz="3600" dirty="0">
                 <a:solidFill>
-                  <a:srgbClr val="FFFFFF"/>
+                  <a:schemeClr val="bg1"/>
                 </a:solidFill>
-              </a14:hiddenFill>
-            </a:ext>
-          </a:extLst>
-        </p:spPr>
-      </p:pic>
+              </a:rPr>
+              <a:t>Anitoki</a:t>
+            </a:r>
+            <a:endParaRPr lang="en-US" sz="3600" dirty="0">
+              <a:solidFill>
+                <a:schemeClr val="bg1"/>
+              </a:solidFill>
+            </a:endParaRPr>
+          </a:p>
+        </p:txBody>
+      </p:sp>
     </p:spTree>
     <p:extLst>
       <p:ext uri="{BB962C8B-B14F-4D97-AF65-F5344CB8AC3E}">
-        <p14:creationId xmlns:p14="http://schemas.microsoft.com/office/powerpoint/2010/main" val="2484894236"/>
+        <p14:creationId xmlns:p14="http://schemas.microsoft.com/office/powerpoint/2010/main" val="1736296804"/>
       </p:ext>
     </p:extLst>
   </p:cSld>
@@ -7170,146 +7297,6 @@
 </file>
 
 <file path=ppt/slides/slide21.xml><?xml version="1.0" encoding="utf-8"?>
-<p:sld xmlns:a="http://schemas.openxmlformats.org/drawingml/2006/main" xmlns:r="http://schemas.openxmlformats.org/officeDocument/2006/relationships" xmlns:p="http://schemas.openxmlformats.org/presentationml/2006/main">
-  <p:cSld>
-    <p:spTree>
-      <p:nvGrpSpPr>
-        <p:cNvPr id="1" name=""/>
-        <p:cNvGrpSpPr/>
-        <p:nvPr/>
-      </p:nvGrpSpPr>
-      <p:grpSpPr>
-        <a:xfrm>
-          <a:off x="0" y="0"/>
-          <a:ext cx="0" cy="0"/>
-          <a:chOff x="0" y="0"/>
-          <a:chExt cx="0" cy="0"/>
-        </a:xfrm>
-      </p:grpSpPr>
-      <p:sp>
-        <p:nvSpPr>
-          <p:cNvPr id="4" name="Rectangle: Rounded Corners 3">
-            <a:extLst>
-              <a:ext uri="{FF2B5EF4-FFF2-40B4-BE49-F238E27FC236}">
-                <a16:creationId xmlns:a16="http://schemas.microsoft.com/office/drawing/2014/main" id="{8D6D9DF0-36ED-4863-B918-F6735D13A7C1}"/>
-              </a:ext>
-            </a:extLst>
-          </p:cNvPr>
-          <p:cNvSpPr/>
-          <p:nvPr/>
-        </p:nvSpPr>
-        <p:spPr>
-          <a:xfrm>
-            <a:off x="0" y="0"/>
-            <a:ext cx="3563938" cy="1187450"/>
-          </a:xfrm>
-          <a:prstGeom prst="roundRect">
-            <a:avLst>
-              <a:gd name="adj" fmla="val 50000"/>
-            </a:avLst>
-          </a:prstGeom>
-          <a:gradFill flip="none" rotWithShape="1">
-            <a:gsLst>
-              <a:gs pos="26000">
-                <a:schemeClr val="tx1"/>
-              </a:gs>
-              <a:gs pos="100000">
-                <a:srgbClr val="C00000"/>
-              </a:gs>
-            </a:gsLst>
-            <a:lin ang="2700000" scaled="0"/>
-            <a:tileRect/>
-          </a:gradFill>
-          <a:ln>
-            <a:noFill/>
-          </a:ln>
-        </p:spPr>
-        <p:style>
-          <a:lnRef idx="2">
-            <a:schemeClr val="accent1">
-              <a:shade val="50000"/>
-            </a:schemeClr>
-          </a:lnRef>
-          <a:fillRef idx="1">
-            <a:schemeClr val="accent1"/>
-          </a:fillRef>
-          <a:effectRef idx="0">
-            <a:schemeClr val="accent1"/>
-          </a:effectRef>
-          <a:fontRef idx="minor">
-            <a:schemeClr val="lt1"/>
-          </a:fontRef>
-        </p:style>
-        <p:txBody>
-          <a:bodyPr rtlCol="0" anchor="ctr"/>
-          <a:lstStyle/>
-          <a:p>
-            <a:pPr algn="ctr"/>
-            <a:endParaRPr lang="en-US" dirty="0"/>
-          </a:p>
-        </p:txBody>
-      </p:sp>
-      <p:pic>
-        <p:nvPicPr>
-          <p:cNvPr id="20482" name="Picture 2" descr="https://i0.wp.com/www.samehada.co/wp-content/uploads/2018/11/logo_samehadaku.png?fit=500%2C140">
-            <a:extLst>
-              <a:ext uri="{FF2B5EF4-FFF2-40B4-BE49-F238E27FC236}">
-                <a16:creationId xmlns:a16="http://schemas.microsoft.com/office/drawing/2014/main" id="{BE669853-F669-496A-BEB1-969A6F93CAD5}"/>
-              </a:ext>
-            </a:extLst>
-          </p:cNvPr>
-          <p:cNvPicPr>
-            <a:picLocks noChangeAspect="1" noChangeArrowheads="1"/>
-          </p:cNvPicPr>
-          <p:nvPr/>
-        </p:nvPicPr>
-        <p:blipFill>
-          <a:blip r:embed="rId2">
-            <a:extLst>
-              <a:ext uri="{28A0092B-C50C-407E-A947-70E740481C1C}">
-                <a14:useLocalDpi xmlns:a14="http://schemas.microsoft.com/office/drawing/2010/main" val="0"/>
-              </a:ext>
-            </a:extLst>
-          </a:blip>
-          <a:srcRect/>
-          <a:stretch>
-            <a:fillRect/>
-          </a:stretch>
-        </p:blipFill>
-        <p:spPr bwMode="auto">
-          <a:xfrm>
-            <a:off x="234509" y="160160"/>
-            <a:ext cx="3094919" cy="867129"/>
-          </a:xfrm>
-          <a:prstGeom prst="rect">
-            <a:avLst/>
-          </a:prstGeom>
-          <a:noFill/>
-          <a:extLst>
-            <a:ext uri="{909E8E84-426E-40DD-AFC4-6F175D3DCCD1}">
-              <a14:hiddenFill xmlns:a14="http://schemas.microsoft.com/office/drawing/2010/main">
-                <a:solidFill>
-                  <a:srgbClr val="FFFFFF"/>
-                </a:solidFill>
-              </a14:hiddenFill>
-            </a:ext>
-          </a:extLst>
-        </p:spPr>
-      </p:pic>
-    </p:spTree>
-    <p:extLst>
-      <p:ext uri="{BB962C8B-B14F-4D97-AF65-F5344CB8AC3E}">
-        <p14:creationId xmlns:p14="http://schemas.microsoft.com/office/powerpoint/2010/main" val="854272974"/>
-      </p:ext>
-    </p:extLst>
-  </p:cSld>
-  <p:clrMapOvr>
-    <a:masterClrMapping/>
-  </p:clrMapOvr>
-</p:sld>
-</file>
-
-<file path=ppt/slides/slide22.xml><?xml version="1.0" encoding="utf-8"?>
 <p:sld xmlns:a="http://schemas.openxmlformats.org/drawingml/2006/main" xmlns:r="http://schemas.openxmlformats.org/officeDocument/2006/relationships" xmlns:p="http://schemas.openxmlformats.org/presentationml/2006/main">
   <p:cSld>
     <p:spTree>
@@ -7452,7 +7439,7 @@
 </p:sld>
 </file>
 
-<file path=ppt/slides/slide23.xml><?xml version="1.0" encoding="utf-8"?>
+<file path=ppt/slides/slide22.xml><?xml version="1.0" encoding="utf-8"?>
 <p:sld xmlns:a="http://schemas.openxmlformats.org/drawingml/2006/main" xmlns:r="http://schemas.openxmlformats.org/officeDocument/2006/relationships" xmlns:p="http://schemas.openxmlformats.org/presentationml/2006/main">
   <p:cSld>
     <p:spTree>
@@ -7494,10 +7481,10 @@
           <a:gradFill flip="none" rotWithShape="1">
             <a:gsLst>
               <a:gs pos="26000">
-                <a:srgbClr val="222222"/>
+                <a:srgbClr val="481F67"/>
               </a:gs>
               <a:gs pos="100000">
-                <a:srgbClr val="3C9CCD"/>
+                <a:srgbClr val="7030A0"/>
               </a:gs>
             </a:gsLst>
             <a:lin ang="2700000" scaled="0"/>
@@ -7532,109 +7519,57 @@
           </a:p>
         </p:txBody>
       </p:sp>
-      <p:pic>
-        <p:nvPicPr>
-          <p:cNvPr id="24578" name="Picture 2" descr="https://www.oploverz.in/wp-content/themes/oploverz-v2/dist/images/logo.png">
+      <p:sp>
+        <p:nvSpPr>
+          <p:cNvPr id="2" name="TextBox 1">
             <a:extLst>
               <a:ext uri="{FF2B5EF4-FFF2-40B4-BE49-F238E27FC236}">
-                <a16:creationId xmlns:a16="http://schemas.microsoft.com/office/drawing/2014/main" id="{02A3AE16-9163-45A6-8E67-C8B34AB62358}"/>
+                <a16:creationId xmlns:a16="http://schemas.microsoft.com/office/drawing/2014/main" id="{549FBF46-2A4E-45D5-9682-423BACB68B64}"/>
               </a:ext>
             </a:extLst>
           </p:cNvPr>
-          <p:cNvPicPr>
-            <a:picLocks noChangeAspect="1" noChangeArrowheads="1"/>
-          </p:cNvPicPr>
+          <p:cNvSpPr txBox="1"/>
           <p:nvPr/>
-        </p:nvPicPr>
-        <p:blipFill rotWithShape="1">
-          <a:blip r:embed="rId2">
-            <a:extLst>
-              <a:ext uri="{28A0092B-C50C-407E-A947-70E740481C1C}">
-                <a14:useLocalDpi xmlns:a14="http://schemas.microsoft.com/office/drawing/2010/main" val="0"/>
-              </a:ext>
-            </a:extLst>
-          </a:blip>
-          <a:srcRect r="72176" b="27467"/>
-          <a:stretch/>
-        </p:blipFill>
-        <p:spPr bwMode="auto">
+        </p:nvSpPr>
+        <p:spPr>
           <a:xfrm>
-            <a:off x="346145" y="382905"/>
-            <a:ext cx="798991" cy="421640"/>
+            <a:off x="278110" y="270559"/>
+            <a:ext cx="3007717" cy="646331"/>
           </a:xfrm>
           <a:prstGeom prst="rect">
             <a:avLst/>
           </a:prstGeom>
           <a:noFill/>
-          <a:extLst>
-            <a:ext uri="{909E8E84-426E-40DD-AFC4-6F175D3DCCD1}">
-              <a14:hiddenFill xmlns:a14="http://schemas.microsoft.com/office/drawing/2010/main">
+        </p:spPr>
+        <p:txBody>
+          <a:bodyPr wrap="square" rtlCol="0">
+            <a:spAutoFit/>
+          </a:bodyPr>
+          <a:lstStyle/>
+          <a:p>
+            <a:pPr algn="ctr"/>
+            <a:r>
+              <a:rPr lang="id-ID" sz="3600" dirty="0">
                 <a:solidFill>
-                  <a:srgbClr val="FFFFFF"/>
+                  <a:schemeClr val="bg1"/>
                 </a:solidFill>
-              </a14:hiddenFill>
-            </a:ext>
-          </a:extLst>
-        </p:spPr>
-      </p:pic>
-      <p:pic>
-        <p:nvPicPr>
-          <p:cNvPr id="5" name="Picture 2" descr="https://www.oploverz.in/wp-content/themes/oploverz-v2/dist/images/logo.png">
-            <a:extLst>
-              <a:ext uri="{FF2B5EF4-FFF2-40B4-BE49-F238E27FC236}">
-                <a16:creationId xmlns:a16="http://schemas.microsoft.com/office/drawing/2014/main" id="{6BD0A45C-9A83-49B9-8898-ED785EFAD973}"/>
-              </a:ext>
-            </a:extLst>
-          </p:cNvPr>
-          <p:cNvPicPr>
-            <a:picLocks noChangeAspect="1" noChangeArrowheads="1"/>
-          </p:cNvPicPr>
-          <p:nvPr/>
-        </p:nvPicPr>
-        <p:blipFill rotWithShape="1">
-          <a:blip r:embed="rId3">
-            <a:extLst>
-              <a:ext uri="{BEBA8EAE-BF5A-486C-A8C5-ECC9F3942E4B}">
-                <a14:imgProps xmlns:a14="http://schemas.microsoft.com/office/drawing/2010/main">
-                  <a14:imgLayer r:embed="rId4">
-                    <a14:imgEffect>
-                      <a14:brightnessContrast bright="100000"/>
-                    </a14:imgEffect>
-                  </a14:imgLayer>
-                </a14:imgProps>
-              </a:ext>
-              <a:ext uri="{28A0092B-C50C-407E-A947-70E740481C1C}">
-                <a14:useLocalDpi xmlns:a14="http://schemas.microsoft.com/office/drawing/2010/main" val="0"/>
-              </a:ext>
-            </a:extLst>
-          </a:blip>
-          <a:srcRect l="27824" b="27467"/>
-          <a:stretch/>
-        </p:blipFill>
-        <p:spPr bwMode="auto">
-          <a:xfrm>
-            <a:off x="1145136" y="382905"/>
-            <a:ext cx="2072656" cy="421640"/>
-          </a:xfrm>
-          <a:prstGeom prst="rect">
-            <a:avLst/>
-          </a:prstGeom>
-          <a:noFill/>
-          <a:extLst>
-            <a:ext uri="{909E8E84-426E-40DD-AFC4-6F175D3DCCD1}">
-              <a14:hiddenFill xmlns:a14="http://schemas.microsoft.com/office/drawing/2010/main">
-                <a:solidFill>
-                  <a:srgbClr val="FFFFFF"/>
-                </a:solidFill>
-              </a14:hiddenFill>
-            </a:ext>
-          </a:extLst>
-        </p:spPr>
-      </p:pic>
+                <a:latin typeface="Exo 2" panose="00000500000000000000" pitchFamily="50" charset="0"/>
+              </a:rPr>
+              <a:t>D-ANIMESUB</a:t>
+            </a:r>
+            <a:endParaRPr lang="en-US" sz="3600" dirty="0">
+              <a:solidFill>
+                <a:schemeClr val="bg1"/>
+              </a:solidFill>
+              <a:latin typeface="Exo 2" panose="00000500000000000000" pitchFamily="50" charset="0"/>
+            </a:endParaRPr>
+          </a:p>
+        </p:txBody>
+      </p:sp>
     </p:spTree>
     <p:extLst>
       <p:ext uri="{BB962C8B-B14F-4D97-AF65-F5344CB8AC3E}">
-        <p14:creationId xmlns:p14="http://schemas.microsoft.com/office/powerpoint/2010/main" val="2285725612"/>
+        <p14:creationId xmlns:p14="http://schemas.microsoft.com/office/powerpoint/2010/main" val="913660653"/>
       </p:ext>
     </p:extLst>
   </p:cSld>
@@ -7644,7 +7579,7 @@
 </p:sld>
 </file>
 
-<file path=ppt/slides/slide24.xml><?xml version="1.0" encoding="utf-8"?>
+<file path=ppt/slides/slide23.xml><?xml version="1.0" encoding="utf-8"?>
 <p:sld xmlns:a="http://schemas.openxmlformats.org/drawingml/2006/main" xmlns:r="http://schemas.openxmlformats.org/officeDocument/2006/relationships" xmlns:p="http://schemas.openxmlformats.org/presentationml/2006/main">
   <p:cSld>
     <p:spTree>
@@ -7789,7 +7724,491 @@
 </p:sld>
 </file>
 
+<file path=ppt/slides/slide24.xml><?xml version="1.0" encoding="utf-8"?>
+<p:sld xmlns:a="http://schemas.openxmlformats.org/drawingml/2006/main" xmlns:r="http://schemas.openxmlformats.org/officeDocument/2006/relationships" xmlns:p="http://schemas.openxmlformats.org/presentationml/2006/main">
+  <p:cSld>
+    <p:spTree>
+      <p:nvGrpSpPr>
+        <p:cNvPr id="1" name=""/>
+        <p:cNvGrpSpPr/>
+        <p:nvPr/>
+      </p:nvGrpSpPr>
+      <p:grpSpPr>
+        <a:xfrm>
+          <a:off x="0" y="0"/>
+          <a:ext cx="0" cy="0"/>
+          <a:chOff x="0" y="0"/>
+          <a:chExt cx="0" cy="0"/>
+        </a:xfrm>
+      </p:grpSpPr>
+      <p:sp>
+        <p:nvSpPr>
+          <p:cNvPr id="4" name="Rectangle: Rounded Corners 3">
+            <a:extLst>
+              <a:ext uri="{FF2B5EF4-FFF2-40B4-BE49-F238E27FC236}">
+                <a16:creationId xmlns:a16="http://schemas.microsoft.com/office/drawing/2014/main" id="{8D6D9DF0-36ED-4863-B918-F6735D13A7C1}"/>
+              </a:ext>
+            </a:extLst>
+          </p:cNvPr>
+          <p:cNvSpPr/>
+          <p:nvPr/>
+        </p:nvSpPr>
+        <p:spPr>
+          <a:xfrm>
+            <a:off x="0" y="0"/>
+            <a:ext cx="3563938" cy="1187450"/>
+          </a:xfrm>
+          <a:prstGeom prst="roundRect">
+            <a:avLst>
+              <a:gd name="adj" fmla="val 50000"/>
+            </a:avLst>
+          </a:prstGeom>
+          <a:gradFill flip="none" rotWithShape="1">
+            <a:gsLst>
+              <a:gs pos="26000">
+                <a:srgbClr val="020321"/>
+              </a:gs>
+              <a:gs pos="100000">
+                <a:srgbClr val="202D91"/>
+              </a:gs>
+            </a:gsLst>
+            <a:lin ang="2700000" scaled="0"/>
+            <a:tileRect/>
+          </a:gradFill>
+          <a:ln>
+            <a:noFill/>
+          </a:ln>
+        </p:spPr>
+        <p:style>
+          <a:lnRef idx="2">
+            <a:schemeClr val="accent1">
+              <a:shade val="50000"/>
+            </a:schemeClr>
+          </a:lnRef>
+          <a:fillRef idx="1">
+            <a:schemeClr val="accent1"/>
+          </a:fillRef>
+          <a:effectRef idx="0">
+            <a:schemeClr val="accent1"/>
+          </a:effectRef>
+          <a:fontRef idx="minor">
+            <a:schemeClr val="lt1"/>
+          </a:fontRef>
+        </p:style>
+        <p:txBody>
+          <a:bodyPr rtlCol="0" anchor="ctr"/>
+          <a:lstStyle/>
+          <a:p>
+            <a:pPr algn="ctr"/>
+            <a:endParaRPr lang="en-US" dirty="0"/>
+          </a:p>
+        </p:txBody>
+      </p:sp>
+      <p:sp>
+        <p:nvSpPr>
+          <p:cNvPr id="3" name="TextBox 2">
+            <a:extLst>
+              <a:ext uri="{FF2B5EF4-FFF2-40B4-BE49-F238E27FC236}">
+                <a16:creationId xmlns:a16="http://schemas.microsoft.com/office/drawing/2014/main" id="{7872C401-B53A-4101-AE6A-EACD671B1CDD}"/>
+              </a:ext>
+            </a:extLst>
+          </p:cNvPr>
+          <p:cNvSpPr txBox="1"/>
+          <p:nvPr/>
+        </p:nvSpPr>
+        <p:spPr>
+          <a:xfrm>
+            <a:off x="387509" y="140424"/>
+            <a:ext cx="2788920" cy="769441"/>
+          </a:xfrm>
+          <a:prstGeom prst="rect">
+            <a:avLst/>
+          </a:prstGeom>
+          <a:noFill/>
+        </p:spPr>
+        <p:txBody>
+          <a:bodyPr wrap="square" rtlCol="0">
+            <a:spAutoFit/>
+          </a:bodyPr>
+          <a:lstStyle/>
+          <a:p>
+            <a:pPr algn="ctr"/>
+            <a:r>
+              <a:rPr lang="id-ID" sz="4400" dirty="0">
+                <a:solidFill>
+                  <a:schemeClr val="bg1"/>
+                </a:solidFill>
+                <a:latin typeface="Single Fighter" panose="02000500000000000000" pitchFamily="50" charset="0"/>
+              </a:rPr>
+              <a:t>KAZEFURI</a:t>
+            </a:r>
+            <a:endParaRPr lang="en-US" sz="4400" dirty="0">
+              <a:solidFill>
+                <a:schemeClr val="bg1"/>
+              </a:solidFill>
+              <a:latin typeface="Single Fighter" panose="02000500000000000000" pitchFamily="50" charset="0"/>
+            </a:endParaRPr>
+          </a:p>
+        </p:txBody>
+      </p:sp>
+    </p:spTree>
+    <p:extLst>
+      <p:ext uri="{BB962C8B-B14F-4D97-AF65-F5344CB8AC3E}">
+        <p14:creationId xmlns:p14="http://schemas.microsoft.com/office/powerpoint/2010/main" val="3545101030"/>
+      </p:ext>
+    </p:extLst>
+  </p:cSld>
+  <p:clrMapOvr>
+    <a:masterClrMapping/>
+  </p:clrMapOvr>
+</p:sld>
+</file>
+
 <file path=ppt/slides/slide25.xml><?xml version="1.0" encoding="utf-8"?>
+<p:sld xmlns:a="http://schemas.openxmlformats.org/drawingml/2006/main" xmlns:r="http://schemas.openxmlformats.org/officeDocument/2006/relationships" xmlns:p="http://schemas.openxmlformats.org/presentationml/2006/main">
+  <p:cSld>
+    <p:spTree>
+      <p:nvGrpSpPr>
+        <p:cNvPr id="1" name=""/>
+        <p:cNvGrpSpPr/>
+        <p:nvPr/>
+      </p:nvGrpSpPr>
+      <p:grpSpPr>
+        <a:xfrm>
+          <a:off x="0" y="0"/>
+          <a:ext cx="0" cy="0"/>
+          <a:chOff x="0" y="0"/>
+          <a:chExt cx="0" cy="0"/>
+        </a:xfrm>
+      </p:grpSpPr>
+      <p:sp>
+        <p:nvSpPr>
+          <p:cNvPr id="4" name="Rectangle: Rounded Corners 3">
+            <a:extLst>
+              <a:ext uri="{FF2B5EF4-FFF2-40B4-BE49-F238E27FC236}">
+                <a16:creationId xmlns:a16="http://schemas.microsoft.com/office/drawing/2014/main" id="{8D6D9DF0-36ED-4863-B918-F6735D13A7C1}"/>
+              </a:ext>
+            </a:extLst>
+          </p:cNvPr>
+          <p:cNvSpPr/>
+          <p:nvPr/>
+        </p:nvSpPr>
+        <p:spPr>
+          <a:xfrm>
+            <a:off x="0" y="0"/>
+            <a:ext cx="3563938" cy="1187450"/>
+          </a:xfrm>
+          <a:prstGeom prst="roundRect">
+            <a:avLst>
+              <a:gd name="adj" fmla="val 50000"/>
+            </a:avLst>
+          </a:prstGeom>
+          <a:gradFill flip="none" rotWithShape="1">
+            <a:gsLst>
+              <a:gs pos="26000">
+                <a:srgbClr val="222222"/>
+              </a:gs>
+              <a:gs pos="100000">
+                <a:srgbClr val="3C9CCD"/>
+              </a:gs>
+            </a:gsLst>
+            <a:lin ang="2700000" scaled="0"/>
+            <a:tileRect/>
+          </a:gradFill>
+          <a:ln>
+            <a:noFill/>
+          </a:ln>
+        </p:spPr>
+        <p:style>
+          <a:lnRef idx="2">
+            <a:schemeClr val="accent1">
+              <a:shade val="50000"/>
+            </a:schemeClr>
+          </a:lnRef>
+          <a:fillRef idx="1">
+            <a:schemeClr val="accent1"/>
+          </a:fillRef>
+          <a:effectRef idx="0">
+            <a:schemeClr val="accent1"/>
+          </a:effectRef>
+          <a:fontRef idx="minor">
+            <a:schemeClr val="lt1"/>
+          </a:fontRef>
+        </p:style>
+        <p:txBody>
+          <a:bodyPr rtlCol="0" anchor="ctr"/>
+          <a:lstStyle/>
+          <a:p>
+            <a:pPr algn="ctr"/>
+            <a:endParaRPr lang="en-US" dirty="0"/>
+          </a:p>
+        </p:txBody>
+      </p:sp>
+      <p:pic>
+        <p:nvPicPr>
+          <p:cNvPr id="24578" name="Picture 2" descr="https://www.oploverz.in/wp-content/themes/oploverz-v2/dist/images/logo.png">
+            <a:extLst>
+              <a:ext uri="{FF2B5EF4-FFF2-40B4-BE49-F238E27FC236}">
+                <a16:creationId xmlns:a16="http://schemas.microsoft.com/office/drawing/2014/main" id="{02A3AE16-9163-45A6-8E67-C8B34AB62358}"/>
+              </a:ext>
+            </a:extLst>
+          </p:cNvPr>
+          <p:cNvPicPr>
+            <a:picLocks noChangeAspect="1" noChangeArrowheads="1"/>
+          </p:cNvPicPr>
+          <p:nvPr/>
+        </p:nvPicPr>
+        <p:blipFill rotWithShape="1">
+          <a:blip r:embed="rId2">
+            <a:extLst>
+              <a:ext uri="{28A0092B-C50C-407E-A947-70E740481C1C}">
+                <a14:useLocalDpi xmlns:a14="http://schemas.microsoft.com/office/drawing/2010/main" val="0"/>
+              </a:ext>
+            </a:extLst>
+          </a:blip>
+          <a:srcRect r="72176" b="27467"/>
+          <a:stretch/>
+        </p:blipFill>
+        <p:spPr bwMode="auto">
+          <a:xfrm>
+            <a:off x="346145" y="382905"/>
+            <a:ext cx="798991" cy="421640"/>
+          </a:xfrm>
+          <a:prstGeom prst="rect">
+            <a:avLst/>
+          </a:prstGeom>
+          <a:noFill/>
+          <a:extLst>
+            <a:ext uri="{909E8E84-426E-40DD-AFC4-6F175D3DCCD1}">
+              <a14:hiddenFill xmlns:a14="http://schemas.microsoft.com/office/drawing/2010/main">
+                <a:solidFill>
+                  <a:srgbClr val="FFFFFF"/>
+                </a:solidFill>
+              </a14:hiddenFill>
+            </a:ext>
+          </a:extLst>
+        </p:spPr>
+      </p:pic>
+      <p:pic>
+        <p:nvPicPr>
+          <p:cNvPr id="5" name="Picture 2" descr="https://www.oploverz.in/wp-content/themes/oploverz-v2/dist/images/logo.png">
+            <a:extLst>
+              <a:ext uri="{FF2B5EF4-FFF2-40B4-BE49-F238E27FC236}">
+                <a16:creationId xmlns:a16="http://schemas.microsoft.com/office/drawing/2014/main" id="{6BD0A45C-9A83-49B9-8898-ED785EFAD973}"/>
+              </a:ext>
+            </a:extLst>
+          </p:cNvPr>
+          <p:cNvPicPr>
+            <a:picLocks noChangeAspect="1" noChangeArrowheads="1"/>
+          </p:cNvPicPr>
+          <p:nvPr/>
+        </p:nvPicPr>
+        <p:blipFill rotWithShape="1">
+          <a:blip r:embed="rId3">
+            <a:extLst>
+              <a:ext uri="{BEBA8EAE-BF5A-486C-A8C5-ECC9F3942E4B}">
+                <a14:imgProps xmlns:a14="http://schemas.microsoft.com/office/drawing/2010/main">
+                  <a14:imgLayer r:embed="rId4">
+                    <a14:imgEffect>
+                      <a14:brightnessContrast bright="100000"/>
+                    </a14:imgEffect>
+                  </a14:imgLayer>
+                </a14:imgProps>
+              </a:ext>
+              <a:ext uri="{28A0092B-C50C-407E-A947-70E740481C1C}">
+                <a14:useLocalDpi xmlns:a14="http://schemas.microsoft.com/office/drawing/2010/main" val="0"/>
+              </a:ext>
+            </a:extLst>
+          </a:blip>
+          <a:srcRect l="27824" b="27467"/>
+          <a:stretch/>
+        </p:blipFill>
+        <p:spPr bwMode="auto">
+          <a:xfrm>
+            <a:off x="1145136" y="382905"/>
+            <a:ext cx="2072656" cy="421640"/>
+          </a:xfrm>
+          <a:prstGeom prst="rect">
+            <a:avLst/>
+          </a:prstGeom>
+          <a:noFill/>
+          <a:extLst>
+            <a:ext uri="{909E8E84-426E-40DD-AFC4-6F175D3DCCD1}">
+              <a14:hiddenFill xmlns:a14="http://schemas.microsoft.com/office/drawing/2010/main">
+                <a:solidFill>
+                  <a:srgbClr val="FFFFFF"/>
+                </a:solidFill>
+              </a14:hiddenFill>
+            </a:ext>
+          </a:extLst>
+        </p:spPr>
+      </p:pic>
+    </p:spTree>
+    <p:extLst>
+      <p:ext uri="{BB962C8B-B14F-4D97-AF65-F5344CB8AC3E}">
+        <p14:creationId xmlns:p14="http://schemas.microsoft.com/office/powerpoint/2010/main" val="2285725612"/>
+      </p:ext>
+    </p:extLst>
+  </p:cSld>
+  <p:clrMapOvr>
+    <a:masterClrMapping/>
+  </p:clrMapOvr>
+</p:sld>
+</file>
+
+<file path=ppt/slides/slide26.xml><?xml version="1.0" encoding="utf-8"?>
+<p:sld xmlns:a="http://schemas.openxmlformats.org/drawingml/2006/main" xmlns:r="http://schemas.openxmlformats.org/officeDocument/2006/relationships" xmlns:p="http://schemas.openxmlformats.org/presentationml/2006/main">
+  <p:cSld>
+    <p:spTree>
+      <p:nvGrpSpPr>
+        <p:cNvPr id="1" name=""/>
+        <p:cNvGrpSpPr/>
+        <p:nvPr/>
+      </p:nvGrpSpPr>
+      <p:grpSpPr>
+        <a:xfrm>
+          <a:off x="0" y="0"/>
+          <a:ext cx="0" cy="0"/>
+          <a:chOff x="0" y="0"/>
+          <a:chExt cx="0" cy="0"/>
+        </a:xfrm>
+      </p:grpSpPr>
+      <p:sp>
+        <p:nvSpPr>
+          <p:cNvPr id="4" name="Rectangle: Rounded Corners 3">
+            <a:extLst>
+              <a:ext uri="{FF2B5EF4-FFF2-40B4-BE49-F238E27FC236}">
+                <a16:creationId xmlns:a16="http://schemas.microsoft.com/office/drawing/2014/main" id="{8D6D9DF0-36ED-4863-B918-F6735D13A7C1}"/>
+              </a:ext>
+            </a:extLst>
+          </p:cNvPr>
+          <p:cNvSpPr/>
+          <p:nvPr/>
+        </p:nvSpPr>
+        <p:spPr>
+          <a:xfrm>
+            <a:off x="0" y="0"/>
+            <a:ext cx="3563938" cy="1187450"/>
+          </a:xfrm>
+          <a:prstGeom prst="roundRect">
+            <a:avLst>
+              <a:gd name="adj" fmla="val 50000"/>
+            </a:avLst>
+          </a:prstGeom>
+          <a:gradFill flip="none" rotWithShape="1">
+            <a:gsLst>
+              <a:gs pos="26000">
+                <a:schemeClr val="accent1"/>
+              </a:gs>
+              <a:gs pos="100000">
+                <a:schemeClr val="accent1">
+                  <a:lumMod val="20000"/>
+                  <a:lumOff val="80000"/>
+                </a:schemeClr>
+              </a:gs>
+            </a:gsLst>
+            <a:lin ang="2700000" scaled="0"/>
+            <a:tileRect/>
+          </a:gradFill>
+          <a:ln>
+            <a:noFill/>
+          </a:ln>
+        </p:spPr>
+        <p:style>
+          <a:lnRef idx="2">
+            <a:schemeClr val="accent1">
+              <a:shade val="50000"/>
+            </a:schemeClr>
+          </a:lnRef>
+          <a:fillRef idx="1">
+            <a:schemeClr val="accent1"/>
+          </a:fillRef>
+          <a:effectRef idx="0">
+            <a:schemeClr val="accent1"/>
+          </a:effectRef>
+          <a:fontRef idx="minor">
+            <a:schemeClr val="lt1"/>
+          </a:fontRef>
+        </p:style>
+        <p:txBody>
+          <a:bodyPr rtlCol="0" anchor="ctr"/>
+          <a:lstStyle/>
+          <a:p>
+            <a:pPr algn="ctr"/>
+            <a:endParaRPr lang="en-US" dirty="0"/>
+          </a:p>
+        </p:txBody>
+      </p:sp>
+      <p:pic>
+        <p:nvPicPr>
+          <p:cNvPr id="19458" name="Picture 2" descr="https://pendekarsubs.us/wp-content/uploads/2019/02/pendekar-logo-1.png">
+            <a:extLst>
+              <a:ext uri="{FF2B5EF4-FFF2-40B4-BE49-F238E27FC236}">
+                <a16:creationId xmlns:a16="http://schemas.microsoft.com/office/drawing/2014/main" id="{B6F41F4E-E4AA-4293-A3CF-A571FF1AEFD6}"/>
+              </a:ext>
+            </a:extLst>
+          </p:cNvPr>
+          <p:cNvPicPr>
+            <a:picLocks noChangeAspect="1" noChangeArrowheads="1"/>
+          </p:cNvPicPr>
+          <p:nvPr/>
+        </p:nvPicPr>
+        <p:blipFill>
+          <a:blip r:embed="rId2">
+            <a:extLst>
+              <a:ext uri="{BEBA8EAE-BF5A-486C-A8C5-ECC9F3942E4B}">
+                <a14:imgProps xmlns:a14="http://schemas.microsoft.com/office/drawing/2010/main">
+                  <a14:imgLayer r:embed="rId3">
+                    <a14:imgEffect>
+                      <a14:brightnessContrast bright="100000" contrast="100000"/>
+                    </a14:imgEffect>
+                  </a14:imgLayer>
+                </a14:imgProps>
+              </a:ext>
+              <a:ext uri="{28A0092B-C50C-407E-A947-70E740481C1C}">
+                <a14:useLocalDpi xmlns:a14="http://schemas.microsoft.com/office/drawing/2010/main" val="0"/>
+              </a:ext>
+            </a:extLst>
+          </a:blip>
+          <a:srcRect/>
+          <a:stretch>
+            <a:fillRect/>
+          </a:stretch>
+        </p:blipFill>
+        <p:spPr bwMode="auto">
+          <a:xfrm>
+            <a:off x="605631" y="201612"/>
+            <a:ext cx="2352675" cy="784225"/>
+          </a:xfrm>
+          <a:prstGeom prst="rect">
+            <a:avLst/>
+          </a:prstGeom>
+          <a:noFill/>
+          <a:extLst>
+            <a:ext uri="{909E8E84-426E-40DD-AFC4-6F175D3DCCD1}">
+              <a14:hiddenFill xmlns:a14="http://schemas.microsoft.com/office/drawing/2010/main">
+                <a:solidFill>
+                  <a:srgbClr val="FFFFFF"/>
+                </a:solidFill>
+              </a14:hiddenFill>
+            </a:ext>
+          </a:extLst>
+        </p:spPr>
+      </p:pic>
+    </p:spTree>
+    <p:extLst>
+      <p:ext uri="{BB962C8B-B14F-4D97-AF65-F5344CB8AC3E}">
+        <p14:creationId xmlns:p14="http://schemas.microsoft.com/office/powerpoint/2010/main" val="2484894236"/>
+      </p:ext>
+    </p:extLst>
+  </p:cSld>
+  <p:clrMapOvr>
+    <a:masterClrMapping/>
+  </p:clrMapOvr>
+</p:sld>
+</file>
+
+<file path=ppt/slides/slide27.xml><?xml version="1.0" encoding="utf-8"?>
 <p:sld xmlns:a="http://schemas.openxmlformats.org/drawingml/2006/main" xmlns:r="http://schemas.openxmlformats.org/officeDocument/2006/relationships" xmlns:p="http://schemas.openxmlformats.org/presentationml/2006/main">
   <p:cSld>
     <p:spTree>
@@ -8024,7 +8443,7 @@
 </p:sld>
 </file>
 
-<file path=ppt/slides/slide26.xml><?xml version="1.0" encoding="utf-8"?>
+<file path=ppt/slides/slide28.xml><?xml version="1.0" encoding="utf-8"?>
 <p:sld xmlns:a="http://schemas.openxmlformats.org/drawingml/2006/main" xmlns:r="http://schemas.openxmlformats.org/officeDocument/2006/relationships" xmlns:p="http://schemas.openxmlformats.org/presentationml/2006/main">
   <p:cSld>
     <p:spTree>
@@ -8066,10 +8485,10 @@
           <a:gradFill flip="none" rotWithShape="1">
             <a:gsLst>
               <a:gs pos="26000">
-                <a:srgbClr val="481F67"/>
+                <a:schemeClr val="tx1"/>
               </a:gs>
               <a:gs pos="100000">
-                <a:srgbClr val="7030A0"/>
+                <a:srgbClr val="C00000"/>
               </a:gs>
             </a:gsLst>
             <a:lin ang="2700000" scaled="0"/>
@@ -8104,57 +8523,57 @@
           </a:p>
         </p:txBody>
       </p:sp>
-      <p:sp>
-        <p:nvSpPr>
-          <p:cNvPr id="2" name="TextBox 1">
+      <p:pic>
+        <p:nvPicPr>
+          <p:cNvPr id="20482" name="Picture 2" descr="https://i0.wp.com/www.samehada.co/wp-content/uploads/2018/11/logo_samehadaku.png?fit=500%2C140">
             <a:extLst>
               <a:ext uri="{FF2B5EF4-FFF2-40B4-BE49-F238E27FC236}">
-                <a16:creationId xmlns:a16="http://schemas.microsoft.com/office/drawing/2014/main" id="{549FBF46-2A4E-45D5-9682-423BACB68B64}"/>
+                <a16:creationId xmlns:a16="http://schemas.microsoft.com/office/drawing/2014/main" id="{BE669853-F669-496A-BEB1-969A6F93CAD5}"/>
               </a:ext>
             </a:extLst>
           </p:cNvPr>
-          <p:cNvSpPr txBox="1"/>
+          <p:cNvPicPr>
+            <a:picLocks noChangeAspect="1" noChangeArrowheads="1"/>
+          </p:cNvPicPr>
           <p:nvPr/>
-        </p:nvSpPr>
-        <p:spPr>
+        </p:nvPicPr>
+        <p:blipFill>
+          <a:blip r:embed="rId2">
+            <a:extLst>
+              <a:ext uri="{28A0092B-C50C-407E-A947-70E740481C1C}">
+                <a14:useLocalDpi xmlns:a14="http://schemas.microsoft.com/office/drawing/2010/main" val="0"/>
+              </a:ext>
+            </a:extLst>
+          </a:blip>
+          <a:srcRect/>
+          <a:stretch>
+            <a:fillRect/>
+          </a:stretch>
+        </p:blipFill>
+        <p:spPr bwMode="auto">
           <a:xfrm>
-            <a:off x="278110" y="270559"/>
-            <a:ext cx="3007717" cy="646331"/>
+            <a:off x="234509" y="160160"/>
+            <a:ext cx="3094919" cy="867129"/>
           </a:xfrm>
           <a:prstGeom prst="rect">
             <a:avLst/>
           </a:prstGeom>
           <a:noFill/>
+          <a:extLst>
+            <a:ext uri="{909E8E84-426E-40DD-AFC4-6F175D3DCCD1}">
+              <a14:hiddenFill xmlns:a14="http://schemas.microsoft.com/office/drawing/2010/main">
+                <a:solidFill>
+                  <a:srgbClr val="FFFFFF"/>
+                </a:solidFill>
+              </a14:hiddenFill>
+            </a:ext>
+          </a:extLst>
         </p:spPr>
-        <p:txBody>
-          <a:bodyPr wrap="square" rtlCol="0">
-            <a:spAutoFit/>
-          </a:bodyPr>
-          <a:lstStyle/>
-          <a:p>
-            <a:pPr algn="ctr"/>
-            <a:r>
-              <a:rPr lang="id-ID" sz="3600" dirty="0">
-                <a:solidFill>
-                  <a:schemeClr val="bg1"/>
-                </a:solidFill>
-                <a:latin typeface="Exo 2" panose="00000500000000000000" pitchFamily="50" charset="0"/>
-              </a:rPr>
-              <a:t>D-ANIMESUB</a:t>
-            </a:r>
-            <a:endParaRPr lang="en-US" sz="3600" dirty="0">
-              <a:solidFill>
-                <a:schemeClr val="bg1"/>
-              </a:solidFill>
-              <a:latin typeface="Exo 2" panose="00000500000000000000" pitchFamily="50" charset="0"/>
-            </a:endParaRPr>
-          </a:p>
-        </p:txBody>
-      </p:sp>
+      </p:pic>
     </p:spTree>
     <p:extLst>
       <p:ext uri="{BB962C8B-B14F-4D97-AF65-F5344CB8AC3E}">
-        <p14:creationId xmlns:p14="http://schemas.microsoft.com/office/powerpoint/2010/main" val="913660653"/>
+        <p14:creationId xmlns:p14="http://schemas.microsoft.com/office/powerpoint/2010/main" val="854272974"/>
       </p:ext>
     </p:extLst>
   </p:cSld>
@@ -8164,147 +8583,7 @@
 </p:sld>
 </file>
 
-<file path=ppt/slides/slide27.xml><?xml version="1.0" encoding="utf-8"?>
-<p:sld xmlns:a="http://schemas.openxmlformats.org/drawingml/2006/main" xmlns:r="http://schemas.openxmlformats.org/officeDocument/2006/relationships" xmlns:p="http://schemas.openxmlformats.org/presentationml/2006/main">
-  <p:cSld>
-    <p:spTree>
-      <p:nvGrpSpPr>
-        <p:cNvPr id="1" name=""/>
-        <p:cNvGrpSpPr/>
-        <p:nvPr/>
-      </p:nvGrpSpPr>
-      <p:grpSpPr>
-        <a:xfrm>
-          <a:off x="0" y="0"/>
-          <a:ext cx="0" cy="0"/>
-          <a:chOff x="0" y="0"/>
-          <a:chExt cx="0" cy="0"/>
-        </a:xfrm>
-      </p:grpSpPr>
-      <p:sp>
-        <p:nvSpPr>
-          <p:cNvPr id="4" name="Rectangle: Rounded Corners 3">
-            <a:extLst>
-              <a:ext uri="{FF2B5EF4-FFF2-40B4-BE49-F238E27FC236}">
-                <a16:creationId xmlns:a16="http://schemas.microsoft.com/office/drawing/2014/main" id="{8D6D9DF0-36ED-4863-B918-F6735D13A7C1}"/>
-              </a:ext>
-            </a:extLst>
-          </p:cNvPr>
-          <p:cNvSpPr/>
-          <p:nvPr/>
-        </p:nvSpPr>
-        <p:spPr>
-          <a:xfrm>
-            <a:off x="0" y="0"/>
-            <a:ext cx="3563938" cy="1187450"/>
-          </a:xfrm>
-          <a:prstGeom prst="roundRect">
-            <a:avLst>
-              <a:gd name="adj" fmla="val 50000"/>
-            </a:avLst>
-          </a:prstGeom>
-          <a:gradFill flip="none" rotWithShape="1">
-            <a:gsLst>
-              <a:gs pos="26000">
-                <a:srgbClr val="481F67"/>
-              </a:gs>
-              <a:gs pos="100000">
-                <a:srgbClr val="E4ABDA"/>
-              </a:gs>
-            </a:gsLst>
-            <a:lin ang="2700000" scaled="0"/>
-            <a:tileRect/>
-          </a:gradFill>
-          <a:ln>
-            <a:noFill/>
-          </a:ln>
-        </p:spPr>
-        <p:style>
-          <a:lnRef idx="2">
-            <a:schemeClr val="accent1">
-              <a:shade val="50000"/>
-            </a:schemeClr>
-          </a:lnRef>
-          <a:fillRef idx="1">
-            <a:schemeClr val="accent1"/>
-          </a:fillRef>
-          <a:effectRef idx="0">
-            <a:schemeClr val="accent1"/>
-          </a:effectRef>
-          <a:fontRef idx="minor">
-            <a:schemeClr val="lt1"/>
-          </a:fontRef>
-        </p:style>
-        <p:txBody>
-          <a:bodyPr rtlCol="0" anchor="ctr"/>
-          <a:lstStyle/>
-          <a:p>
-            <a:pPr algn="ctr"/>
-            <a:endParaRPr lang="en-US" dirty="0"/>
-          </a:p>
-        </p:txBody>
-      </p:sp>
-      <p:sp>
-        <p:nvSpPr>
-          <p:cNvPr id="2" name="TextBox 1">
-            <a:extLst>
-              <a:ext uri="{FF2B5EF4-FFF2-40B4-BE49-F238E27FC236}">
-                <a16:creationId xmlns:a16="http://schemas.microsoft.com/office/drawing/2014/main" id="{549FBF46-2A4E-45D5-9682-423BACB68B64}"/>
-              </a:ext>
-            </a:extLst>
-          </p:cNvPr>
-          <p:cNvSpPr txBox="1"/>
-          <p:nvPr/>
-        </p:nvSpPr>
-        <p:spPr>
-          <a:xfrm>
-            <a:off x="278110" y="346759"/>
-            <a:ext cx="3007717" cy="646331"/>
-          </a:xfrm>
-          <a:prstGeom prst="rect">
-            <a:avLst/>
-          </a:prstGeom>
-          <a:noFill/>
-        </p:spPr>
-        <p:txBody>
-          <a:bodyPr wrap="square" rtlCol="0">
-            <a:spAutoFit/>
-          </a:bodyPr>
-          <a:lstStyle/>
-          <a:p>
-            <a:pPr algn="ctr"/>
-            <a:r>
-              <a:rPr lang="en-US" sz="3600" dirty="0" err="1">
-                <a:solidFill>
-                  <a:schemeClr val="bg1"/>
-                </a:solidFill>
-                <a:latin typeface="Poppins"/>
-              </a:rPr>
-              <a:t>ZenSub</a:t>
-            </a:r>
-            <a:endParaRPr lang="en-US" sz="3600" dirty="0">
-              <a:solidFill>
-                <a:schemeClr val="bg1"/>
-              </a:solidFill>
-              <a:latin typeface="Poppins"/>
-            </a:endParaRPr>
-          </a:p>
-        </p:txBody>
-      </p:sp>
-    </p:spTree>
-    <p:extLst>
-      <p:ext uri="{BB962C8B-B14F-4D97-AF65-F5344CB8AC3E}">
-        <p14:creationId xmlns:p14="http://schemas.microsoft.com/office/powerpoint/2010/main" val="1069654171"/>
-      </p:ext>
-    </p:extLst>
-  </p:cSld>
-  <p:clrMapOvr>
-    <a:masterClrMapping/>
-  </p:clrMapOvr>
-</p:sld>
-</file>
-
-<file path=ppt/slides/slide28.xml><?xml version="1.0" encoding="utf-8"?>
+<file path=ppt/slides/slide29.xml><?xml version="1.0" encoding="utf-8"?>
 <p:sld xmlns:a="http://schemas.openxmlformats.org/drawingml/2006/main" xmlns:r="http://schemas.openxmlformats.org/officeDocument/2006/relationships" xmlns:p="http://schemas.openxmlformats.org/presentationml/2006/main">
   <p:cSld>
     <p:spTree>
@@ -8433,144 +8712,6 @@
     <p:extLst>
       <p:ext uri="{BB962C8B-B14F-4D97-AF65-F5344CB8AC3E}">
         <p14:creationId xmlns:p14="http://schemas.microsoft.com/office/powerpoint/2010/main" val="701272778"/>
-      </p:ext>
-    </p:extLst>
-  </p:cSld>
-  <p:clrMapOvr>
-    <a:masterClrMapping/>
-  </p:clrMapOvr>
-</p:sld>
-</file>
-
-<file path=ppt/slides/slide29.xml><?xml version="1.0" encoding="utf-8"?>
-<p:sld xmlns:a="http://schemas.openxmlformats.org/drawingml/2006/main" xmlns:r="http://schemas.openxmlformats.org/officeDocument/2006/relationships" xmlns:p="http://schemas.openxmlformats.org/presentationml/2006/main">
-  <p:cSld>
-    <p:spTree>
-      <p:nvGrpSpPr>
-        <p:cNvPr id="1" name=""/>
-        <p:cNvGrpSpPr/>
-        <p:nvPr/>
-      </p:nvGrpSpPr>
-      <p:grpSpPr>
-        <a:xfrm>
-          <a:off x="0" y="0"/>
-          <a:ext cx="0" cy="0"/>
-          <a:chOff x="0" y="0"/>
-          <a:chExt cx="0" cy="0"/>
-        </a:xfrm>
-      </p:grpSpPr>
-      <p:sp>
-        <p:nvSpPr>
-          <p:cNvPr id="4" name="Rectangle: Rounded Corners 3">
-            <a:extLst>
-              <a:ext uri="{FF2B5EF4-FFF2-40B4-BE49-F238E27FC236}">
-                <a16:creationId xmlns:a16="http://schemas.microsoft.com/office/drawing/2014/main" id="{8D6D9DF0-36ED-4863-B918-F6735D13A7C1}"/>
-              </a:ext>
-            </a:extLst>
-          </p:cNvPr>
-          <p:cNvSpPr/>
-          <p:nvPr/>
-        </p:nvSpPr>
-        <p:spPr>
-          <a:xfrm>
-            <a:off x="0" y="0"/>
-            <a:ext cx="3563938" cy="1187450"/>
-          </a:xfrm>
-          <a:prstGeom prst="roundRect">
-            <a:avLst>
-              <a:gd name="adj" fmla="val 50000"/>
-            </a:avLst>
-          </a:prstGeom>
-          <a:gradFill flip="none" rotWithShape="1">
-            <a:gsLst>
-              <a:gs pos="26000">
-                <a:srgbClr val="663300"/>
-              </a:gs>
-              <a:gs pos="100000">
-                <a:srgbClr val="CC9900"/>
-              </a:gs>
-            </a:gsLst>
-            <a:lin ang="2700000" scaled="0"/>
-            <a:tileRect/>
-          </a:gradFill>
-          <a:ln>
-            <a:noFill/>
-          </a:ln>
-        </p:spPr>
-        <p:style>
-          <a:lnRef idx="2">
-            <a:schemeClr val="accent1">
-              <a:shade val="50000"/>
-            </a:schemeClr>
-          </a:lnRef>
-          <a:fillRef idx="1">
-            <a:schemeClr val="accent1"/>
-          </a:fillRef>
-          <a:effectRef idx="0">
-            <a:schemeClr val="accent1"/>
-          </a:effectRef>
-          <a:fontRef idx="minor">
-            <a:schemeClr val="lt1"/>
-          </a:fontRef>
-        </p:style>
-        <p:txBody>
-          <a:bodyPr rtlCol="0" anchor="ctr"/>
-          <a:lstStyle/>
-          <a:p>
-            <a:pPr algn="ctr"/>
-            <a:endParaRPr lang="en-US" dirty="0"/>
-          </a:p>
-        </p:txBody>
-      </p:sp>
-      <p:sp>
-        <p:nvSpPr>
-          <p:cNvPr id="2" name="TextBox 1">
-            <a:extLst>
-              <a:ext uri="{FF2B5EF4-FFF2-40B4-BE49-F238E27FC236}">
-                <a16:creationId xmlns:a16="http://schemas.microsoft.com/office/drawing/2014/main" id="{549FBF46-2A4E-45D5-9682-423BACB68B64}"/>
-              </a:ext>
-            </a:extLst>
-          </p:cNvPr>
-          <p:cNvSpPr txBox="1"/>
-          <p:nvPr/>
-        </p:nvSpPr>
-        <p:spPr>
-          <a:xfrm>
-            <a:off x="278110" y="270559"/>
-            <a:ext cx="3007717" cy="646331"/>
-          </a:xfrm>
-          <a:prstGeom prst="rect">
-            <a:avLst/>
-          </a:prstGeom>
-          <a:noFill/>
-        </p:spPr>
-        <p:txBody>
-          <a:bodyPr wrap="square" rtlCol="0">
-            <a:spAutoFit/>
-          </a:bodyPr>
-          <a:lstStyle/>
-          <a:p>
-            <a:pPr algn="ctr"/>
-            <a:r>
-              <a:rPr lang="id-ID" sz="3600" dirty="0">
-                <a:solidFill>
-                  <a:schemeClr val="bg1"/>
-                </a:solidFill>
-              </a:rPr>
-              <a:t>Anitoki</a:t>
-            </a:r>
-            <a:endParaRPr lang="en-US" sz="3600" dirty="0">
-              <a:solidFill>
-                <a:schemeClr val="bg1"/>
-              </a:solidFill>
-            </a:endParaRPr>
-          </a:p>
-        </p:txBody>
-      </p:sp>
-    </p:spTree>
-    <p:extLst>
-      <p:ext uri="{BB962C8B-B14F-4D97-AF65-F5344CB8AC3E}">
-        <p14:creationId xmlns:p14="http://schemas.microsoft.com/office/powerpoint/2010/main" val="1736296804"/>
       </p:ext>
     </p:extLst>
   </p:cSld>
@@ -8823,10 +8964,10 @@
           <a:gradFill flip="none" rotWithShape="1">
             <a:gsLst>
               <a:gs pos="26000">
-                <a:srgbClr val="020321"/>
+                <a:srgbClr val="481F67"/>
               </a:gs>
               <a:gs pos="100000">
-                <a:srgbClr val="202D91"/>
+                <a:srgbClr val="E4ABDA"/>
               </a:gs>
             </a:gsLst>
             <a:lin ang="2700000" scaled="0"/>
@@ -8863,10 +9004,10 @@
       </p:sp>
       <p:sp>
         <p:nvSpPr>
-          <p:cNvPr id="3" name="TextBox 2">
+          <p:cNvPr id="2" name="TextBox 1">
             <a:extLst>
               <a:ext uri="{FF2B5EF4-FFF2-40B4-BE49-F238E27FC236}">
-                <a16:creationId xmlns:a16="http://schemas.microsoft.com/office/drawing/2014/main" id="{7872C401-B53A-4101-AE6A-EACD671B1CDD}"/>
+                <a16:creationId xmlns:a16="http://schemas.microsoft.com/office/drawing/2014/main" id="{549FBF46-2A4E-45D5-9682-423BACB68B64}"/>
               </a:ext>
             </a:extLst>
           </p:cNvPr>
@@ -8875,8 +9016,8 @@
         </p:nvSpPr>
         <p:spPr>
           <a:xfrm>
-            <a:off x="387509" y="140424"/>
-            <a:ext cx="2788920" cy="769441"/>
+            <a:off x="278110" y="346759"/>
+            <a:ext cx="3007717" cy="646331"/>
           </a:xfrm>
           <a:prstGeom prst="rect">
             <a:avLst/>
@@ -8891,19 +9032,19 @@
           <a:p>
             <a:pPr algn="ctr"/>
             <a:r>
-              <a:rPr lang="id-ID" sz="4400" dirty="0">
+              <a:rPr lang="en-US" sz="3600" dirty="0" err="1">
                 <a:solidFill>
                   <a:schemeClr val="bg1"/>
                 </a:solidFill>
-                <a:latin typeface="Single Fighter" panose="02000500000000000000" pitchFamily="50" charset="0"/>
+                <a:latin typeface="Poppins"/>
               </a:rPr>
-              <a:t>KAZEFURI</a:t>
+              <a:t>ZenSub</a:t>
             </a:r>
-            <a:endParaRPr lang="en-US" sz="4400" dirty="0">
+            <a:endParaRPr lang="en-US" sz="3600" dirty="0">
               <a:solidFill>
                 <a:schemeClr val="bg1"/>
               </a:solidFill>
-              <a:latin typeface="Single Fighter" panose="02000500000000000000" pitchFamily="50" charset="0"/>
+              <a:latin typeface="Poppins"/>
             </a:endParaRPr>
           </a:p>
         </p:txBody>
@@ -8911,7 +9052,7 @@
     </p:spTree>
     <p:extLst>
       <p:ext uri="{BB962C8B-B14F-4D97-AF65-F5344CB8AC3E}">
-        <p14:creationId xmlns:p14="http://schemas.microsoft.com/office/powerpoint/2010/main" val="3545101030"/>
+        <p14:creationId xmlns:p14="http://schemas.microsoft.com/office/powerpoint/2010/main" val="1069654171"/>
       </p:ext>
     </p:extLst>
   </p:cSld>
@@ -8922,6 +9063,269 @@
 </file>
 
 <file path=ppt/slides/slide31.xml><?xml version="1.0" encoding="utf-8"?>
+<p:sld xmlns:a="http://schemas.openxmlformats.org/drawingml/2006/main" xmlns:r="http://schemas.openxmlformats.org/officeDocument/2006/relationships" xmlns:p="http://schemas.openxmlformats.org/presentationml/2006/main">
+  <p:cSld>
+    <p:spTree>
+      <p:nvGrpSpPr>
+        <p:cNvPr id="1" name=""/>
+        <p:cNvGrpSpPr/>
+        <p:nvPr/>
+      </p:nvGrpSpPr>
+      <p:grpSpPr>
+        <a:xfrm>
+          <a:off x="0" y="0"/>
+          <a:ext cx="0" cy="0"/>
+          <a:chOff x="0" y="0"/>
+          <a:chExt cx="0" cy="0"/>
+        </a:xfrm>
+      </p:grpSpPr>
+      <p:sp>
+        <p:nvSpPr>
+          <p:cNvPr id="4" name="Rectangle: Rounded Corners 3">
+            <a:extLst>
+              <a:ext uri="{FF2B5EF4-FFF2-40B4-BE49-F238E27FC236}">
+                <a16:creationId xmlns:a16="http://schemas.microsoft.com/office/drawing/2014/main" id="{8D6D9DF0-36ED-4863-B918-F6735D13A7C1}"/>
+              </a:ext>
+            </a:extLst>
+          </p:cNvPr>
+          <p:cNvSpPr/>
+          <p:nvPr/>
+        </p:nvSpPr>
+        <p:spPr>
+          <a:xfrm>
+            <a:off x="0" y="0"/>
+            <a:ext cx="3563938" cy="1187450"/>
+          </a:xfrm>
+          <a:prstGeom prst="roundRect">
+            <a:avLst>
+              <a:gd name="adj" fmla="val 50000"/>
+            </a:avLst>
+          </a:prstGeom>
+          <a:gradFill flip="none" rotWithShape="1">
+            <a:gsLst>
+              <a:gs pos="30000">
+                <a:srgbClr val="B42F33"/>
+              </a:gs>
+              <a:gs pos="100000">
+                <a:srgbClr val="281B79"/>
+              </a:gs>
+            </a:gsLst>
+            <a:lin ang="2700000" scaled="0"/>
+            <a:tileRect/>
+          </a:gradFill>
+          <a:ln>
+            <a:noFill/>
+          </a:ln>
+        </p:spPr>
+        <p:style>
+          <a:lnRef idx="2">
+            <a:schemeClr val="accent1">
+              <a:shade val="50000"/>
+            </a:schemeClr>
+          </a:lnRef>
+          <a:fillRef idx="1">
+            <a:schemeClr val="accent1"/>
+          </a:fillRef>
+          <a:effectRef idx="0">
+            <a:schemeClr val="accent1"/>
+          </a:effectRef>
+          <a:fontRef idx="minor">
+            <a:schemeClr val="lt1"/>
+          </a:fontRef>
+        </p:style>
+        <p:txBody>
+          <a:bodyPr rtlCol="0" anchor="ctr"/>
+          <a:lstStyle/>
+          <a:p>
+            <a:pPr algn="ctr"/>
+            <a:endParaRPr lang="en-US" dirty="0"/>
+          </a:p>
+        </p:txBody>
+      </p:sp>
+      <p:pic>
+        <p:nvPicPr>
+          <p:cNvPr id="3074" name="Picture 2" descr="[webp-to-png output image]">
+            <a:extLst>
+              <a:ext uri="{FF2B5EF4-FFF2-40B4-BE49-F238E27FC236}">
+                <a16:creationId xmlns:a16="http://schemas.microsoft.com/office/drawing/2014/main" id="{8B09A652-E1F5-4F82-8C4F-C28AAC002534}"/>
+              </a:ext>
+            </a:extLst>
+          </p:cNvPr>
+          <p:cNvPicPr>
+            <a:picLocks noChangeAspect="1" noChangeArrowheads="1"/>
+          </p:cNvPicPr>
+          <p:nvPr/>
+        </p:nvPicPr>
+        <p:blipFill>
+          <a:blip r:embed="rId2">
+            <a:extLst>
+              <a:ext uri="{28A0092B-C50C-407E-A947-70E740481C1C}">
+                <a14:useLocalDpi xmlns:a14="http://schemas.microsoft.com/office/drawing/2010/main" val="0"/>
+              </a:ext>
+            </a:extLst>
+          </a:blip>
+          <a:srcRect/>
+          <a:stretch>
+            <a:fillRect/>
+          </a:stretch>
+        </p:blipFill>
+        <p:spPr bwMode="auto">
+          <a:xfrm>
+            <a:off x="315119" y="297741"/>
+            <a:ext cx="2933700" cy="591967"/>
+          </a:xfrm>
+          <a:prstGeom prst="rect">
+            <a:avLst/>
+          </a:prstGeom>
+          <a:noFill/>
+          <a:extLst>
+            <a:ext uri="{909E8E84-426E-40DD-AFC4-6F175D3DCCD1}">
+              <a14:hiddenFill xmlns:a14="http://schemas.microsoft.com/office/drawing/2010/main">
+                <a:solidFill>
+                  <a:srgbClr val="FFFFFF"/>
+                </a:solidFill>
+              </a14:hiddenFill>
+            </a:ext>
+          </a:extLst>
+        </p:spPr>
+      </p:pic>
+    </p:spTree>
+    <p:extLst>
+      <p:ext uri="{BB962C8B-B14F-4D97-AF65-F5344CB8AC3E}">
+        <p14:creationId xmlns:p14="http://schemas.microsoft.com/office/powerpoint/2010/main" val="2044909443"/>
+      </p:ext>
+    </p:extLst>
+  </p:cSld>
+  <p:clrMapOvr>
+    <a:masterClrMapping/>
+  </p:clrMapOvr>
+</p:sld>
+</file>
+
+<file path=ppt/slides/slide32.xml><?xml version="1.0" encoding="utf-8"?>
+<p:sld xmlns:a="http://schemas.openxmlformats.org/drawingml/2006/main" xmlns:r="http://schemas.openxmlformats.org/officeDocument/2006/relationships" xmlns:p="http://schemas.openxmlformats.org/presentationml/2006/main">
+  <p:cSld>
+    <p:spTree>
+      <p:nvGrpSpPr>
+        <p:cNvPr id="1" name=""/>
+        <p:cNvGrpSpPr/>
+        <p:nvPr/>
+      </p:nvGrpSpPr>
+      <p:grpSpPr>
+        <a:xfrm>
+          <a:off x="0" y="0"/>
+          <a:ext cx="0" cy="0"/>
+          <a:chOff x="0" y="0"/>
+          <a:chExt cx="0" cy="0"/>
+        </a:xfrm>
+      </p:grpSpPr>
+      <p:sp>
+        <p:nvSpPr>
+          <p:cNvPr id="4" name="Rectangle: Rounded Corners 3">
+            <a:extLst>
+              <a:ext uri="{FF2B5EF4-FFF2-40B4-BE49-F238E27FC236}">
+                <a16:creationId xmlns:a16="http://schemas.microsoft.com/office/drawing/2014/main" id="{8D6D9DF0-36ED-4863-B918-F6735D13A7C1}"/>
+              </a:ext>
+            </a:extLst>
+          </p:cNvPr>
+          <p:cNvSpPr/>
+          <p:nvPr/>
+        </p:nvSpPr>
+        <p:spPr>
+          <a:xfrm>
+            <a:off x="0" y="0"/>
+            <a:ext cx="3563938" cy="1187450"/>
+          </a:xfrm>
+          <a:prstGeom prst="roundRect">
+            <a:avLst>
+              <a:gd name="adj" fmla="val 50000"/>
+            </a:avLst>
+          </a:prstGeom>
+          <a:gradFill flip="none" rotWithShape="1">
+            <a:gsLst>
+              <a:gs pos="30000">
+                <a:srgbClr val="685454"/>
+              </a:gs>
+              <a:gs pos="100000">
+                <a:srgbClr val="C23A4C"/>
+              </a:gs>
+            </a:gsLst>
+            <a:lin ang="2700000" scaled="0"/>
+            <a:tileRect/>
+          </a:gradFill>
+          <a:ln>
+            <a:noFill/>
+          </a:ln>
+        </p:spPr>
+        <p:style>
+          <a:lnRef idx="2">
+            <a:schemeClr val="accent1">
+              <a:shade val="50000"/>
+            </a:schemeClr>
+          </a:lnRef>
+          <a:fillRef idx="1">
+            <a:schemeClr val="accent1"/>
+          </a:fillRef>
+          <a:effectRef idx="0">
+            <a:schemeClr val="accent1"/>
+          </a:effectRef>
+          <a:fontRef idx="minor">
+            <a:schemeClr val="lt1"/>
+          </a:fontRef>
+        </p:style>
+        <p:txBody>
+          <a:bodyPr rtlCol="0" anchor="ctr"/>
+          <a:lstStyle/>
+          <a:p>
+            <a:pPr algn="ctr"/>
+            <a:endParaRPr lang="en-US" dirty="0"/>
+          </a:p>
+        </p:txBody>
+      </p:sp>
+      <p:pic>
+        <p:nvPicPr>
+          <p:cNvPr id="2" name="Picture 1">
+            <a:extLst>
+              <a:ext uri="{FF2B5EF4-FFF2-40B4-BE49-F238E27FC236}">
+                <a16:creationId xmlns:a16="http://schemas.microsoft.com/office/drawing/2014/main" id="{16B8992A-5E69-4B8C-A724-B6D980F84F67}"/>
+              </a:ext>
+            </a:extLst>
+          </p:cNvPr>
+          <p:cNvPicPr>
+            <a:picLocks noChangeAspect="1"/>
+          </p:cNvPicPr>
+          <p:nvPr/>
+        </p:nvPicPr>
+        <p:blipFill>
+          <a:blip r:embed="rId2"/>
+          <a:stretch>
+            <a:fillRect/>
+          </a:stretch>
+        </p:blipFill>
+        <p:spPr>
+          <a:xfrm>
+            <a:off x="424656" y="335835"/>
+            <a:ext cx="2714625" cy="515779"/>
+          </a:xfrm>
+          <a:prstGeom prst="rect">
+            <a:avLst/>
+          </a:prstGeom>
+        </p:spPr>
+      </p:pic>
+    </p:spTree>
+    <p:extLst>
+      <p:ext uri="{BB962C8B-B14F-4D97-AF65-F5344CB8AC3E}">
+        <p14:creationId xmlns:p14="http://schemas.microsoft.com/office/powerpoint/2010/main" val="2001192933"/>
+      </p:ext>
+    </p:extLst>
+  </p:cSld>
+  <p:clrMapOvr>
+    <a:masterClrMapping/>
+  </p:clrMapOvr>
+</p:sld>
+</file>
+
+<file path=ppt/slides/slide33.xml><?xml version="1.0" encoding="utf-8"?>
 <p:sld xmlns:a="http://schemas.openxmlformats.org/drawingml/2006/main" xmlns:r="http://schemas.openxmlformats.org/officeDocument/2006/relationships" xmlns:p="http://schemas.openxmlformats.org/presentationml/2006/main">
   <p:cSld>
     <p:spTree>
@@ -9070,7 +9474,427 @@
 </p:sld>
 </file>
 
-<file path=ppt/slides/slide32.xml><?xml version="1.0" encoding="utf-8"?>
+<file path=ppt/slides/slide34.xml><?xml version="1.0" encoding="utf-8"?>
+<p:sld xmlns:a="http://schemas.openxmlformats.org/drawingml/2006/main" xmlns:r="http://schemas.openxmlformats.org/officeDocument/2006/relationships" xmlns:p="http://schemas.openxmlformats.org/presentationml/2006/main">
+  <p:cSld>
+    <p:spTree>
+      <p:nvGrpSpPr>
+        <p:cNvPr id="1" name=""/>
+        <p:cNvGrpSpPr/>
+        <p:nvPr/>
+      </p:nvGrpSpPr>
+      <p:grpSpPr>
+        <a:xfrm>
+          <a:off x="0" y="0"/>
+          <a:ext cx="0" cy="0"/>
+          <a:chOff x="0" y="0"/>
+          <a:chExt cx="0" cy="0"/>
+        </a:xfrm>
+      </p:grpSpPr>
+      <p:sp>
+        <p:nvSpPr>
+          <p:cNvPr id="4" name="Rectangle: Rounded Corners 3">
+            <a:extLst>
+              <a:ext uri="{FF2B5EF4-FFF2-40B4-BE49-F238E27FC236}">
+                <a16:creationId xmlns:a16="http://schemas.microsoft.com/office/drawing/2014/main" id="{8D6D9DF0-36ED-4863-B918-F6735D13A7C1}"/>
+              </a:ext>
+            </a:extLst>
+          </p:cNvPr>
+          <p:cNvSpPr/>
+          <p:nvPr/>
+        </p:nvSpPr>
+        <p:spPr>
+          <a:xfrm>
+            <a:off x="0" y="0"/>
+            <a:ext cx="3563938" cy="1187450"/>
+          </a:xfrm>
+          <a:prstGeom prst="roundRect">
+            <a:avLst>
+              <a:gd name="adj" fmla="val 50000"/>
+            </a:avLst>
+          </a:prstGeom>
+          <a:gradFill flip="none" rotWithShape="1">
+            <a:gsLst>
+              <a:gs pos="0">
+                <a:srgbClr val="000000"/>
+              </a:gs>
+              <a:gs pos="100000">
+                <a:srgbClr val="C15223"/>
+              </a:gs>
+            </a:gsLst>
+            <a:lin ang="2700000" scaled="0"/>
+            <a:tileRect/>
+          </a:gradFill>
+          <a:ln>
+            <a:noFill/>
+          </a:ln>
+        </p:spPr>
+        <p:style>
+          <a:lnRef idx="2">
+            <a:schemeClr val="accent1">
+              <a:shade val="50000"/>
+            </a:schemeClr>
+          </a:lnRef>
+          <a:fillRef idx="1">
+            <a:schemeClr val="accent1"/>
+          </a:fillRef>
+          <a:effectRef idx="0">
+            <a:schemeClr val="accent1"/>
+          </a:effectRef>
+          <a:fontRef idx="minor">
+            <a:schemeClr val="lt1"/>
+          </a:fontRef>
+        </p:style>
+        <p:txBody>
+          <a:bodyPr rtlCol="0" anchor="ctr"/>
+          <a:lstStyle/>
+          <a:p>
+            <a:pPr algn="ctr"/>
+            <a:endParaRPr lang="en-US" dirty="0"/>
+          </a:p>
+        </p:txBody>
+      </p:sp>
+      <p:pic>
+        <p:nvPicPr>
+          <p:cNvPr id="5122" name="Picture 2" descr="https://anoboy.org/wp-content/uploads/2018/12/newlogo-1.png">
+            <a:extLst>
+              <a:ext uri="{FF2B5EF4-FFF2-40B4-BE49-F238E27FC236}">
+                <a16:creationId xmlns:a16="http://schemas.microsoft.com/office/drawing/2014/main" id="{9E0E7F98-38F1-4458-AD2D-F1A18A257714}"/>
+              </a:ext>
+            </a:extLst>
+          </p:cNvPr>
+          <p:cNvPicPr>
+            <a:picLocks noChangeAspect="1" noChangeArrowheads="1"/>
+          </p:cNvPicPr>
+          <p:nvPr/>
+        </p:nvPicPr>
+        <p:blipFill>
+          <a:blip r:embed="rId2">
+            <a:extLst>
+              <a:ext uri="{28A0092B-C50C-407E-A947-70E740481C1C}">
+                <a14:useLocalDpi xmlns:a14="http://schemas.microsoft.com/office/drawing/2010/main" val="0"/>
+              </a:ext>
+            </a:extLst>
+          </a:blip>
+          <a:srcRect/>
+          <a:stretch>
+            <a:fillRect/>
+          </a:stretch>
+        </p:blipFill>
+        <p:spPr bwMode="auto">
+          <a:xfrm>
+            <a:off x="362140" y="280987"/>
+            <a:ext cx="2839657" cy="625475"/>
+          </a:xfrm>
+          <a:prstGeom prst="rect">
+            <a:avLst/>
+          </a:prstGeom>
+          <a:noFill/>
+          <a:extLst>
+            <a:ext uri="{909E8E84-426E-40DD-AFC4-6F175D3DCCD1}">
+              <a14:hiddenFill xmlns:a14="http://schemas.microsoft.com/office/drawing/2010/main">
+                <a:solidFill>
+                  <a:srgbClr val="FFFFFF"/>
+                </a:solidFill>
+              </a14:hiddenFill>
+            </a:ext>
+          </a:extLst>
+        </p:spPr>
+      </p:pic>
+    </p:spTree>
+    <p:extLst>
+      <p:ext uri="{BB962C8B-B14F-4D97-AF65-F5344CB8AC3E}">
+        <p14:creationId xmlns:p14="http://schemas.microsoft.com/office/powerpoint/2010/main" val="743538766"/>
+      </p:ext>
+    </p:extLst>
+  </p:cSld>
+  <p:clrMapOvr>
+    <a:masterClrMapping/>
+  </p:clrMapOvr>
+</p:sld>
+</file>
+
+<file path=ppt/slides/slide35.xml><?xml version="1.0" encoding="utf-8"?>
+<p:sld xmlns:a="http://schemas.openxmlformats.org/drawingml/2006/main" xmlns:r="http://schemas.openxmlformats.org/officeDocument/2006/relationships" xmlns:p="http://schemas.openxmlformats.org/presentationml/2006/main">
+  <p:cSld>
+    <p:spTree>
+      <p:nvGrpSpPr>
+        <p:cNvPr id="1" name=""/>
+        <p:cNvGrpSpPr/>
+        <p:nvPr/>
+      </p:nvGrpSpPr>
+      <p:grpSpPr>
+        <a:xfrm>
+          <a:off x="0" y="0"/>
+          <a:ext cx="0" cy="0"/>
+          <a:chOff x="0" y="0"/>
+          <a:chExt cx="0" cy="0"/>
+        </a:xfrm>
+      </p:grpSpPr>
+      <p:sp>
+        <p:nvSpPr>
+          <p:cNvPr id="4" name="Rectangle: Rounded Corners 3">
+            <a:extLst>
+              <a:ext uri="{FF2B5EF4-FFF2-40B4-BE49-F238E27FC236}">
+                <a16:creationId xmlns:a16="http://schemas.microsoft.com/office/drawing/2014/main" id="{8D6D9DF0-36ED-4863-B918-F6735D13A7C1}"/>
+              </a:ext>
+            </a:extLst>
+          </p:cNvPr>
+          <p:cNvSpPr/>
+          <p:nvPr/>
+        </p:nvSpPr>
+        <p:spPr>
+          <a:xfrm>
+            <a:off x="0" y="0"/>
+            <a:ext cx="3563938" cy="1187450"/>
+          </a:xfrm>
+          <a:prstGeom prst="roundRect">
+            <a:avLst>
+              <a:gd name="adj" fmla="val 50000"/>
+            </a:avLst>
+          </a:prstGeom>
+          <a:gradFill flip="none" rotWithShape="1">
+            <a:gsLst>
+              <a:gs pos="27000">
+                <a:srgbClr val="000000"/>
+              </a:gs>
+              <a:gs pos="100000">
+                <a:srgbClr val="C15223"/>
+              </a:gs>
+            </a:gsLst>
+            <a:lin ang="2700000" scaled="0"/>
+            <a:tileRect/>
+          </a:gradFill>
+          <a:ln>
+            <a:noFill/>
+          </a:ln>
+        </p:spPr>
+        <p:style>
+          <a:lnRef idx="2">
+            <a:schemeClr val="accent1">
+              <a:shade val="50000"/>
+            </a:schemeClr>
+          </a:lnRef>
+          <a:fillRef idx="1">
+            <a:schemeClr val="accent1"/>
+          </a:fillRef>
+          <a:effectRef idx="0">
+            <a:schemeClr val="accent1"/>
+          </a:effectRef>
+          <a:fontRef idx="minor">
+            <a:schemeClr val="lt1"/>
+          </a:fontRef>
+        </p:style>
+        <p:txBody>
+          <a:bodyPr rtlCol="0" anchor="ctr"/>
+          <a:lstStyle/>
+          <a:p>
+            <a:pPr algn="ctr"/>
+            <a:endParaRPr lang="en-US" dirty="0"/>
+          </a:p>
+        </p:txBody>
+      </p:sp>
+      <p:pic>
+        <p:nvPicPr>
+          <p:cNvPr id="6146" name="Picture 2" descr="https://img.akubebas.com/images/logo-indo.png">
+            <a:extLst>
+              <a:ext uri="{FF2B5EF4-FFF2-40B4-BE49-F238E27FC236}">
+                <a16:creationId xmlns:a16="http://schemas.microsoft.com/office/drawing/2014/main" id="{B278300F-7126-4621-A21C-922518AC2535}"/>
+              </a:ext>
+            </a:extLst>
+          </p:cNvPr>
+          <p:cNvPicPr>
+            <a:picLocks noChangeAspect="1" noChangeArrowheads="1"/>
+          </p:cNvPicPr>
+          <p:nvPr/>
+        </p:nvPicPr>
+        <p:blipFill>
+          <a:blip r:embed="rId2">
+            <a:extLst>
+              <a:ext uri="{28A0092B-C50C-407E-A947-70E740481C1C}">
+                <a14:useLocalDpi xmlns:a14="http://schemas.microsoft.com/office/drawing/2010/main" val="0"/>
+              </a:ext>
+            </a:extLst>
+          </a:blip>
+          <a:srcRect/>
+          <a:stretch>
+            <a:fillRect/>
+          </a:stretch>
+        </p:blipFill>
+        <p:spPr bwMode="auto">
+          <a:xfrm>
+            <a:off x="523081" y="292301"/>
+            <a:ext cx="2517776" cy="602847"/>
+          </a:xfrm>
+          <a:prstGeom prst="rect">
+            <a:avLst/>
+          </a:prstGeom>
+          <a:noFill/>
+          <a:extLst>
+            <a:ext uri="{909E8E84-426E-40DD-AFC4-6F175D3DCCD1}">
+              <a14:hiddenFill xmlns:a14="http://schemas.microsoft.com/office/drawing/2010/main">
+                <a:solidFill>
+                  <a:srgbClr val="FFFFFF"/>
+                </a:solidFill>
+              </a14:hiddenFill>
+            </a:ext>
+          </a:extLst>
+        </p:spPr>
+      </p:pic>
+    </p:spTree>
+    <p:extLst>
+      <p:ext uri="{BB962C8B-B14F-4D97-AF65-F5344CB8AC3E}">
+        <p14:creationId xmlns:p14="http://schemas.microsoft.com/office/powerpoint/2010/main" val="3562251831"/>
+      </p:ext>
+    </p:extLst>
+  </p:cSld>
+  <p:clrMapOvr>
+    <a:masterClrMapping/>
+  </p:clrMapOvr>
+</p:sld>
+</file>
+
+<file path=ppt/slides/slide36.xml><?xml version="1.0" encoding="utf-8"?>
+<p:sld xmlns:a="http://schemas.openxmlformats.org/drawingml/2006/main" xmlns:r="http://schemas.openxmlformats.org/officeDocument/2006/relationships" xmlns:p="http://schemas.openxmlformats.org/presentationml/2006/main">
+  <p:cSld>
+    <p:spTree>
+      <p:nvGrpSpPr>
+        <p:cNvPr id="1" name=""/>
+        <p:cNvGrpSpPr/>
+        <p:nvPr/>
+      </p:nvGrpSpPr>
+      <p:grpSpPr>
+        <a:xfrm>
+          <a:off x="0" y="0"/>
+          <a:ext cx="0" cy="0"/>
+          <a:chOff x="0" y="0"/>
+          <a:chExt cx="0" cy="0"/>
+        </a:xfrm>
+      </p:grpSpPr>
+      <p:sp>
+        <p:nvSpPr>
+          <p:cNvPr id="4" name="Rectangle: Rounded Corners 3">
+            <a:extLst>
+              <a:ext uri="{FF2B5EF4-FFF2-40B4-BE49-F238E27FC236}">
+                <a16:creationId xmlns:a16="http://schemas.microsoft.com/office/drawing/2014/main" id="{8D6D9DF0-36ED-4863-B918-F6735D13A7C1}"/>
+              </a:ext>
+            </a:extLst>
+          </p:cNvPr>
+          <p:cNvSpPr/>
+          <p:nvPr/>
+        </p:nvSpPr>
+        <p:spPr>
+          <a:xfrm>
+            <a:off x="0" y="0"/>
+            <a:ext cx="3563938" cy="1187450"/>
+          </a:xfrm>
+          <a:prstGeom prst="roundRect">
+            <a:avLst>
+              <a:gd name="adj" fmla="val 50000"/>
+            </a:avLst>
+          </a:prstGeom>
+          <a:gradFill flip="none" rotWithShape="1">
+            <a:gsLst>
+              <a:gs pos="30000">
+                <a:srgbClr val="000000"/>
+              </a:gs>
+              <a:gs pos="100000">
+                <a:srgbClr val="7B7B7B"/>
+              </a:gs>
+            </a:gsLst>
+            <a:lin ang="2700000" scaled="0"/>
+            <a:tileRect/>
+          </a:gradFill>
+          <a:ln>
+            <a:noFill/>
+          </a:ln>
+        </p:spPr>
+        <p:style>
+          <a:lnRef idx="2">
+            <a:schemeClr val="accent1">
+              <a:shade val="50000"/>
+            </a:schemeClr>
+          </a:lnRef>
+          <a:fillRef idx="1">
+            <a:schemeClr val="accent1"/>
+          </a:fillRef>
+          <a:effectRef idx="0">
+            <a:schemeClr val="accent1"/>
+          </a:effectRef>
+          <a:fontRef idx="minor">
+            <a:schemeClr val="lt1"/>
+          </a:fontRef>
+        </p:style>
+        <p:txBody>
+          <a:bodyPr rtlCol="0" anchor="ctr"/>
+          <a:lstStyle/>
+          <a:p>
+            <a:pPr algn="ctr"/>
+            <a:endParaRPr lang="en-US" dirty="0"/>
+          </a:p>
+        </p:txBody>
+      </p:sp>
+      <p:pic>
+        <p:nvPicPr>
+          <p:cNvPr id="2052" name="Picture 4" descr="https://nontonanime.site/nonton-anime.png">
+            <a:extLst>
+              <a:ext uri="{FF2B5EF4-FFF2-40B4-BE49-F238E27FC236}">
+                <a16:creationId xmlns:a16="http://schemas.microsoft.com/office/drawing/2014/main" id="{633906D9-E483-4696-A15C-B3E96C439F0C}"/>
+              </a:ext>
+            </a:extLst>
+          </p:cNvPr>
+          <p:cNvPicPr>
+            <a:picLocks noChangeAspect="1" noChangeArrowheads="1"/>
+          </p:cNvPicPr>
+          <p:nvPr/>
+        </p:nvPicPr>
+        <p:blipFill>
+          <a:blip r:embed="rId2">
+            <a:extLst>
+              <a:ext uri="{28A0092B-C50C-407E-A947-70E740481C1C}">
+                <a14:useLocalDpi xmlns:a14="http://schemas.microsoft.com/office/drawing/2010/main" val="0"/>
+              </a:ext>
+            </a:extLst>
+          </a:blip>
+          <a:srcRect/>
+          <a:stretch>
+            <a:fillRect/>
+          </a:stretch>
+        </p:blipFill>
+        <p:spPr bwMode="auto">
+          <a:xfrm>
+            <a:off x="186531" y="323673"/>
+            <a:ext cx="3190875" cy="540103"/>
+          </a:xfrm>
+          <a:prstGeom prst="rect">
+            <a:avLst/>
+          </a:prstGeom>
+          <a:noFill/>
+          <a:extLst>
+            <a:ext uri="{909E8E84-426E-40DD-AFC4-6F175D3DCCD1}">
+              <a14:hiddenFill xmlns:a14="http://schemas.microsoft.com/office/drawing/2010/main">
+                <a:solidFill>
+                  <a:srgbClr val="FFFFFF"/>
+                </a:solidFill>
+              </a14:hiddenFill>
+            </a:ext>
+          </a:extLst>
+        </p:spPr>
+      </p:pic>
+    </p:spTree>
+    <p:extLst>
+      <p:ext uri="{BB962C8B-B14F-4D97-AF65-F5344CB8AC3E}">
+        <p14:creationId xmlns:p14="http://schemas.microsoft.com/office/powerpoint/2010/main" val="2343881463"/>
+      </p:ext>
+    </p:extLst>
+  </p:cSld>
+  <p:clrMapOvr>
+    <a:masterClrMapping/>
+  </p:clrMapOvr>
+</p:sld>
+</file>
+
+<file path=ppt/slides/slide37.xml><?xml version="1.0" encoding="utf-8"?>
 <p:sld xmlns:a="http://schemas.openxmlformats.org/drawingml/2006/main" xmlns:r="http://schemas.openxmlformats.org/officeDocument/2006/relationships" xmlns:p="http://schemas.openxmlformats.org/presentationml/2006/main">
   <p:cSld>
     <p:spTree>
@@ -9210,7 +10034,7 @@
 </p:sld>
 </file>
 
-<file path=ppt/slides/slide33.xml><?xml version="1.0" encoding="utf-8"?>
+<file path=ppt/slides/slide38.xml><?xml version="1.0" encoding="utf-8"?>
 <p:sld xmlns:a="http://schemas.openxmlformats.org/drawingml/2006/main" xmlns:r="http://schemas.openxmlformats.org/officeDocument/2006/relationships" xmlns:p="http://schemas.openxmlformats.org/presentationml/2006/main">
   <p:cSld>
     <p:spTree>
@@ -9350,7 +10174,7 @@
 </p:sld>
 </file>
 
-<file path=ppt/slides/slide34.xml><?xml version="1.0" encoding="utf-8"?>
+<file path=ppt/slides/slide39.xml><?xml version="1.0" encoding="utf-8"?>
 <p:sld xmlns:a="http://schemas.openxmlformats.org/drawingml/2006/main" xmlns:r="http://schemas.openxmlformats.org/officeDocument/2006/relationships" xmlns:p="http://schemas.openxmlformats.org/presentationml/2006/main">
   <p:cSld>
     <p:spTree>
@@ -9391,11 +10215,11 @@
           </a:prstGeom>
           <a:gradFill flip="none" rotWithShape="1">
             <a:gsLst>
-              <a:gs pos="30000">
-                <a:srgbClr val="000000"/>
+              <a:gs pos="26000">
+                <a:srgbClr val="BA3D31"/>
               </a:gs>
               <a:gs pos="100000">
-                <a:srgbClr val="7B7B7B"/>
+                <a:srgbClr val="E74B3C"/>
               </a:gs>
             </a:gsLst>
             <a:lin ang="2700000" scaled="0"/>
@@ -9430,749 +10254,143 @@
           </a:p>
         </p:txBody>
       </p:sp>
-      <p:pic>
-        <p:nvPicPr>
-          <p:cNvPr id="2052" name="Picture 4" descr="https://nontonanime.site/nonton-anime.png">
+      <p:grpSp>
+        <p:nvGrpSpPr>
+          <p:cNvPr id="3" name="Group 2">
             <a:extLst>
               <a:ext uri="{FF2B5EF4-FFF2-40B4-BE49-F238E27FC236}">
-                <a16:creationId xmlns:a16="http://schemas.microsoft.com/office/drawing/2014/main" id="{633906D9-E483-4696-A15C-B3E96C439F0C}"/>
+                <a16:creationId xmlns:a16="http://schemas.microsoft.com/office/drawing/2014/main" id="{2604B08D-9533-4334-93DB-3625E4855428}"/>
               </a:ext>
             </a:extLst>
           </p:cNvPr>
-          <p:cNvPicPr>
-            <a:picLocks noChangeAspect="1" noChangeArrowheads="1"/>
-          </p:cNvPicPr>
+          <p:cNvGrpSpPr/>
           <p:nvPr/>
-        </p:nvPicPr>
-        <p:blipFill>
-          <a:blip r:embed="rId2">
-            <a:extLst>
-              <a:ext uri="{28A0092B-C50C-407E-A947-70E740481C1C}">
-                <a14:useLocalDpi xmlns:a14="http://schemas.microsoft.com/office/drawing/2010/main" val="0"/>
-              </a:ext>
-            </a:extLst>
-          </a:blip>
-          <a:srcRect/>
-          <a:stretch>
-            <a:fillRect/>
-          </a:stretch>
-        </p:blipFill>
-        <p:spPr bwMode="auto">
+        </p:nvGrpSpPr>
+        <p:grpSpPr>
           <a:xfrm>
-            <a:off x="186531" y="323673"/>
-            <a:ext cx="3190875" cy="540103"/>
+            <a:off x="480219" y="179387"/>
+            <a:ext cx="2603500" cy="828675"/>
+            <a:chOff x="406400" y="179387"/>
+            <a:chExt cx="2603500" cy="828675"/>
           </a:xfrm>
-          <a:prstGeom prst="rect">
-            <a:avLst/>
-          </a:prstGeom>
-          <a:noFill/>
-          <a:extLst>
-            <a:ext uri="{909E8E84-426E-40DD-AFC4-6F175D3DCCD1}">
-              <a14:hiddenFill xmlns:a14="http://schemas.microsoft.com/office/drawing/2010/main">
+        </p:grpSpPr>
+        <p:pic>
+          <p:nvPicPr>
+            <p:cNvPr id="31746" name="Picture 2" descr="https://www.anibatch.me/wp-content/uploads/2015/10/cropped-11214148_1464291883892938_5502472493587871470_n-192x192.png">
+              <a:extLst>
+                <a:ext uri="{FF2B5EF4-FFF2-40B4-BE49-F238E27FC236}">
+                  <a16:creationId xmlns:a16="http://schemas.microsoft.com/office/drawing/2014/main" id="{21AD9319-E1B3-45D9-B385-8FE9B638406F}"/>
+                </a:ext>
+              </a:extLst>
+            </p:cNvPr>
+            <p:cNvPicPr>
+              <a:picLocks noChangeAspect="1" noChangeArrowheads="1"/>
+            </p:cNvPicPr>
+            <p:nvPr/>
+          </p:nvPicPr>
+          <p:blipFill>
+            <a:blip r:embed="rId2">
+              <a:extLst>
+                <a:ext uri="{BEBA8EAE-BF5A-486C-A8C5-ECC9F3942E4B}">
+                  <a14:imgProps xmlns:a14="http://schemas.microsoft.com/office/drawing/2010/main">
+                    <a14:imgLayer r:embed="rId3">
+                      <a14:imgEffect>
+                        <a14:backgroundRemoval t="9896" b="89063" l="8854" r="95313">
+                          <a14:foregroundMark x1="91146" y1="47917" x2="91146" y2="47917"/>
+                          <a14:foregroundMark x1="95833" y1="49479" x2="95833" y2="49479"/>
+                          <a14:foregroundMark x1="8854" y1="21875" x2="8854" y2="21875"/>
+                        </a14:backgroundRemoval>
+                      </a14:imgEffect>
+                    </a14:imgLayer>
+                  </a14:imgProps>
+                </a:ext>
+                <a:ext uri="{28A0092B-C50C-407E-A947-70E740481C1C}">
+                  <a14:useLocalDpi xmlns:a14="http://schemas.microsoft.com/office/drawing/2010/main" val="0"/>
+                </a:ext>
+              </a:extLst>
+            </a:blip>
+            <a:srcRect/>
+            <a:stretch>
+              <a:fillRect/>
+            </a:stretch>
+          </p:blipFill>
+          <p:spPr bwMode="auto">
+            <a:xfrm>
+              <a:off x="406400" y="179387"/>
+              <a:ext cx="828675" cy="828675"/>
+            </a:xfrm>
+            <a:prstGeom prst="rect">
+              <a:avLst/>
+            </a:prstGeom>
+            <a:noFill/>
+            <a:effectLst>
+              <a:outerShdw blurRad="50800" dist="38100" dir="2700000" algn="tl" rotWithShape="0">
+                <a:prstClr val="black">
+                  <a:alpha val="36000"/>
+                </a:prstClr>
+              </a:outerShdw>
+            </a:effectLst>
+            <a:extLst>
+              <a:ext uri="{909E8E84-426E-40DD-AFC4-6F175D3DCCD1}">
+                <a14:hiddenFill xmlns:a14="http://schemas.microsoft.com/office/drawing/2010/main">
+                  <a:solidFill>
+                    <a:srgbClr val="FFFFFF"/>
+                  </a:solidFill>
+                </a14:hiddenFill>
+              </a:ext>
+            </a:extLst>
+          </p:spPr>
+        </p:pic>
+        <p:sp>
+          <p:nvSpPr>
+            <p:cNvPr id="2" name="TextBox 1">
+              <a:extLst>
+                <a:ext uri="{FF2B5EF4-FFF2-40B4-BE49-F238E27FC236}">
+                  <a16:creationId xmlns:a16="http://schemas.microsoft.com/office/drawing/2014/main" id="{A5065BF5-162C-43B0-9169-E8DB4A328A4D}"/>
+                </a:ext>
+              </a:extLst>
+            </p:cNvPr>
+            <p:cNvSpPr txBox="1"/>
+            <p:nvPr/>
+          </p:nvSpPr>
+          <p:spPr>
+            <a:xfrm>
+              <a:off x="1343025" y="301336"/>
+              <a:ext cx="1666875" cy="584775"/>
+            </a:xfrm>
+            <a:prstGeom prst="rect">
+              <a:avLst/>
+            </a:prstGeom>
+            <a:noFill/>
+          </p:spPr>
+          <p:txBody>
+            <a:bodyPr wrap="square" rtlCol="0">
+              <a:spAutoFit/>
+            </a:bodyPr>
+            <a:lstStyle/>
+            <a:p>
+              <a:pPr algn="dist"/>
+              <a:r>
+                <a:rPr lang="id-ID" sz="3200" dirty="0">
+                  <a:solidFill>
+                    <a:schemeClr val="bg1"/>
+                  </a:solidFill>
+                </a:rPr>
+                <a:t>AniBatch</a:t>
+              </a:r>
+              <a:endParaRPr lang="en-US" sz="3200" dirty="0">
                 <a:solidFill>
-                  <a:srgbClr val="FFFFFF"/>
+                  <a:schemeClr val="bg1"/>
                 </a:solidFill>
-              </a14:hiddenFill>
-            </a:ext>
-          </a:extLst>
-        </p:spPr>
-      </p:pic>
+              </a:endParaRPr>
+            </a:p>
+          </p:txBody>
+        </p:sp>
+      </p:grpSp>
     </p:spTree>
     <p:extLst>
       <p:ext uri="{BB962C8B-B14F-4D97-AF65-F5344CB8AC3E}">
-        <p14:creationId xmlns:p14="http://schemas.microsoft.com/office/powerpoint/2010/main" val="2343881463"/>
-      </p:ext>
-    </p:extLst>
-  </p:cSld>
-  <p:clrMapOvr>
-    <a:masterClrMapping/>
-  </p:clrMapOvr>
-</p:sld>
-</file>
-
-<file path=ppt/slides/slide35.xml><?xml version="1.0" encoding="utf-8"?>
-<p:sld xmlns:a="http://schemas.openxmlformats.org/drawingml/2006/main" xmlns:r="http://schemas.openxmlformats.org/officeDocument/2006/relationships" xmlns:p="http://schemas.openxmlformats.org/presentationml/2006/main">
-  <p:cSld>
-    <p:spTree>
-      <p:nvGrpSpPr>
-        <p:cNvPr id="1" name=""/>
-        <p:cNvGrpSpPr/>
-        <p:nvPr/>
-      </p:nvGrpSpPr>
-      <p:grpSpPr>
-        <a:xfrm>
-          <a:off x="0" y="0"/>
-          <a:ext cx="0" cy="0"/>
-          <a:chOff x="0" y="0"/>
-          <a:chExt cx="0" cy="0"/>
-        </a:xfrm>
-      </p:grpSpPr>
-      <p:sp>
-        <p:nvSpPr>
-          <p:cNvPr id="4" name="Rectangle: Rounded Corners 3">
-            <a:extLst>
-              <a:ext uri="{FF2B5EF4-FFF2-40B4-BE49-F238E27FC236}">
-                <a16:creationId xmlns:a16="http://schemas.microsoft.com/office/drawing/2014/main" id="{8D6D9DF0-36ED-4863-B918-F6735D13A7C1}"/>
-              </a:ext>
-            </a:extLst>
-          </p:cNvPr>
-          <p:cNvSpPr/>
-          <p:nvPr/>
-        </p:nvSpPr>
-        <p:spPr>
-          <a:xfrm>
-            <a:off x="0" y="0"/>
-            <a:ext cx="3563938" cy="1187450"/>
-          </a:xfrm>
-          <a:prstGeom prst="roundRect">
-            <a:avLst>
-              <a:gd name="adj" fmla="val 50000"/>
-            </a:avLst>
-          </a:prstGeom>
-          <a:gradFill flip="none" rotWithShape="1">
-            <a:gsLst>
-              <a:gs pos="30000">
-                <a:srgbClr val="B42F33"/>
-              </a:gs>
-              <a:gs pos="100000">
-                <a:srgbClr val="281B79"/>
-              </a:gs>
-            </a:gsLst>
-            <a:lin ang="2700000" scaled="0"/>
-            <a:tileRect/>
-          </a:gradFill>
-          <a:ln>
-            <a:noFill/>
-          </a:ln>
-        </p:spPr>
-        <p:style>
-          <a:lnRef idx="2">
-            <a:schemeClr val="accent1">
-              <a:shade val="50000"/>
-            </a:schemeClr>
-          </a:lnRef>
-          <a:fillRef idx="1">
-            <a:schemeClr val="accent1"/>
-          </a:fillRef>
-          <a:effectRef idx="0">
-            <a:schemeClr val="accent1"/>
-          </a:effectRef>
-          <a:fontRef idx="minor">
-            <a:schemeClr val="lt1"/>
-          </a:fontRef>
-        </p:style>
-        <p:txBody>
-          <a:bodyPr rtlCol="0" anchor="ctr"/>
-          <a:lstStyle/>
-          <a:p>
-            <a:pPr algn="ctr"/>
-            <a:endParaRPr lang="en-US" dirty="0"/>
-          </a:p>
-        </p:txBody>
-      </p:sp>
-      <p:pic>
-        <p:nvPicPr>
-          <p:cNvPr id="3074" name="Picture 2" descr="[webp-to-png output image]">
-            <a:extLst>
-              <a:ext uri="{FF2B5EF4-FFF2-40B4-BE49-F238E27FC236}">
-                <a16:creationId xmlns:a16="http://schemas.microsoft.com/office/drawing/2014/main" id="{8B09A652-E1F5-4F82-8C4F-C28AAC002534}"/>
-              </a:ext>
-            </a:extLst>
-          </p:cNvPr>
-          <p:cNvPicPr>
-            <a:picLocks noChangeAspect="1" noChangeArrowheads="1"/>
-          </p:cNvPicPr>
-          <p:nvPr/>
-        </p:nvPicPr>
-        <p:blipFill>
-          <a:blip r:embed="rId2">
-            <a:extLst>
-              <a:ext uri="{28A0092B-C50C-407E-A947-70E740481C1C}">
-                <a14:useLocalDpi xmlns:a14="http://schemas.microsoft.com/office/drawing/2010/main" val="0"/>
-              </a:ext>
-            </a:extLst>
-          </a:blip>
-          <a:srcRect/>
-          <a:stretch>
-            <a:fillRect/>
-          </a:stretch>
-        </p:blipFill>
-        <p:spPr bwMode="auto">
-          <a:xfrm>
-            <a:off x="315119" y="297741"/>
-            <a:ext cx="2933700" cy="591967"/>
-          </a:xfrm>
-          <a:prstGeom prst="rect">
-            <a:avLst/>
-          </a:prstGeom>
-          <a:noFill/>
-          <a:extLst>
-            <a:ext uri="{909E8E84-426E-40DD-AFC4-6F175D3DCCD1}">
-              <a14:hiddenFill xmlns:a14="http://schemas.microsoft.com/office/drawing/2010/main">
-                <a:solidFill>
-                  <a:srgbClr val="FFFFFF"/>
-                </a:solidFill>
-              </a14:hiddenFill>
-            </a:ext>
-          </a:extLst>
-        </p:spPr>
-      </p:pic>
-    </p:spTree>
-    <p:extLst>
-      <p:ext uri="{BB962C8B-B14F-4D97-AF65-F5344CB8AC3E}">
-        <p14:creationId xmlns:p14="http://schemas.microsoft.com/office/powerpoint/2010/main" val="2044909443"/>
-      </p:ext>
-    </p:extLst>
-  </p:cSld>
-  <p:clrMapOvr>
-    <a:masterClrMapping/>
-  </p:clrMapOvr>
-</p:sld>
-</file>
-
-<file path=ppt/slides/slide36.xml><?xml version="1.0" encoding="utf-8"?>
-<p:sld xmlns:a="http://schemas.openxmlformats.org/drawingml/2006/main" xmlns:r="http://schemas.openxmlformats.org/officeDocument/2006/relationships" xmlns:p="http://schemas.openxmlformats.org/presentationml/2006/main">
-  <p:cSld>
-    <p:spTree>
-      <p:nvGrpSpPr>
-        <p:cNvPr id="1" name=""/>
-        <p:cNvGrpSpPr/>
-        <p:nvPr/>
-      </p:nvGrpSpPr>
-      <p:grpSpPr>
-        <a:xfrm>
-          <a:off x="0" y="0"/>
-          <a:ext cx="0" cy="0"/>
-          <a:chOff x="0" y="0"/>
-          <a:chExt cx="0" cy="0"/>
-        </a:xfrm>
-      </p:grpSpPr>
-      <p:sp>
-        <p:nvSpPr>
-          <p:cNvPr id="4" name="Rectangle: Rounded Corners 3">
-            <a:extLst>
-              <a:ext uri="{FF2B5EF4-FFF2-40B4-BE49-F238E27FC236}">
-                <a16:creationId xmlns:a16="http://schemas.microsoft.com/office/drawing/2014/main" id="{8D6D9DF0-36ED-4863-B918-F6735D13A7C1}"/>
-              </a:ext>
-            </a:extLst>
-          </p:cNvPr>
-          <p:cNvSpPr/>
-          <p:nvPr/>
-        </p:nvSpPr>
-        <p:spPr>
-          <a:xfrm>
-            <a:off x="0" y="0"/>
-            <a:ext cx="3563938" cy="1187450"/>
-          </a:xfrm>
-          <a:prstGeom prst="roundRect">
-            <a:avLst>
-              <a:gd name="adj" fmla="val 50000"/>
-            </a:avLst>
-          </a:prstGeom>
-          <a:gradFill flip="none" rotWithShape="1">
-            <a:gsLst>
-              <a:gs pos="30000">
-                <a:srgbClr val="685454"/>
-              </a:gs>
-              <a:gs pos="100000">
-                <a:srgbClr val="C23A4C"/>
-              </a:gs>
-            </a:gsLst>
-            <a:lin ang="2700000" scaled="0"/>
-            <a:tileRect/>
-          </a:gradFill>
-          <a:ln>
-            <a:noFill/>
-          </a:ln>
-        </p:spPr>
-        <p:style>
-          <a:lnRef idx="2">
-            <a:schemeClr val="accent1">
-              <a:shade val="50000"/>
-            </a:schemeClr>
-          </a:lnRef>
-          <a:fillRef idx="1">
-            <a:schemeClr val="accent1"/>
-          </a:fillRef>
-          <a:effectRef idx="0">
-            <a:schemeClr val="accent1"/>
-          </a:effectRef>
-          <a:fontRef idx="minor">
-            <a:schemeClr val="lt1"/>
-          </a:fontRef>
-        </p:style>
-        <p:txBody>
-          <a:bodyPr rtlCol="0" anchor="ctr"/>
-          <a:lstStyle/>
-          <a:p>
-            <a:pPr algn="ctr"/>
-            <a:endParaRPr lang="en-US" dirty="0"/>
-          </a:p>
-        </p:txBody>
-      </p:sp>
-      <p:pic>
-        <p:nvPicPr>
-          <p:cNvPr id="2" name="Picture 1">
-            <a:extLst>
-              <a:ext uri="{FF2B5EF4-FFF2-40B4-BE49-F238E27FC236}">
-                <a16:creationId xmlns:a16="http://schemas.microsoft.com/office/drawing/2014/main" id="{16B8992A-5E69-4B8C-A724-B6D980F84F67}"/>
-              </a:ext>
-            </a:extLst>
-          </p:cNvPr>
-          <p:cNvPicPr>
-            <a:picLocks noChangeAspect="1"/>
-          </p:cNvPicPr>
-          <p:nvPr/>
-        </p:nvPicPr>
-        <p:blipFill>
-          <a:blip r:embed="rId2"/>
-          <a:stretch>
-            <a:fillRect/>
-          </a:stretch>
-        </p:blipFill>
-        <p:spPr>
-          <a:xfrm>
-            <a:off x="424656" y="335835"/>
-            <a:ext cx="2714625" cy="515779"/>
-          </a:xfrm>
-          <a:prstGeom prst="rect">
-            <a:avLst/>
-          </a:prstGeom>
-        </p:spPr>
-      </p:pic>
-    </p:spTree>
-    <p:extLst>
-      <p:ext uri="{BB962C8B-B14F-4D97-AF65-F5344CB8AC3E}">
-        <p14:creationId xmlns:p14="http://schemas.microsoft.com/office/powerpoint/2010/main" val="2001192933"/>
-      </p:ext>
-    </p:extLst>
-  </p:cSld>
-  <p:clrMapOvr>
-    <a:masterClrMapping/>
-  </p:clrMapOvr>
-</p:sld>
-</file>
-
-<file path=ppt/slides/slide37.xml><?xml version="1.0" encoding="utf-8"?>
-<p:sld xmlns:a="http://schemas.openxmlformats.org/drawingml/2006/main" xmlns:r="http://schemas.openxmlformats.org/officeDocument/2006/relationships" xmlns:p="http://schemas.openxmlformats.org/presentationml/2006/main">
-  <p:cSld>
-    <p:spTree>
-      <p:nvGrpSpPr>
-        <p:cNvPr id="1" name=""/>
-        <p:cNvGrpSpPr/>
-        <p:nvPr/>
-      </p:nvGrpSpPr>
-      <p:grpSpPr>
-        <a:xfrm>
-          <a:off x="0" y="0"/>
-          <a:ext cx="0" cy="0"/>
-          <a:chOff x="0" y="0"/>
-          <a:chExt cx="0" cy="0"/>
-        </a:xfrm>
-      </p:grpSpPr>
-      <p:sp>
-        <p:nvSpPr>
-          <p:cNvPr id="4" name="Rectangle: Rounded Corners 3">
-            <a:extLst>
-              <a:ext uri="{FF2B5EF4-FFF2-40B4-BE49-F238E27FC236}">
-                <a16:creationId xmlns:a16="http://schemas.microsoft.com/office/drawing/2014/main" id="{8D6D9DF0-36ED-4863-B918-F6735D13A7C1}"/>
-              </a:ext>
-            </a:extLst>
-          </p:cNvPr>
-          <p:cNvSpPr/>
-          <p:nvPr/>
-        </p:nvSpPr>
-        <p:spPr>
-          <a:xfrm>
-            <a:off x="0" y="0"/>
-            <a:ext cx="3563938" cy="1187450"/>
-          </a:xfrm>
-          <a:prstGeom prst="roundRect">
-            <a:avLst>
-              <a:gd name="adj" fmla="val 50000"/>
-            </a:avLst>
-          </a:prstGeom>
-          <a:gradFill flip="none" rotWithShape="1">
-            <a:gsLst>
-              <a:gs pos="0">
-                <a:srgbClr val="000000"/>
-              </a:gs>
-              <a:gs pos="100000">
-                <a:srgbClr val="C15223"/>
-              </a:gs>
-            </a:gsLst>
-            <a:lin ang="2700000" scaled="0"/>
-            <a:tileRect/>
-          </a:gradFill>
-          <a:ln>
-            <a:noFill/>
-          </a:ln>
-        </p:spPr>
-        <p:style>
-          <a:lnRef idx="2">
-            <a:schemeClr val="accent1">
-              <a:shade val="50000"/>
-            </a:schemeClr>
-          </a:lnRef>
-          <a:fillRef idx="1">
-            <a:schemeClr val="accent1"/>
-          </a:fillRef>
-          <a:effectRef idx="0">
-            <a:schemeClr val="accent1"/>
-          </a:effectRef>
-          <a:fontRef idx="minor">
-            <a:schemeClr val="lt1"/>
-          </a:fontRef>
-        </p:style>
-        <p:txBody>
-          <a:bodyPr rtlCol="0" anchor="ctr"/>
-          <a:lstStyle/>
-          <a:p>
-            <a:pPr algn="ctr"/>
-            <a:endParaRPr lang="en-US" dirty="0"/>
-          </a:p>
-        </p:txBody>
-      </p:sp>
-      <p:pic>
-        <p:nvPicPr>
-          <p:cNvPr id="5122" name="Picture 2" descr="https://anoboy.org/wp-content/uploads/2018/12/newlogo-1.png">
-            <a:extLst>
-              <a:ext uri="{FF2B5EF4-FFF2-40B4-BE49-F238E27FC236}">
-                <a16:creationId xmlns:a16="http://schemas.microsoft.com/office/drawing/2014/main" id="{9E0E7F98-38F1-4458-AD2D-F1A18A257714}"/>
-              </a:ext>
-            </a:extLst>
-          </p:cNvPr>
-          <p:cNvPicPr>
-            <a:picLocks noChangeAspect="1" noChangeArrowheads="1"/>
-          </p:cNvPicPr>
-          <p:nvPr/>
-        </p:nvPicPr>
-        <p:blipFill>
-          <a:blip r:embed="rId2">
-            <a:extLst>
-              <a:ext uri="{28A0092B-C50C-407E-A947-70E740481C1C}">
-                <a14:useLocalDpi xmlns:a14="http://schemas.microsoft.com/office/drawing/2010/main" val="0"/>
-              </a:ext>
-            </a:extLst>
-          </a:blip>
-          <a:srcRect/>
-          <a:stretch>
-            <a:fillRect/>
-          </a:stretch>
-        </p:blipFill>
-        <p:spPr bwMode="auto">
-          <a:xfrm>
-            <a:off x="362140" y="280987"/>
-            <a:ext cx="2839657" cy="625475"/>
-          </a:xfrm>
-          <a:prstGeom prst="rect">
-            <a:avLst/>
-          </a:prstGeom>
-          <a:noFill/>
-          <a:extLst>
-            <a:ext uri="{909E8E84-426E-40DD-AFC4-6F175D3DCCD1}">
-              <a14:hiddenFill xmlns:a14="http://schemas.microsoft.com/office/drawing/2010/main">
-                <a:solidFill>
-                  <a:srgbClr val="FFFFFF"/>
-                </a:solidFill>
-              </a14:hiddenFill>
-            </a:ext>
-          </a:extLst>
-        </p:spPr>
-      </p:pic>
-    </p:spTree>
-    <p:extLst>
-      <p:ext uri="{BB962C8B-B14F-4D97-AF65-F5344CB8AC3E}">
-        <p14:creationId xmlns:p14="http://schemas.microsoft.com/office/powerpoint/2010/main" val="743538766"/>
-      </p:ext>
-    </p:extLst>
-  </p:cSld>
-  <p:clrMapOvr>
-    <a:masterClrMapping/>
-  </p:clrMapOvr>
-</p:sld>
-</file>
-
-<file path=ppt/slides/slide38.xml><?xml version="1.0" encoding="utf-8"?>
-<p:sld xmlns:a="http://schemas.openxmlformats.org/drawingml/2006/main" xmlns:r="http://schemas.openxmlformats.org/officeDocument/2006/relationships" xmlns:p="http://schemas.openxmlformats.org/presentationml/2006/main">
-  <p:cSld>
-    <p:spTree>
-      <p:nvGrpSpPr>
-        <p:cNvPr id="1" name=""/>
-        <p:cNvGrpSpPr/>
-        <p:nvPr/>
-      </p:nvGrpSpPr>
-      <p:grpSpPr>
-        <a:xfrm>
-          <a:off x="0" y="0"/>
-          <a:ext cx="0" cy="0"/>
-          <a:chOff x="0" y="0"/>
-          <a:chExt cx="0" cy="0"/>
-        </a:xfrm>
-      </p:grpSpPr>
-      <p:sp>
-        <p:nvSpPr>
-          <p:cNvPr id="4" name="Rectangle: Rounded Corners 3">
-            <a:extLst>
-              <a:ext uri="{FF2B5EF4-FFF2-40B4-BE49-F238E27FC236}">
-                <a16:creationId xmlns:a16="http://schemas.microsoft.com/office/drawing/2014/main" id="{8D6D9DF0-36ED-4863-B918-F6735D13A7C1}"/>
-              </a:ext>
-            </a:extLst>
-          </p:cNvPr>
-          <p:cNvSpPr/>
-          <p:nvPr/>
-        </p:nvSpPr>
-        <p:spPr>
-          <a:xfrm>
-            <a:off x="0" y="0"/>
-            <a:ext cx="3563938" cy="1187450"/>
-          </a:xfrm>
-          <a:prstGeom prst="roundRect">
-            <a:avLst>
-              <a:gd name="adj" fmla="val 50000"/>
-            </a:avLst>
-          </a:prstGeom>
-          <a:gradFill flip="none" rotWithShape="1">
-            <a:gsLst>
-              <a:gs pos="27000">
-                <a:srgbClr val="000000"/>
-              </a:gs>
-              <a:gs pos="100000">
-                <a:srgbClr val="C15223"/>
-              </a:gs>
-            </a:gsLst>
-            <a:lin ang="2700000" scaled="0"/>
-            <a:tileRect/>
-          </a:gradFill>
-          <a:ln>
-            <a:noFill/>
-          </a:ln>
-        </p:spPr>
-        <p:style>
-          <a:lnRef idx="2">
-            <a:schemeClr val="accent1">
-              <a:shade val="50000"/>
-            </a:schemeClr>
-          </a:lnRef>
-          <a:fillRef idx="1">
-            <a:schemeClr val="accent1"/>
-          </a:fillRef>
-          <a:effectRef idx="0">
-            <a:schemeClr val="accent1"/>
-          </a:effectRef>
-          <a:fontRef idx="minor">
-            <a:schemeClr val="lt1"/>
-          </a:fontRef>
-        </p:style>
-        <p:txBody>
-          <a:bodyPr rtlCol="0" anchor="ctr"/>
-          <a:lstStyle/>
-          <a:p>
-            <a:pPr algn="ctr"/>
-            <a:endParaRPr lang="en-US" dirty="0"/>
-          </a:p>
-        </p:txBody>
-      </p:sp>
-      <p:pic>
-        <p:nvPicPr>
-          <p:cNvPr id="6146" name="Picture 2" descr="https://img.akubebas.com/images/logo-indo.png">
-            <a:extLst>
-              <a:ext uri="{FF2B5EF4-FFF2-40B4-BE49-F238E27FC236}">
-                <a16:creationId xmlns:a16="http://schemas.microsoft.com/office/drawing/2014/main" id="{B278300F-7126-4621-A21C-922518AC2535}"/>
-              </a:ext>
-            </a:extLst>
-          </p:cNvPr>
-          <p:cNvPicPr>
-            <a:picLocks noChangeAspect="1" noChangeArrowheads="1"/>
-          </p:cNvPicPr>
-          <p:nvPr/>
-        </p:nvPicPr>
-        <p:blipFill>
-          <a:blip r:embed="rId2">
-            <a:extLst>
-              <a:ext uri="{28A0092B-C50C-407E-A947-70E740481C1C}">
-                <a14:useLocalDpi xmlns:a14="http://schemas.microsoft.com/office/drawing/2010/main" val="0"/>
-              </a:ext>
-            </a:extLst>
-          </a:blip>
-          <a:srcRect/>
-          <a:stretch>
-            <a:fillRect/>
-          </a:stretch>
-        </p:blipFill>
-        <p:spPr bwMode="auto">
-          <a:xfrm>
-            <a:off x="523081" y="292301"/>
-            <a:ext cx="2517776" cy="602847"/>
-          </a:xfrm>
-          <a:prstGeom prst="rect">
-            <a:avLst/>
-          </a:prstGeom>
-          <a:noFill/>
-          <a:extLst>
-            <a:ext uri="{909E8E84-426E-40DD-AFC4-6F175D3DCCD1}">
-              <a14:hiddenFill xmlns:a14="http://schemas.microsoft.com/office/drawing/2010/main">
-                <a:solidFill>
-                  <a:srgbClr val="FFFFFF"/>
-                </a:solidFill>
-              </a14:hiddenFill>
-            </a:ext>
-          </a:extLst>
-        </p:spPr>
-      </p:pic>
-    </p:spTree>
-    <p:extLst>
-      <p:ext uri="{BB962C8B-B14F-4D97-AF65-F5344CB8AC3E}">
-        <p14:creationId xmlns:p14="http://schemas.microsoft.com/office/powerpoint/2010/main" val="3562251831"/>
-      </p:ext>
-    </p:extLst>
-  </p:cSld>
-  <p:clrMapOvr>
-    <a:masterClrMapping/>
-  </p:clrMapOvr>
-</p:sld>
-</file>
-
-<file path=ppt/slides/slide39.xml><?xml version="1.0" encoding="utf-8"?>
-<p:sld xmlns:a="http://schemas.openxmlformats.org/drawingml/2006/main" xmlns:r="http://schemas.openxmlformats.org/officeDocument/2006/relationships" xmlns:p="http://schemas.openxmlformats.org/presentationml/2006/main">
-  <p:cSld>
-    <p:spTree>
-      <p:nvGrpSpPr>
-        <p:cNvPr id="1" name=""/>
-        <p:cNvGrpSpPr/>
-        <p:nvPr/>
-      </p:nvGrpSpPr>
-      <p:grpSpPr>
-        <a:xfrm>
-          <a:off x="0" y="0"/>
-          <a:ext cx="0" cy="0"/>
-          <a:chOff x="0" y="0"/>
-          <a:chExt cx="0" cy="0"/>
-        </a:xfrm>
-      </p:grpSpPr>
-      <p:sp>
-        <p:nvSpPr>
-          <p:cNvPr id="4" name="Rectangle: Rounded Corners 3">
-            <a:extLst>
-              <a:ext uri="{FF2B5EF4-FFF2-40B4-BE49-F238E27FC236}">
-                <a16:creationId xmlns:a16="http://schemas.microsoft.com/office/drawing/2014/main" id="{8D6D9DF0-36ED-4863-B918-F6735D13A7C1}"/>
-              </a:ext>
-            </a:extLst>
-          </p:cNvPr>
-          <p:cNvSpPr/>
-          <p:nvPr/>
-        </p:nvSpPr>
-        <p:spPr>
-          <a:xfrm>
-            <a:off x="0" y="0"/>
-            <a:ext cx="3563938" cy="1187450"/>
-          </a:xfrm>
-          <a:prstGeom prst="roundRect">
-            <a:avLst>
-              <a:gd name="adj" fmla="val 50000"/>
-            </a:avLst>
-          </a:prstGeom>
-          <a:gradFill flip="none" rotWithShape="1">
-            <a:gsLst>
-              <a:gs pos="26000">
-                <a:srgbClr val="447BBA"/>
-              </a:gs>
-              <a:gs pos="100000">
-                <a:srgbClr val="21B577"/>
-              </a:gs>
-            </a:gsLst>
-            <a:lin ang="2700000" scaled="0"/>
-            <a:tileRect/>
-          </a:gradFill>
-          <a:ln>
-            <a:noFill/>
-          </a:ln>
-        </p:spPr>
-        <p:style>
-          <a:lnRef idx="2">
-            <a:schemeClr val="accent1">
-              <a:shade val="50000"/>
-            </a:schemeClr>
-          </a:lnRef>
-          <a:fillRef idx="1">
-            <a:schemeClr val="accent1"/>
-          </a:fillRef>
-          <a:effectRef idx="0">
-            <a:schemeClr val="accent1"/>
-          </a:effectRef>
-          <a:fontRef idx="minor">
-            <a:schemeClr val="lt1"/>
-          </a:fontRef>
-        </p:style>
-        <p:txBody>
-          <a:bodyPr rtlCol="0" anchor="ctr"/>
-          <a:lstStyle/>
-          <a:p>
-            <a:pPr algn="ctr"/>
-            <a:endParaRPr lang="en-US" dirty="0"/>
-          </a:p>
-        </p:txBody>
-      </p:sp>
-      <p:pic>
-        <p:nvPicPr>
-          <p:cNvPr id="25602" name="Picture 2" descr="[svg-to-png output image]">
-            <a:extLst>
-              <a:ext uri="{FF2B5EF4-FFF2-40B4-BE49-F238E27FC236}">
-                <a16:creationId xmlns:a16="http://schemas.microsoft.com/office/drawing/2014/main" id="{C8803F84-8FBD-427D-BF96-31A0291DFC84}"/>
-              </a:ext>
-            </a:extLst>
-          </p:cNvPr>
-          <p:cNvPicPr>
-            <a:picLocks noChangeAspect="1" noChangeArrowheads="1"/>
-          </p:cNvPicPr>
-          <p:nvPr/>
-        </p:nvPicPr>
-        <p:blipFill>
-          <a:blip r:embed="rId2">
-            <a:extLst>
-              <a:ext uri="{BEBA8EAE-BF5A-486C-A8C5-ECC9F3942E4B}">
-                <a14:imgProps xmlns:a14="http://schemas.microsoft.com/office/drawing/2010/main">
-                  <a14:imgLayer r:embed="rId3">
-                    <a14:imgEffect>
-                      <a14:brightnessContrast bright="100000"/>
-                    </a14:imgEffect>
-                  </a14:imgLayer>
-                </a14:imgProps>
-              </a:ext>
-              <a:ext uri="{28A0092B-C50C-407E-A947-70E740481C1C}">
-                <a14:useLocalDpi xmlns:a14="http://schemas.microsoft.com/office/drawing/2010/main" val="0"/>
-              </a:ext>
-            </a:extLst>
-          </a:blip>
-          <a:srcRect/>
-          <a:stretch>
-            <a:fillRect/>
-          </a:stretch>
-        </p:blipFill>
-        <p:spPr bwMode="auto">
-          <a:xfrm>
-            <a:off x="481373" y="-38404"/>
-            <a:ext cx="2601191" cy="1264257"/>
-          </a:xfrm>
-          <a:prstGeom prst="rect">
-            <a:avLst/>
-          </a:prstGeom>
-          <a:noFill/>
-          <a:extLst>
-            <a:ext uri="{909E8E84-426E-40DD-AFC4-6F175D3DCCD1}">
-              <a14:hiddenFill xmlns:a14="http://schemas.microsoft.com/office/drawing/2010/main">
-                <a:solidFill>
-                  <a:srgbClr val="FFFFFF"/>
-                </a:solidFill>
-              </a14:hiddenFill>
-            </a:ext>
-          </a:extLst>
-        </p:spPr>
-      </p:pic>
-    </p:spTree>
-    <p:extLst>
-      <p:ext uri="{BB962C8B-B14F-4D97-AF65-F5344CB8AC3E}">
-        <p14:creationId xmlns:p14="http://schemas.microsoft.com/office/powerpoint/2010/main" val="889022910"/>
+        <p14:creationId xmlns:p14="http://schemas.microsoft.com/office/powerpoint/2010/main" val="3048235945"/>
       </p:ext>
     </p:extLst>
   </p:cSld>
@@ -10447,10 +10665,10 @@
           <a:gradFill flip="none" rotWithShape="1">
             <a:gsLst>
               <a:gs pos="26000">
-                <a:srgbClr val="BA3D31"/>
+                <a:srgbClr val="447BBA"/>
               </a:gs>
               <a:gs pos="100000">
-                <a:srgbClr val="E74B3C"/>
+                <a:srgbClr val="21B577"/>
               </a:gs>
             </a:gsLst>
             <a:lin ang="2700000" scaled="0"/>
@@ -10485,143 +10703,66 @@
           </a:p>
         </p:txBody>
       </p:sp>
-      <p:grpSp>
-        <p:nvGrpSpPr>
-          <p:cNvPr id="3" name="Group 2">
+      <p:pic>
+        <p:nvPicPr>
+          <p:cNvPr id="25602" name="Picture 2" descr="[svg-to-png output image]">
             <a:extLst>
               <a:ext uri="{FF2B5EF4-FFF2-40B4-BE49-F238E27FC236}">
-                <a16:creationId xmlns:a16="http://schemas.microsoft.com/office/drawing/2014/main" id="{2604B08D-9533-4334-93DB-3625E4855428}"/>
+                <a16:creationId xmlns:a16="http://schemas.microsoft.com/office/drawing/2014/main" id="{C8803F84-8FBD-427D-BF96-31A0291DFC84}"/>
               </a:ext>
             </a:extLst>
           </p:cNvPr>
-          <p:cNvGrpSpPr/>
+          <p:cNvPicPr>
+            <a:picLocks noChangeAspect="1" noChangeArrowheads="1"/>
+          </p:cNvPicPr>
           <p:nvPr/>
-        </p:nvGrpSpPr>
-        <p:grpSpPr>
+        </p:nvPicPr>
+        <p:blipFill>
+          <a:blip r:embed="rId2">
+            <a:extLst>
+              <a:ext uri="{BEBA8EAE-BF5A-486C-A8C5-ECC9F3942E4B}">
+                <a14:imgProps xmlns:a14="http://schemas.microsoft.com/office/drawing/2010/main">
+                  <a14:imgLayer r:embed="rId3">
+                    <a14:imgEffect>
+                      <a14:brightnessContrast bright="100000"/>
+                    </a14:imgEffect>
+                  </a14:imgLayer>
+                </a14:imgProps>
+              </a:ext>
+              <a:ext uri="{28A0092B-C50C-407E-A947-70E740481C1C}">
+                <a14:useLocalDpi xmlns:a14="http://schemas.microsoft.com/office/drawing/2010/main" val="0"/>
+              </a:ext>
+            </a:extLst>
+          </a:blip>
+          <a:srcRect/>
+          <a:stretch>
+            <a:fillRect/>
+          </a:stretch>
+        </p:blipFill>
+        <p:spPr bwMode="auto">
           <a:xfrm>
-            <a:off x="480219" y="179387"/>
-            <a:ext cx="2603500" cy="828675"/>
-            <a:chOff x="406400" y="179387"/>
-            <a:chExt cx="2603500" cy="828675"/>
+            <a:off x="481373" y="-38404"/>
+            <a:ext cx="2601191" cy="1264257"/>
           </a:xfrm>
-        </p:grpSpPr>
-        <p:pic>
-          <p:nvPicPr>
-            <p:cNvPr id="31746" name="Picture 2" descr="https://www.anibatch.me/wp-content/uploads/2015/10/cropped-11214148_1464291883892938_5502472493587871470_n-192x192.png">
-              <a:extLst>
-                <a:ext uri="{FF2B5EF4-FFF2-40B4-BE49-F238E27FC236}">
-                  <a16:creationId xmlns:a16="http://schemas.microsoft.com/office/drawing/2014/main" id="{21AD9319-E1B3-45D9-B385-8FE9B638406F}"/>
-                </a:ext>
-              </a:extLst>
-            </p:cNvPr>
-            <p:cNvPicPr>
-              <a:picLocks noChangeAspect="1" noChangeArrowheads="1"/>
-            </p:cNvPicPr>
-            <p:nvPr/>
-          </p:nvPicPr>
-          <p:blipFill>
-            <a:blip r:embed="rId2">
-              <a:extLst>
-                <a:ext uri="{BEBA8EAE-BF5A-486C-A8C5-ECC9F3942E4B}">
-                  <a14:imgProps xmlns:a14="http://schemas.microsoft.com/office/drawing/2010/main">
-                    <a14:imgLayer r:embed="rId3">
-                      <a14:imgEffect>
-                        <a14:backgroundRemoval t="9896" b="89063" l="8854" r="95313">
-                          <a14:foregroundMark x1="91146" y1="47917" x2="91146" y2="47917"/>
-                          <a14:foregroundMark x1="95833" y1="49479" x2="95833" y2="49479"/>
-                          <a14:foregroundMark x1="8854" y1="21875" x2="8854" y2="21875"/>
-                        </a14:backgroundRemoval>
-                      </a14:imgEffect>
-                    </a14:imgLayer>
-                  </a14:imgProps>
-                </a:ext>
-                <a:ext uri="{28A0092B-C50C-407E-A947-70E740481C1C}">
-                  <a14:useLocalDpi xmlns:a14="http://schemas.microsoft.com/office/drawing/2010/main" val="0"/>
-                </a:ext>
-              </a:extLst>
-            </a:blip>
-            <a:srcRect/>
-            <a:stretch>
-              <a:fillRect/>
-            </a:stretch>
-          </p:blipFill>
-          <p:spPr bwMode="auto">
-            <a:xfrm>
-              <a:off x="406400" y="179387"/>
-              <a:ext cx="828675" cy="828675"/>
-            </a:xfrm>
-            <a:prstGeom prst="rect">
-              <a:avLst/>
-            </a:prstGeom>
-            <a:noFill/>
-            <a:effectLst>
-              <a:outerShdw blurRad="50800" dist="38100" dir="2700000" algn="tl" rotWithShape="0">
-                <a:prstClr val="black">
-                  <a:alpha val="36000"/>
-                </a:prstClr>
-              </a:outerShdw>
-            </a:effectLst>
-            <a:extLst>
-              <a:ext uri="{909E8E84-426E-40DD-AFC4-6F175D3DCCD1}">
-                <a14:hiddenFill xmlns:a14="http://schemas.microsoft.com/office/drawing/2010/main">
-                  <a:solidFill>
-                    <a:srgbClr val="FFFFFF"/>
-                  </a:solidFill>
-                </a14:hiddenFill>
-              </a:ext>
-            </a:extLst>
-          </p:spPr>
-        </p:pic>
-        <p:sp>
-          <p:nvSpPr>
-            <p:cNvPr id="2" name="TextBox 1">
-              <a:extLst>
-                <a:ext uri="{FF2B5EF4-FFF2-40B4-BE49-F238E27FC236}">
-                  <a16:creationId xmlns:a16="http://schemas.microsoft.com/office/drawing/2014/main" id="{A5065BF5-162C-43B0-9169-E8DB4A328A4D}"/>
-                </a:ext>
-              </a:extLst>
-            </p:cNvPr>
-            <p:cNvSpPr txBox="1"/>
-            <p:nvPr/>
-          </p:nvSpPr>
-          <p:spPr>
-            <a:xfrm>
-              <a:off x="1343025" y="301336"/>
-              <a:ext cx="1666875" cy="584775"/>
-            </a:xfrm>
-            <a:prstGeom prst="rect">
-              <a:avLst/>
-            </a:prstGeom>
-            <a:noFill/>
-          </p:spPr>
-          <p:txBody>
-            <a:bodyPr wrap="square" rtlCol="0">
-              <a:spAutoFit/>
-            </a:bodyPr>
-            <a:lstStyle/>
-            <a:p>
-              <a:pPr algn="dist"/>
-              <a:r>
-                <a:rPr lang="id-ID" sz="3200" dirty="0">
-                  <a:solidFill>
-                    <a:schemeClr val="bg1"/>
-                  </a:solidFill>
-                </a:rPr>
-                <a:t>AniBatch</a:t>
-              </a:r>
-              <a:endParaRPr lang="en-US" sz="3200" dirty="0">
+          <a:prstGeom prst="rect">
+            <a:avLst/>
+          </a:prstGeom>
+          <a:noFill/>
+          <a:extLst>
+            <a:ext uri="{909E8E84-426E-40DD-AFC4-6F175D3DCCD1}">
+              <a14:hiddenFill xmlns:a14="http://schemas.microsoft.com/office/drawing/2010/main">
                 <a:solidFill>
-                  <a:schemeClr val="bg1"/>
+                  <a:srgbClr val="FFFFFF"/>
                 </a:solidFill>
-              </a:endParaRPr>
-            </a:p>
-          </p:txBody>
-        </p:sp>
-      </p:grpSp>
+              </a14:hiddenFill>
+            </a:ext>
+          </a:extLst>
+        </p:spPr>
+      </p:pic>
     </p:spTree>
     <p:extLst>
       <p:ext uri="{BB962C8B-B14F-4D97-AF65-F5344CB8AC3E}">
-        <p14:creationId xmlns:p14="http://schemas.microsoft.com/office/powerpoint/2010/main" val="3048235945"/>
+        <p14:creationId xmlns:p14="http://schemas.microsoft.com/office/powerpoint/2010/main" val="889022910"/>
       </p:ext>
     </p:extLst>
   </p:cSld>
@@ -10632,6 +10773,301 @@
 </file>
 
 <file path=ppt/slides/slide41.xml><?xml version="1.0" encoding="utf-8"?>
+<p:sld xmlns:a="http://schemas.openxmlformats.org/drawingml/2006/main" xmlns:r="http://schemas.openxmlformats.org/officeDocument/2006/relationships" xmlns:p="http://schemas.openxmlformats.org/presentationml/2006/main">
+  <p:cSld>
+    <p:spTree>
+      <p:nvGrpSpPr>
+        <p:cNvPr id="1" name=""/>
+        <p:cNvGrpSpPr/>
+        <p:nvPr/>
+      </p:nvGrpSpPr>
+      <p:grpSpPr>
+        <a:xfrm>
+          <a:off x="0" y="0"/>
+          <a:ext cx="0" cy="0"/>
+          <a:chOff x="0" y="0"/>
+          <a:chExt cx="0" cy="0"/>
+        </a:xfrm>
+      </p:grpSpPr>
+      <p:sp>
+        <p:nvSpPr>
+          <p:cNvPr id="4" name="Rectangle: Rounded Corners 3">
+            <a:extLst>
+              <a:ext uri="{FF2B5EF4-FFF2-40B4-BE49-F238E27FC236}">
+                <a16:creationId xmlns:a16="http://schemas.microsoft.com/office/drawing/2014/main" id="{8D6D9DF0-36ED-4863-B918-F6735D13A7C1}"/>
+              </a:ext>
+            </a:extLst>
+          </p:cNvPr>
+          <p:cNvSpPr/>
+          <p:nvPr/>
+        </p:nvSpPr>
+        <p:spPr>
+          <a:xfrm>
+            <a:off x="0" y="0"/>
+            <a:ext cx="3563938" cy="1187450"/>
+          </a:xfrm>
+          <a:prstGeom prst="roundRect">
+            <a:avLst>
+              <a:gd name="adj" fmla="val 50000"/>
+            </a:avLst>
+          </a:prstGeom>
+          <a:gradFill flip="none" rotWithShape="1">
+            <a:gsLst>
+              <a:gs pos="26000">
+                <a:srgbClr val="17201E"/>
+              </a:gs>
+              <a:gs pos="100000">
+                <a:srgbClr val="1C2825"/>
+              </a:gs>
+            </a:gsLst>
+            <a:lin ang="2700000" scaled="0"/>
+            <a:tileRect/>
+          </a:gradFill>
+          <a:ln>
+            <a:noFill/>
+          </a:ln>
+        </p:spPr>
+        <p:style>
+          <a:lnRef idx="2">
+            <a:schemeClr val="accent1">
+              <a:shade val="50000"/>
+            </a:schemeClr>
+          </a:lnRef>
+          <a:fillRef idx="1">
+            <a:schemeClr val="accent1"/>
+          </a:fillRef>
+          <a:effectRef idx="0">
+            <a:schemeClr val="accent1"/>
+          </a:effectRef>
+          <a:fontRef idx="minor">
+            <a:schemeClr val="lt1"/>
+          </a:fontRef>
+        </p:style>
+        <p:txBody>
+          <a:bodyPr rtlCol="0" anchor="ctr"/>
+          <a:lstStyle/>
+          <a:p>
+            <a:pPr algn="ctr"/>
+            <a:endParaRPr lang="en-US" dirty="0"/>
+          </a:p>
+        </p:txBody>
+      </p:sp>
+      <p:pic>
+        <p:nvPicPr>
+          <p:cNvPr id="3" name="Picture 2">
+            <a:extLst>
+              <a:ext uri="{FF2B5EF4-FFF2-40B4-BE49-F238E27FC236}">
+                <a16:creationId xmlns:a16="http://schemas.microsoft.com/office/drawing/2014/main" id="{02D2A3E8-B154-4758-AA9A-6B92785C0760}"/>
+              </a:ext>
+            </a:extLst>
+          </p:cNvPr>
+          <p:cNvPicPr>
+            <a:picLocks noChangeAspect="1"/>
+          </p:cNvPicPr>
+          <p:nvPr/>
+        </p:nvPicPr>
+        <p:blipFill rotWithShape="1">
+          <a:blip r:embed="rId2">
+            <a:extLst>
+              <a:ext uri="{BEBA8EAE-BF5A-486C-A8C5-ECC9F3942E4B}">
+                <a14:imgProps xmlns:a14="http://schemas.microsoft.com/office/drawing/2010/main">
+                  <a14:imgLayer r:embed="rId3">
+                    <a14:imgEffect>
+                      <a14:backgroundRemoval t="22526" b="34115" l="18082" r="50586">
+                        <a14:foregroundMark x1="18228" y1="27604" x2="18228" y2="27604"/>
+                        <a14:foregroundMark x1="26135" y1="25260" x2="26135" y2="25260"/>
+                        <a14:foregroundMark x1="29063" y1="26563" x2="29063" y2="26563"/>
+                        <a14:foregroundMark x1="35066" y1="27865" x2="35066" y2="27865"/>
+                        <a14:foregroundMark x1="37921" y1="22786" x2="37921" y2="22786"/>
+                        <a14:foregroundMark x1="46120" y1="27083" x2="46120" y2="27083"/>
+                        <a14:foregroundMark x1="49122" y1="28906" x2="49122" y2="28906"/>
+                        <a14:foregroundMark x1="50586" y1="24219" x2="50586" y2="24219"/>
+                      </a14:backgroundRemoval>
+                    </a14:imgEffect>
+                  </a14:imgLayer>
+                </a14:imgProps>
+              </a:ext>
+            </a:extLst>
+          </a:blip>
+          <a:srcRect l="17304" t="21936" r="48377" b="64425"/>
+          <a:stretch/>
+        </p:blipFill>
+        <p:spPr>
+          <a:xfrm>
+            <a:off x="556373" y="319881"/>
+            <a:ext cx="2451191" cy="547688"/>
+          </a:xfrm>
+          <a:prstGeom prst="rect">
+            <a:avLst/>
+          </a:prstGeom>
+        </p:spPr>
+      </p:pic>
+    </p:spTree>
+    <p:extLst>
+      <p:ext uri="{BB962C8B-B14F-4D97-AF65-F5344CB8AC3E}">
+        <p14:creationId xmlns:p14="http://schemas.microsoft.com/office/powerpoint/2010/main" val="2644471930"/>
+      </p:ext>
+    </p:extLst>
+  </p:cSld>
+  <p:clrMapOvr>
+    <a:masterClrMapping/>
+  </p:clrMapOvr>
+</p:sld>
+</file>
+
+<file path=ppt/slides/slide42.xml><?xml version="1.0" encoding="utf-8"?>
+<p:sld xmlns:a="http://schemas.openxmlformats.org/drawingml/2006/main" xmlns:r="http://schemas.openxmlformats.org/officeDocument/2006/relationships" xmlns:p="http://schemas.openxmlformats.org/presentationml/2006/main">
+  <p:cSld>
+    <p:spTree>
+      <p:nvGrpSpPr>
+        <p:cNvPr id="1" name=""/>
+        <p:cNvGrpSpPr/>
+        <p:nvPr/>
+      </p:nvGrpSpPr>
+      <p:grpSpPr>
+        <a:xfrm>
+          <a:off x="0" y="0"/>
+          <a:ext cx="0" cy="0"/>
+          <a:chOff x="0" y="0"/>
+          <a:chExt cx="0" cy="0"/>
+        </a:xfrm>
+      </p:grpSpPr>
+      <p:sp>
+        <p:nvSpPr>
+          <p:cNvPr id="4" name="Rectangle: Rounded Corners 3">
+            <a:extLst>
+              <a:ext uri="{FF2B5EF4-FFF2-40B4-BE49-F238E27FC236}">
+                <a16:creationId xmlns:a16="http://schemas.microsoft.com/office/drawing/2014/main" id="{8D6D9DF0-36ED-4863-B918-F6735D13A7C1}"/>
+              </a:ext>
+            </a:extLst>
+          </p:cNvPr>
+          <p:cNvSpPr/>
+          <p:nvPr/>
+        </p:nvSpPr>
+        <p:spPr>
+          <a:xfrm>
+            <a:off x="0" y="0"/>
+            <a:ext cx="3563938" cy="1187450"/>
+          </a:xfrm>
+          <a:prstGeom prst="roundRect">
+            <a:avLst>
+              <a:gd name="adj" fmla="val 50000"/>
+            </a:avLst>
+          </a:prstGeom>
+          <a:gradFill flip="none" rotWithShape="1">
+            <a:gsLst>
+              <a:gs pos="26000">
+                <a:srgbClr val="232F3E"/>
+              </a:gs>
+              <a:gs pos="100000">
+                <a:srgbClr val="32C9F6"/>
+              </a:gs>
+            </a:gsLst>
+            <a:lin ang="2700000" scaled="0"/>
+            <a:tileRect/>
+          </a:gradFill>
+          <a:ln>
+            <a:noFill/>
+          </a:ln>
+        </p:spPr>
+        <p:style>
+          <a:lnRef idx="2">
+            <a:schemeClr val="accent1">
+              <a:shade val="50000"/>
+            </a:schemeClr>
+          </a:lnRef>
+          <a:fillRef idx="1">
+            <a:schemeClr val="accent1"/>
+          </a:fillRef>
+          <a:effectRef idx="0">
+            <a:schemeClr val="accent1"/>
+          </a:effectRef>
+          <a:fontRef idx="minor">
+            <a:schemeClr val="lt1"/>
+          </a:fontRef>
+        </p:style>
+        <p:txBody>
+          <a:bodyPr rtlCol="0" anchor="ctr"/>
+          <a:lstStyle/>
+          <a:p>
+            <a:pPr algn="ctr"/>
+            <a:endParaRPr lang="en-US" dirty="0"/>
+          </a:p>
+        </p:txBody>
+      </p:sp>
+      <p:sp>
+        <p:nvSpPr>
+          <p:cNvPr id="3" name="TextBox 2">
+            <a:extLst>
+              <a:ext uri="{FF2B5EF4-FFF2-40B4-BE49-F238E27FC236}">
+                <a16:creationId xmlns:a16="http://schemas.microsoft.com/office/drawing/2014/main" id="{6C67FD1F-5A7F-4624-A9CE-E8408D3A4F1A}"/>
+              </a:ext>
+            </a:extLst>
+          </p:cNvPr>
+          <p:cNvSpPr txBox="1"/>
+          <p:nvPr/>
+        </p:nvSpPr>
+        <p:spPr>
+          <a:xfrm>
+            <a:off x="535214" y="270560"/>
+            <a:ext cx="2493511" cy="646331"/>
+          </a:xfrm>
+          <a:prstGeom prst="rect">
+            <a:avLst/>
+          </a:prstGeom>
+          <a:noFill/>
+        </p:spPr>
+        <p:txBody>
+          <a:bodyPr wrap="square" rtlCol="0">
+            <a:spAutoFit/>
+          </a:bodyPr>
+          <a:lstStyle/>
+          <a:p>
+            <a:pPr algn="ctr"/>
+            <a:r>
+              <a:rPr lang="id-ID" sz="3600" dirty="0">
+                <a:solidFill>
+                  <a:schemeClr val="bg1"/>
+                </a:solidFill>
+                <a:effectLst>
+                  <a:outerShdw blurRad="38100" dist="38100" dir="2700000" algn="tl">
+                    <a:srgbClr val="000000">
+                      <a:alpha val="43137"/>
+                    </a:srgbClr>
+                  </a:outerShdw>
+                </a:effectLst>
+              </a:rPr>
+              <a:t>Kusonime</a:t>
+            </a:r>
+            <a:endParaRPr lang="en-US" sz="3600" dirty="0">
+              <a:solidFill>
+                <a:schemeClr val="bg1"/>
+              </a:solidFill>
+              <a:effectLst>
+                <a:outerShdw blurRad="38100" dist="38100" dir="2700000" algn="tl">
+                  <a:srgbClr val="000000">
+                    <a:alpha val="43137"/>
+                  </a:srgbClr>
+                </a:outerShdw>
+              </a:effectLst>
+            </a:endParaRPr>
+          </a:p>
+        </p:txBody>
+      </p:sp>
+    </p:spTree>
+    <p:extLst>
+      <p:ext uri="{BB962C8B-B14F-4D97-AF65-F5344CB8AC3E}">
+        <p14:creationId xmlns:p14="http://schemas.microsoft.com/office/powerpoint/2010/main" val="1605652628"/>
+      </p:ext>
+    </p:extLst>
+  </p:cSld>
+  <p:clrMapOvr>
+    <a:masterClrMapping/>
+  </p:clrMapOvr>
+</p:sld>
+</file>
+
+<file path=ppt/slides/slide43.xml><?xml version="1.0" encoding="utf-8"?>
 <p:sld xmlns:a="http://schemas.openxmlformats.org/drawingml/2006/main" xmlns:r="http://schemas.openxmlformats.org/officeDocument/2006/relationships" xmlns:p="http://schemas.openxmlformats.org/presentationml/2006/main">
   <p:cSld>
     <p:spTree>
@@ -10768,298 +11204,6 @@
     <p:extLst>
       <p:ext uri="{BB962C8B-B14F-4D97-AF65-F5344CB8AC3E}">
         <p14:creationId xmlns:p14="http://schemas.microsoft.com/office/powerpoint/2010/main" val="1757396926"/>
-      </p:ext>
-    </p:extLst>
-  </p:cSld>
-  <p:clrMapOvr>
-    <a:masterClrMapping/>
-  </p:clrMapOvr>
-</p:sld>
-</file>
-
-<file path=ppt/slides/slide42.xml><?xml version="1.0" encoding="utf-8"?>
-<p:sld xmlns:a="http://schemas.openxmlformats.org/drawingml/2006/main" xmlns:r="http://schemas.openxmlformats.org/officeDocument/2006/relationships" xmlns:p="http://schemas.openxmlformats.org/presentationml/2006/main">
-  <p:cSld>
-    <p:spTree>
-      <p:nvGrpSpPr>
-        <p:cNvPr id="1" name=""/>
-        <p:cNvGrpSpPr/>
-        <p:nvPr/>
-      </p:nvGrpSpPr>
-      <p:grpSpPr>
-        <a:xfrm>
-          <a:off x="0" y="0"/>
-          <a:ext cx="0" cy="0"/>
-          <a:chOff x="0" y="0"/>
-          <a:chExt cx="0" cy="0"/>
-        </a:xfrm>
-      </p:grpSpPr>
-      <p:sp>
-        <p:nvSpPr>
-          <p:cNvPr id="4" name="Rectangle: Rounded Corners 3">
-            <a:extLst>
-              <a:ext uri="{FF2B5EF4-FFF2-40B4-BE49-F238E27FC236}">
-                <a16:creationId xmlns:a16="http://schemas.microsoft.com/office/drawing/2014/main" id="{8D6D9DF0-36ED-4863-B918-F6735D13A7C1}"/>
-              </a:ext>
-            </a:extLst>
-          </p:cNvPr>
-          <p:cNvSpPr/>
-          <p:nvPr/>
-        </p:nvSpPr>
-        <p:spPr>
-          <a:xfrm>
-            <a:off x="0" y="0"/>
-            <a:ext cx="3563938" cy="1187450"/>
-          </a:xfrm>
-          <a:prstGeom prst="roundRect">
-            <a:avLst>
-              <a:gd name="adj" fmla="val 50000"/>
-            </a:avLst>
-          </a:prstGeom>
-          <a:gradFill flip="none" rotWithShape="1">
-            <a:gsLst>
-              <a:gs pos="26000">
-                <a:srgbClr val="17201E"/>
-              </a:gs>
-              <a:gs pos="100000">
-                <a:srgbClr val="1C2825"/>
-              </a:gs>
-            </a:gsLst>
-            <a:lin ang="2700000" scaled="0"/>
-            <a:tileRect/>
-          </a:gradFill>
-          <a:ln>
-            <a:noFill/>
-          </a:ln>
-        </p:spPr>
-        <p:style>
-          <a:lnRef idx="2">
-            <a:schemeClr val="accent1">
-              <a:shade val="50000"/>
-            </a:schemeClr>
-          </a:lnRef>
-          <a:fillRef idx="1">
-            <a:schemeClr val="accent1"/>
-          </a:fillRef>
-          <a:effectRef idx="0">
-            <a:schemeClr val="accent1"/>
-          </a:effectRef>
-          <a:fontRef idx="minor">
-            <a:schemeClr val="lt1"/>
-          </a:fontRef>
-        </p:style>
-        <p:txBody>
-          <a:bodyPr rtlCol="0" anchor="ctr"/>
-          <a:lstStyle/>
-          <a:p>
-            <a:pPr algn="ctr"/>
-            <a:endParaRPr lang="en-US" dirty="0"/>
-          </a:p>
-        </p:txBody>
-      </p:sp>
-      <p:pic>
-        <p:nvPicPr>
-          <p:cNvPr id="3" name="Picture 2">
-            <a:extLst>
-              <a:ext uri="{FF2B5EF4-FFF2-40B4-BE49-F238E27FC236}">
-                <a16:creationId xmlns:a16="http://schemas.microsoft.com/office/drawing/2014/main" id="{02D2A3E8-B154-4758-AA9A-6B92785C0760}"/>
-              </a:ext>
-            </a:extLst>
-          </p:cNvPr>
-          <p:cNvPicPr>
-            <a:picLocks noChangeAspect="1"/>
-          </p:cNvPicPr>
-          <p:nvPr/>
-        </p:nvPicPr>
-        <p:blipFill rotWithShape="1">
-          <a:blip r:embed="rId2">
-            <a:extLst>
-              <a:ext uri="{BEBA8EAE-BF5A-486C-A8C5-ECC9F3942E4B}">
-                <a14:imgProps xmlns:a14="http://schemas.microsoft.com/office/drawing/2010/main">
-                  <a14:imgLayer r:embed="rId3">
-                    <a14:imgEffect>
-                      <a14:backgroundRemoval t="22526" b="34115" l="18082" r="50586">
-                        <a14:foregroundMark x1="18228" y1="27604" x2="18228" y2="27604"/>
-                        <a14:foregroundMark x1="26135" y1="25260" x2="26135" y2="25260"/>
-                        <a14:foregroundMark x1="29063" y1="26563" x2="29063" y2="26563"/>
-                        <a14:foregroundMark x1="35066" y1="27865" x2="35066" y2="27865"/>
-                        <a14:foregroundMark x1="37921" y1="22786" x2="37921" y2="22786"/>
-                        <a14:foregroundMark x1="46120" y1="27083" x2="46120" y2="27083"/>
-                        <a14:foregroundMark x1="49122" y1="28906" x2="49122" y2="28906"/>
-                        <a14:foregroundMark x1="50586" y1="24219" x2="50586" y2="24219"/>
-                      </a14:backgroundRemoval>
-                    </a14:imgEffect>
-                  </a14:imgLayer>
-                </a14:imgProps>
-              </a:ext>
-            </a:extLst>
-          </a:blip>
-          <a:srcRect l="17304" t="21936" r="48377" b="64425"/>
-          <a:stretch/>
-        </p:blipFill>
-        <p:spPr>
-          <a:xfrm>
-            <a:off x="556373" y="319881"/>
-            <a:ext cx="2451191" cy="547688"/>
-          </a:xfrm>
-          <a:prstGeom prst="rect">
-            <a:avLst/>
-          </a:prstGeom>
-        </p:spPr>
-      </p:pic>
-    </p:spTree>
-    <p:extLst>
-      <p:ext uri="{BB962C8B-B14F-4D97-AF65-F5344CB8AC3E}">
-        <p14:creationId xmlns:p14="http://schemas.microsoft.com/office/powerpoint/2010/main" val="2644471930"/>
-      </p:ext>
-    </p:extLst>
-  </p:cSld>
-  <p:clrMapOvr>
-    <a:masterClrMapping/>
-  </p:clrMapOvr>
-</p:sld>
-</file>
-
-<file path=ppt/slides/slide43.xml><?xml version="1.0" encoding="utf-8"?>
-<p:sld xmlns:a="http://schemas.openxmlformats.org/drawingml/2006/main" xmlns:r="http://schemas.openxmlformats.org/officeDocument/2006/relationships" xmlns:p="http://schemas.openxmlformats.org/presentationml/2006/main">
-  <p:cSld>
-    <p:spTree>
-      <p:nvGrpSpPr>
-        <p:cNvPr id="1" name=""/>
-        <p:cNvGrpSpPr/>
-        <p:nvPr/>
-      </p:nvGrpSpPr>
-      <p:grpSpPr>
-        <a:xfrm>
-          <a:off x="0" y="0"/>
-          <a:ext cx="0" cy="0"/>
-          <a:chOff x="0" y="0"/>
-          <a:chExt cx="0" cy="0"/>
-        </a:xfrm>
-      </p:grpSpPr>
-      <p:sp>
-        <p:nvSpPr>
-          <p:cNvPr id="4" name="Rectangle: Rounded Corners 3">
-            <a:extLst>
-              <a:ext uri="{FF2B5EF4-FFF2-40B4-BE49-F238E27FC236}">
-                <a16:creationId xmlns:a16="http://schemas.microsoft.com/office/drawing/2014/main" id="{8D6D9DF0-36ED-4863-B918-F6735D13A7C1}"/>
-              </a:ext>
-            </a:extLst>
-          </p:cNvPr>
-          <p:cNvSpPr/>
-          <p:nvPr/>
-        </p:nvSpPr>
-        <p:spPr>
-          <a:xfrm>
-            <a:off x="0" y="0"/>
-            <a:ext cx="3563938" cy="1187450"/>
-          </a:xfrm>
-          <a:prstGeom prst="roundRect">
-            <a:avLst>
-              <a:gd name="adj" fmla="val 50000"/>
-            </a:avLst>
-          </a:prstGeom>
-          <a:gradFill flip="none" rotWithShape="1">
-            <a:gsLst>
-              <a:gs pos="26000">
-                <a:srgbClr val="262B36"/>
-              </a:gs>
-              <a:gs pos="100000">
-                <a:srgbClr val="6FA9EA"/>
-              </a:gs>
-            </a:gsLst>
-            <a:lin ang="2700000" scaled="0"/>
-            <a:tileRect/>
-          </a:gradFill>
-          <a:ln>
-            <a:noFill/>
-          </a:ln>
-        </p:spPr>
-        <p:style>
-          <a:lnRef idx="2">
-            <a:schemeClr val="accent1">
-              <a:shade val="50000"/>
-            </a:schemeClr>
-          </a:lnRef>
-          <a:fillRef idx="1">
-            <a:schemeClr val="accent1"/>
-          </a:fillRef>
-          <a:effectRef idx="0">
-            <a:schemeClr val="accent1"/>
-          </a:effectRef>
-          <a:fontRef idx="minor">
-            <a:schemeClr val="lt1"/>
-          </a:fontRef>
-        </p:style>
-        <p:txBody>
-          <a:bodyPr rtlCol="0" anchor="ctr"/>
-          <a:lstStyle/>
-          <a:p>
-            <a:pPr algn="ctr"/>
-            <a:endParaRPr lang="en-US" dirty="0"/>
-          </a:p>
-        </p:txBody>
-      </p:sp>
-      <p:pic>
-        <p:nvPicPr>
-          <p:cNvPr id="37890" name="Picture 2" descr="https://neonime.net/wp-content/themes/grifus/images/site-logo.png">
-            <a:extLst>
-              <a:ext uri="{FF2B5EF4-FFF2-40B4-BE49-F238E27FC236}">
-                <a16:creationId xmlns:a16="http://schemas.microsoft.com/office/drawing/2014/main" id="{E41ABB8D-5888-4F36-89D6-A23CD8EF1AA5}"/>
-              </a:ext>
-            </a:extLst>
-          </p:cNvPr>
-          <p:cNvPicPr>
-            <a:picLocks noChangeAspect="1" noChangeArrowheads="1"/>
-          </p:cNvPicPr>
-          <p:nvPr/>
-        </p:nvPicPr>
-        <p:blipFill>
-          <a:blip r:embed="rId2">
-            <a:extLst>
-              <a:ext uri="{BEBA8EAE-BF5A-486C-A8C5-ECC9F3942E4B}">
-                <a14:imgProps xmlns:a14="http://schemas.microsoft.com/office/drawing/2010/main">
-                  <a14:imgLayer r:embed="rId3">
-                    <a14:imgEffect>
-                      <a14:brightnessContrast bright="100000"/>
-                    </a14:imgEffect>
-                  </a14:imgLayer>
-                </a14:imgProps>
-              </a:ext>
-              <a:ext uri="{28A0092B-C50C-407E-A947-70E740481C1C}">
-                <a14:useLocalDpi xmlns:a14="http://schemas.microsoft.com/office/drawing/2010/main" val="0"/>
-              </a:ext>
-            </a:extLst>
-          </a:blip>
-          <a:srcRect/>
-          <a:stretch>
-            <a:fillRect/>
-          </a:stretch>
-        </p:blipFill>
-        <p:spPr bwMode="auto">
-          <a:xfrm>
-            <a:off x="508724" y="345882"/>
-            <a:ext cx="2546490" cy="495686"/>
-          </a:xfrm>
-          <a:prstGeom prst="rect">
-            <a:avLst/>
-          </a:prstGeom>
-          <a:noFill/>
-          <a:extLst>
-            <a:ext uri="{909E8E84-426E-40DD-AFC4-6F175D3DCCD1}">
-              <a14:hiddenFill xmlns:a14="http://schemas.microsoft.com/office/drawing/2010/main">
-                <a:solidFill>
-                  <a:srgbClr val="FFFFFF"/>
-                </a:solidFill>
-              </a14:hiddenFill>
-            </a:ext>
-          </a:extLst>
-        </p:spPr>
-      </p:pic>
-    </p:spTree>
-    <p:extLst>
-      <p:ext uri="{BB962C8B-B14F-4D97-AF65-F5344CB8AC3E}">
-        <p14:creationId xmlns:p14="http://schemas.microsoft.com/office/powerpoint/2010/main" val="2433375054"/>
       </p:ext>
     </p:extLst>
   </p:cSld>
@@ -11251,6 +11395,155 @@
           <a:gradFill flip="none" rotWithShape="1">
             <a:gsLst>
               <a:gs pos="26000">
+                <a:srgbClr val="262B36"/>
+              </a:gs>
+              <a:gs pos="100000">
+                <a:srgbClr val="6FA9EA"/>
+              </a:gs>
+            </a:gsLst>
+            <a:lin ang="2700000" scaled="0"/>
+            <a:tileRect/>
+          </a:gradFill>
+          <a:ln>
+            <a:noFill/>
+          </a:ln>
+        </p:spPr>
+        <p:style>
+          <a:lnRef idx="2">
+            <a:schemeClr val="accent1">
+              <a:shade val="50000"/>
+            </a:schemeClr>
+          </a:lnRef>
+          <a:fillRef idx="1">
+            <a:schemeClr val="accent1"/>
+          </a:fillRef>
+          <a:effectRef idx="0">
+            <a:schemeClr val="accent1"/>
+          </a:effectRef>
+          <a:fontRef idx="minor">
+            <a:schemeClr val="lt1"/>
+          </a:fontRef>
+        </p:style>
+        <p:txBody>
+          <a:bodyPr rtlCol="0" anchor="ctr"/>
+          <a:lstStyle/>
+          <a:p>
+            <a:pPr algn="ctr"/>
+            <a:endParaRPr lang="en-US" dirty="0"/>
+          </a:p>
+        </p:txBody>
+      </p:sp>
+      <p:pic>
+        <p:nvPicPr>
+          <p:cNvPr id="37890" name="Picture 2" descr="https://neonime.net/wp-content/themes/grifus/images/site-logo.png">
+            <a:extLst>
+              <a:ext uri="{FF2B5EF4-FFF2-40B4-BE49-F238E27FC236}">
+                <a16:creationId xmlns:a16="http://schemas.microsoft.com/office/drawing/2014/main" id="{E41ABB8D-5888-4F36-89D6-A23CD8EF1AA5}"/>
+              </a:ext>
+            </a:extLst>
+          </p:cNvPr>
+          <p:cNvPicPr>
+            <a:picLocks noChangeAspect="1" noChangeArrowheads="1"/>
+          </p:cNvPicPr>
+          <p:nvPr/>
+        </p:nvPicPr>
+        <p:blipFill>
+          <a:blip r:embed="rId2">
+            <a:extLst>
+              <a:ext uri="{BEBA8EAE-BF5A-486C-A8C5-ECC9F3942E4B}">
+                <a14:imgProps xmlns:a14="http://schemas.microsoft.com/office/drawing/2010/main">
+                  <a14:imgLayer r:embed="rId3">
+                    <a14:imgEffect>
+                      <a14:brightnessContrast bright="100000"/>
+                    </a14:imgEffect>
+                  </a14:imgLayer>
+                </a14:imgProps>
+              </a:ext>
+              <a:ext uri="{28A0092B-C50C-407E-A947-70E740481C1C}">
+                <a14:useLocalDpi xmlns:a14="http://schemas.microsoft.com/office/drawing/2010/main" val="0"/>
+              </a:ext>
+            </a:extLst>
+          </a:blip>
+          <a:srcRect/>
+          <a:stretch>
+            <a:fillRect/>
+          </a:stretch>
+        </p:blipFill>
+        <p:spPr bwMode="auto">
+          <a:xfrm>
+            <a:off x="508724" y="345882"/>
+            <a:ext cx="2546490" cy="495686"/>
+          </a:xfrm>
+          <a:prstGeom prst="rect">
+            <a:avLst/>
+          </a:prstGeom>
+          <a:noFill/>
+          <a:extLst>
+            <a:ext uri="{909E8E84-426E-40DD-AFC4-6F175D3DCCD1}">
+              <a14:hiddenFill xmlns:a14="http://schemas.microsoft.com/office/drawing/2010/main">
+                <a:solidFill>
+                  <a:srgbClr val="FFFFFF"/>
+                </a:solidFill>
+              </a14:hiddenFill>
+            </a:ext>
+          </a:extLst>
+        </p:spPr>
+      </p:pic>
+    </p:spTree>
+    <p:extLst>
+      <p:ext uri="{BB962C8B-B14F-4D97-AF65-F5344CB8AC3E}">
+        <p14:creationId xmlns:p14="http://schemas.microsoft.com/office/powerpoint/2010/main" val="2433375054"/>
+      </p:ext>
+    </p:extLst>
+  </p:cSld>
+  <p:clrMapOvr>
+    <a:masterClrMapping/>
+  </p:clrMapOvr>
+</p:sld>
+</file>
+
+<file path=ppt/slides/slide46.xml><?xml version="1.0" encoding="utf-8"?>
+<p:sld xmlns:a="http://schemas.openxmlformats.org/drawingml/2006/main" xmlns:r="http://schemas.openxmlformats.org/officeDocument/2006/relationships" xmlns:p="http://schemas.openxmlformats.org/presentationml/2006/main">
+  <p:cSld>
+    <p:spTree>
+      <p:nvGrpSpPr>
+        <p:cNvPr id="1" name=""/>
+        <p:cNvGrpSpPr/>
+        <p:nvPr/>
+      </p:nvGrpSpPr>
+      <p:grpSpPr>
+        <a:xfrm>
+          <a:off x="0" y="0"/>
+          <a:ext cx="0" cy="0"/>
+          <a:chOff x="0" y="0"/>
+          <a:chExt cx="0" cy="0"/>
+        </a:xfrm>
+      </p:grpSpPr>
+      <p:sp>
+        <p:nvSpPr>
+          <p:cNvPr id="4" name="Rectangle: Rounded Corners 3">
+            <a:extLst>
+              <a:ext uri="{FF2B5EF4-FFF2-40B4-BE49-F238E27FC236}">
+                <a16:creationId xmlns:a16="http://schemas.microsoft.com/office/drawing/2014/main" id="{8D6D9DF0-36ED-4863-B918-F6735D13A7C1}"/>
+              </a:ext>
+            </a:extLst>
+          </p:cNvPr>
+          <p:cNvSpPr/>
+          <p:nvPr/>
+        </p:nvSpPr>
+        <p:spPr>
+          <a:xfrm>
+            <a:off x="0" y="0"/>
+            <a:ext cx="3563938" cy="1187450"/>
+          </a:xfrm>
+          <a:prstGeom prst="roundRect">
+            <a:avLst>
+              <a:gd name="adj" fmla="val 50000"/>
+            </a:avLst>
+          </a:prstGeom>
+          <a:gradFill flip="none" rotWithShape="1">
+            <a:gsLst>
+              <a:gs pos="26000">
                 <a:srgbClr val="1100FD"/>
               </a:gs>
               <a:gs pos="100000">
@@ -11335,158 +11628,6 @@
     <p:extLst>
       <p:ext uri="{BB962C8B-B14F-4D97-AF65-F5344CB8AC3E}">
         <p14:creationId xmlns:p14="http://schemas.microsoft.com/office/powerpoint/2010/main" val="2758426006"/>
-      </p:ext>
-    </p:extLst>
-  </p:cSld>
-  <p:clrMapOvr>
-    <a:masterClrMapping/>
-  </p:clrMapOvr>
-</p:sld>
-</file>
-
-<file path=ppt/slides/slide46.xml><?xml version="1.0" encoding="utf-8"?>
-<p:sld xmlns:a="http://schemas.openxmlformats.org/drawingml/2006/main" xmlns:r="http://schemas.openxmlformats.org/officeDocument/2006/relationships" xmlns:p="http://schemas.openxmlformats.org/presentationml/2006/main">
-  <p:cSld>
-    <p:spTree>
-      <p:nvGrpSpPr>
-        <p:cNvPr id="1" name=""/>
-        <p:cNvGrpSpPr/>
-        <p:nvPr/>
-      </p:nvGrpSpPr>
-      <p:grpSpPr>
-        <a:xfrm>
-          <a:off x="0" y="0"/>
-          <a:ext cx="0" cy="0"/>
-          <a:chOff x="0" y="0"/>
-          <a:chExt cx="0" cy="0"/>
-        </a:xfrm>
-      </p:grpSpPr>
-      <p:sp>
-        <p:nvSpPr>
-          <p:cNvPr id="4" name="Rectangle: Rounded Corners 3">
-            <a:extLst>
-              <a:ext uri="{FF2B5EF4-FFF2-40B4-BE49-F238E27FC236}">
-                <a16:creationId xmlns:a16="http://schemas.microsoft.com/office/drawing/2014/main" id="{8D6D9DF0-36ED-4863-B918-F6735D13A7C1}"/>
-              </a:ext>
-            </a:extLst>
-          </p:cNvPr>
-          <p:cNvSpPr/>
-          <p:nvPr/>
-        </p:nvSpPr>
-        <p:spPr>
-          <a:xfrm>
-            <a:off x="0" y="0"/>
-            <a:ext cx="3563938" cy="1187450"/>
-          </a:xfrm>
-          <a:prstGeom prst="roundRect">
-            <a:avLst>
-              <a:gd name="adj" fmla="val 50000"/>
-            </a:avLst>
-          </a:prstGeom>
-          <a:gradFill flip="none" rotWithShape="1">
-            <a:gsLst>
-              <a:gs pos="26000">
-                <a:srgbClr val="232F3E"/>
-              </a:gs>
-              <a:gs pos="100000">
-                <a:srgbClr val="32C9F6"/>
-              </a:gs>
-            </a:gsLst>
-            <a:lin ang="2700000" scaled="0"/>
-            <a:tileRect/>
-          </a:gradFill>
-          <a:ln>
-            <a:noFill/>
-          </a:ln>
-        </p:spPr>
-        <p:style>
-          <a:lnRef idx="2">
-            <a:schemeClr val="accent1">
-              <a:shade val="50000"/>
-            </a:schemeClr>
-          </a:lnRef>
-          <a:fillRef idx="1">
-            <a:schemeClr val="accent1"/>
-          </a:fillRef>
-          <a:effectRef idx="0">
-            <a:schemeClr val="accent1"/>
-          </a:effectRef>
-          <a:fontRef idx="minor">
-            <a:schemeClr val="lt1"/>
-          </a:fontRef>
-        </p:style>
-        <p:txBody>
-          <a:bodyPr rtlCol="0" anchor="ctr"/>
-          <a:lstStyle/>
-          <a:p>
-            <a:pPr algn="ctr"/>
-            <a:endParaRPr lang="en-US" dirty="0"/>
-          </a:p>
-        </p:txBody>
-      </p:sp>
-      <p:sp>
-        <p:nvSpPr>
-          <p:cNvPr id="3" name="TextBox 2">
-            <a:extLst>
-              <a:ext uri="{FF2B5EF4-FFF2-40B4-BE49-F238E27FC236}">
-                <a16:creationId xmlns:a16="http://schemas.microsoft.com/office/drawing/2014/main" id="{6C67FD1F-5A7F-4624-A9CE-E8408D3A4F1A}"/>
-              </a:ext>
-            </a:extLst>
-          </p:cNvPr>
-          <p:cNvSpPr txBox="1"/>
-          <p:nvPr/>
-        </p:nvSpPr>
-        <p:spPr>
-          <a:xfrm>
-            <a:off x="535214" y="270560"/>
-            <a:ext cx="2493511" cy="646331"/>
-          </a:xfrm>
-          <a:prstGeom prst="rect">
-            <a:avLst/>
-          </a:prstGeom>
-          <a:noFill/>
-        </p:spPr>
-        <p:txBody>
-          <a:bodyPr wrap="square" rtlCol="0">
-            <a:spAutoFit/>
-          </a:bodyPr>
-          <a:lstStyle/>
-          <a:p>
-            <a:pPr algn="ctr"/>
-            <a:r>
-              <a:rPr lang="id-ID" sz="3600" dirty="0">
-                <a:solidFill>
-                  <a:schemeClr val="bg1"/>
-                </a:solidFill>
-                <a:effectLst>
-                  <a:outerShdw blurRad="38100" dist="38100" dir="2700000" algn="tl">
-                    <a:srgbClr val="000000">
-                      <a:alpha val="43137"/>
-                    </a:srgbClr>
-                  </a:outerShdw>
-                </a:effectLst>
-              </a:rPr>
-              <a:t>Kusonime</a:t>
-            </a:r>
-            <a:endParaRPr lang="en-US" sz="3600" dirty="0">
-              <a:solidFill>
-                <a:schemeClr val="bg1"/>
-              </a:solidFill>
-              <a:effectLst>
-                <a:outerShdw blurRad="38100" dist="38100" dir="2700000" algn="tl">
-                  <a:srgbClr val="000000">
-                    <a:alpha val="43137"/>
-                  </a:srgbClr>
-                </a:outerShdw>
-              </a:effectLst>
-            </a:endParaRPr>
-          </a:p>
-        </p:txBody>
-      </p:sp>
-    </p:spTree>
-    <p:extLst>
-      <p:ext uri="{BB962C8B-B14F-4D97-AF65-F5344CB8AC3E}">
-        <p14:creationId xmlns:p14="http://schemas.microsoft.com/office/powerpoint/2010/main" val="1605652628"/>
       </p:ext>
     </p:extLst>
   </p:cSld>

</xml_diff>